<commit_message>
Conexión de Hibernate con la base de datos con anotaciones
</commit_message>
<xml_diff>
--- a/Persistencia con JDBC.pptx
+++ b/Persistencia con JDBC.pptx
@@ -5,7 +5,7 @@
     <p:sldMasterId id="2147483660" r:id="rId1"/>
   </p:sldMasterIdLst>
   <p:notesMasterIdLst>
-    <p:notesMasterId r:id="rId13"/>
+    <p:notesMasterId r:id="rId17"/>
   </p:notesMasterIdLst>
   <p:sldIdLst>
     <p:sldId id="256" r:id="rId2"/>
@@ -15,10 +15,14 @@
     <p:sldId id="261" r:id="rId6"/>
     <p:sldId id="262" r:id="rId7"/>
     <p:sldId id="263" r:id="rId8"/>
-    <p:sldId id="264" r:id="rId9"/>
-    <p:sldId id="265" r:id="rId10"/>
-    <p:sldId id="266" r:id="rId11"/>
-    <p:sldId id="267" r:id="rId12"/>
+    <p:sldId id="265" r:id="rId9"/>
+    <p:sldId id="266" r:id="rId10"/>
+    <p:sldId id="267" r:id="rId11"/>
+    <p:sldId id="268" r:id="rId12"/>
+    <p:sldId id="269" r:id="rId13"/>
+    <p:sldId id="270" r:id="rId14"/>
+    <p:sldId id="271" r:id="rId15"/>
+    <p:sldId id="272" r:id="rId16"/>
   </p:sldIdLst>
   <p:sldSz cx="12192000" cy="6858000"/>
   <p:notesSz cx="6858000" cy="9144000"/>
@@ -207,7 +211,7 @@
           <a:p>
             <a:fld id="{FA4816B6-58E2-4FF8-848F-267B7802A587}" type="datetimeFigureOut">
               <a:rPr lang="es-MX" smtClean="0"/>
-              <a:t>25/04/2022</a:t>
+              <a:t>27/04/2022</a:t>
             </a:fld>
             <a:endParaRPr lang="es-MX"/>
           </a:p>
@@ -626,7 +630,7 @@
           <a:p>
             <a:fld id="{05E2AEA5-2AA4-415F-8B98-57464EFC9E74}" type="datetimeFigureOut">
               <a:rPr lang="es-MX" smtClean="0"/>
-              <a:t>25/04/2022</a:t>
+              <a:t>27/04/2022</a:t>
             </a:fld>
             <a:endParaRPr lang="es-MX"/>
           </a:p>
@@ -832,7 +836,7 @@
           <a:p>
             <a:fld id="{05E2AEA5-2AA4-415F-8B98-57464EFC9E74}" type="datetimeFigureOut">
               <a:rPr lang="es-MX" smtClean="0"/>
-              <a:t>25/04/2022</a:t>
+              <a:t>27/04/2022</a:t>
             </a:fld>
             <a:endParaRPr lang="es-MX"/>
           </a:p>
@@ -1043,7 +1047,7 @@
           <a:p>
             <a:fld id="{05E2AEA5-2AA4-415F-8B98-57464EFC9E74}" type="datetimeFigureOut">
               <a:rPr lang="es-MX" smtClean="0"/>
-              <a:t>25/04/2022</a:t>
+              <a:t>27/04/2022</a:t>
             </a:fld>
             <a:endParaRPr lang="es-MX"/>
           </a:p>
@@ -1280,7 +1284,7 @@
           <a:p>
             <a:fld id="{05E2AEA5-2AA4-415F-8B98-57464EFC9E74}" type="datetimeFigureOut">
               <a:rPr lang="es-MX" smtClean="0"/>
-              <a:t>25/04/2022</a:t>
+              <a:t>27/04/2022</a:t>
             </a:fld>
             <a:endParaRPr lang="es-MX"/>
           </a:p>
@@ -1558,7 +1562,7 @@
           <a:p>
             <a:fld id="{05E2AEA5-2AA4-415F-8B98-57464EFC9E74}" type="datetimeFigureOut">
               <a:rPr lang="es-MX" smtClean="0"/>
-              <a:t>25/04/2022</a:t>
+              <a:t>27/04/2022</a:t>
             </a:fld>
             <a:endParaRPr lang="es-MX"/>
           </a:p>
@@ -1831,7 +1835,7 @@
           <a:p>
             <a:fld id="{05E2AEA5-2AA4-415F-8B98-57464EFC9E74}" type="datetimeFigureOut">
               <a:rPr lang="es-MX" smtClean="0"/>
-              <a:t>25/04/2022</a:t>
+              <a:t>27/04/2022</a:t>
             </a:fld>
             <a:endParaRPr lang="es-MX"/>
           </a:p>
@@ -2255,7 +2259,7 @@
           <a:p>
             <a:fld id="{05E2AEA5-2AA4-415F-8B98-57464EFC9E74}" type="datetimeFigureOut">
               <a:rPr lang="es-MX" smtClean="0"/>
-              <a:t>25/04/2022</a:t>
+              <a:t>27/04/2022</a:t>
             </a:fld>
             <a:endParaRPr lang="es-MX"/>
           </a:p>
@@ -2396,7 +2400,7 @@
           <a:p>
             <a:fld id="{05E2AEA5-2AA4-415F-8B98-57464EFC9E74}" type="datetimeFigureOut">
               <a:rPr lang="es-MX" smtClean="0"/>
-              <a:t>25/04/2022</a:t>
+              <a:t>27/04/2022</a:t>
             </a:fld>
             <a:endParaRPr lang="es-MX"/>
           </a:p>
@@ -2509,7 +2513,7 @@
           <a:p>
             <a:fld id="{05E2AEA5-2AA4-415F-8B98-57464EFC9E74}" type="datetimeFigureOut">
               <a:rPr lang="es-MX" smtClean="0"/>
-              <a:t>25/04/2022</a:t>
+              <a:t>27/04/2022</a:t>
             </a:fld>
             <a:endParaRPr lang="es-MX"/>
           </a:p>
@@ -2826,7 +2830,7 @@
           <a:p>
             <a:fld id="{05E2AEA5-2AA4-415F-8B98-57464EFC9E74}" type="datetimeFigureOut">
               <a:rPr lang="es-MX" smtClean="0"/>
-              <a:t>25/04/2022</a:t>
+              <a:t>27/04/2022</a:t>
             </a:fld>
             <a:endParaRPr lang="es-MX"/>
           </a:p>
@@ -3123,7 +3127,7 @@
           <a:p>
             <a:fld id="{05E2AEA5-2AA4-415F-8B98-57464EFC9E74}" type="datetimeFigureOut">
               <a:rPr lang="es-MX" smtClean="0"/>
-              <a:t>25/04/2022</a:t>
+              <a:t>27/04/2022</a:t>
             </a:fld>
             <a:endParaRPr lang="es-MX"/>
           </a:p>
@@ -3402,7 +3406,7 @@
           <a:p>
             <a:fld id="{05E2AEA5-2AA4-415F-8B98-57464EFC9E74}" type="datetimeFigureOut">
               <a:rPr lang="es-MX" smtClean="0"/>
-              <a:t>25/04/2022</a:t>
+              <a:t>27/04/2022</a:t>
             </a:fld>
             <a:endParaRPr lang="es-MX"/>
           </a:p>
@@ -3910,7 +3914,7 @@
           <p:cNvPr id="2" name="Título 1">
             <a:extLst>
               <a:ext uri="{FF2B5EF4-FFF2-40B4-BE49-F238E27FC236}">
-                <a16:creationId xmlns:a16="http://schemas.microsoft.com/office/drawing/2014/main" id="{B0AA5EBA-8A29-40B4-A9CA-B2ED8FF82375}"/>
+                <a16:creationId xmlns:a16="http://schemas.microsoft.com/office/drawing/2014/main" id="{7B1B380A-92E8-45CF-B6C0-43DC6E086888}"/>
               </a:ext>
             </a:extLst>
           </p:cNvPr>
@@ -3921,21 +3925,15 @@
             <p:ph type="title"/>
           </p:nvPr>
         </p:nvSpPr>
-        <p:spPr>
-          <a:xfrm>
-            <a:off x="838200" y="325226"/>
-            <a:ext cx="10515600" cy="712064"/>
-          </a:xfrm>
-        </p:spPr>
+        <p:spPr/>
         <p:txBody>
           <a:bodyPr/>
           <a:lstStyle/>
           <a:p>
             <a:r>
-              <a:rPr lang="es-MX" dirty="0" err="1"/>
-              <a:t>ORM’s</a:t>
-            </a:r>
-            <a:endParaRPr lang="es-MX" dirty="0"/>
+              <a:rPr lang="es-MX" b="1" dirty="0"/>
+              <a:t>Hibernate</a:t>
+            </a:r>
           </a:p>
         </p:txBody>
       </p:sp>
@@ -3944,7 +3942,7 @@
           <p:cNvPr id="3" name="Marcador de contenido 2">
             <a:extLst>
               <a:ext uri="{FF2B5EF4-FFF2-40B4-BE49-F238E27FC236}">
-                <a16:creationId xmlns:a16="http://schemas.microsoft.com/office/drawing/2014/main" id="{56A0ADC7-85E0-43F6-B98C-3B69D6ECF443}"/>
+                <a16:creationId xmlns:a16="http://schemas.microsoft.com/office/drawing/2014/main" id="{616B1D78-C0C6-440A-AA7E-9178F0430AC8}"/>
               </a:ext>
             </a:extLst>
           </p:cNvPr>
@@ -3957,157 +3955,315 @@
         </p:nvSpPr>
         <p:spPr>
           <a:xfrm>
-            <a:off x="838200" y="1037290"/>
-            <a:ext cx="10515600" cy="5237205"/>
+            <a:off x="841899" y="1198486"/>
+            <a:ext cx="10515600" cy="2003811"/>
           </a:xfrm>
         </p:spPr>
         <p:txBody>
           <a:bodyPr/>
           <a:lstStyle/>
           <a:p>
-            <a:pPr algn="just"/>
             <a:r>
               <a:rPr lang="es-MX" dirty="0"/>
-              <a:t>Existen distintas ORM pero tienen la misma finalidad de convertir datos entre base de datos relaciones a lenguajes de programación orientados a objetos.</a:t>
-            </a:r>
-          </a:p>
-          <a:p>
-            <a:pPr algn="just"/>
-            <a:r>
-              <a:rPr lang="es-MX" b="1" dirty="0"/>
-              <a:t>Un sistema ORM tiene como ventaja sobre JDBC :</a:t>
-            </a:r>
-          </a:p>
-          <a:p>
-            <a:pPr marL="914400" lvl="1" indent="-457200" algn="just">
-              <a:buFont typeface="+mj-lt"/>
-              <a:buAutoNum type="arabicPeriod"/>
-            </a:pPr>
+              <a:t>Hibernate es una framework o marco para conversar o guardar Objetos Java en una base de datos. Este es un framework utilizado por muchos proyectos empresariales y es gratuito. </a:t>
+            </a:r>
+          </a:p>
+          <a:p>
             <a:r>
               <a:rPr lang="es-MX" dirty="0"/>
-              <a:t>Acceso a los objetos mediante el código en lugar de las tablas de bases de datos.</a:t>
-            </a:r>
-          </a:p>
-          <a:p>
-            <a:pPr marL="914400" lvl="1" indent="-457200" algn="just">
-              <a:buFont typeface="+mj-lt"/>
-              <a:buAutoNum type="arabicPeriod"/>
-            </a:pPr>
-            <a:r>
-              <a:rPr lang="es-MX" dirty="0"/>
-              <a:t>Ocultar detalles de consultas SQL de la lógica Orientada a Objetos.</a:t>
-            </a:r>
-          </a:p>
-          <a:p>
-            <a:pPr marL="914400" lvl="1" indent="-457200" algn="just">
-              <a:buFont typeface="+mj-lt"/>
-              <a:buAutoNum type="arabicPeriod"/>
-            </a:pPr>
-            <a:r>
-              <a:rPr lang="es-MX" dirty="0"/>
-              <a:t>No hay necesidad de liderar con la implementación de la base de datos.</a:t>
-            </a:r>
-          </a:p>
-          <a:p>
-            <a:pPr marL="914400" lvl="1" indent="-457200" algn="just">
-              <a:buFont typeface="+mj-lt"/>
-              <a:buAutoNum type="arabicPeriod"/>
-            </a:pPr>
-            <a:r>
-              <a:rPr lang="es-MX" dirty="0"/>
-              <a:t>Entidades basadas en conceptos comerciales en lugar de estructuras de base de datos.</a:t>
-            </a:r>
-          </a:p>
-          <a:p>
-            <a:pPr marL="914400" lvl="1" indent="-457200" algn="just">
-              <a:buFont typeface="+mj-lt"/>
-              <a:buAutoNum type="arabicPeriod"/>
-            </a:pPr>
-            <a:r>
-              <a:rPr lang="es-MX" dirty="0"/>
-              <a:t>Gestión de transacciones y generación automática de claves.</a:t>
-            </a:r>
-          </a:p>
-          <a:p>
-            <a:pPr marL="914400" lvl="1" indent="-457200" algn="just">
-              <a:buFont typeface="+mj-lt"/>
-              <a:buAutoNum type="arabicPeriod"/>
-            </a:pPr>
-            <a:r>
-              <a:rPr lang="es-MX" dirty="0"/>
-              <a:t>Rápido desarrollo de una aplicación.</a:t>
-            </a:r>
-          </a:p>
-          <a:p>
-            <a:pPr algn="just"/>
-            <a:r>
-              <a:rPr lang="es-MX" b="1" dirty="0"/>
-              <a:t>JAVA ORM Frameworks</a:t>
-            </a:r>
-          </a:p>
-          <a:p>
-            <a:pPr lvl="1" algn="just">
-              <a:buFont typeface="Wingdings" panose="05000000000000000000" pitchFamily="2" charset="2"/>
-              <a:buChar char="q"/>
-            </a:pPr>
-            <a:r>
-              <a:rPr lang="es-MX" dirty="0"/>
-              <a:t>Java Data </a:t>
-            </a:r>
-            <a:r>
-              <a:rPr lang="es-MX" dirty="0" err="1"/>
-              <a:t>Objects</a:t>
-            </a:r>
-            <a:endParaRPr lang="es-MX" dirty="0"/>
-          </a:p>
-          <a:p>
-            <a:pPr lvl="1" algn="just">
-              <a:buFont typeface="Wingdings" panose="05000000000000000000" pitchFamily="2" charset="2"/>
-              <a:buChar char="q"/>
-            </a:pPr>
-            <a:r>
-              <a:rPr lang="es-MX" dirty="0"/>
-              <a:t>Castor</a:t>
-            </a:r>
-          </a:p>
-          <a:p>
-            <a:pPr lvl="1" algn="just">
-              <a:buFont typeface="Wingdings" panose="05000000000000000000" pitchFamily="2" charset="2"/>
-              <a:buChar char="q"/>
-            </a:pPr>
-            <a:r>
-              <a:rPr lang="es-MX" dirty="0" err="1"/>
-              <a:t>TopLink</a:t>
-            </a:r>
-            <a:endParaRPr lang="es-MX" dirty="0"/>
-          </a:p>
-          <a:p>
-            <a:pPr lvl="1" algn="just">
-              <a:buFont typeface="Wingdings" panose="05000000000000000000" pitchFamily="2" charset="2"/>
-              <a:buChar char="q"/>
-            </a:pPr>
-            <a:r>
-              <a:rPr lang="es-MX" dirty="0"/>
-              <a:t>Hibernate</a:t>
-            </a:r>
-          </a:p>
-          <a:p>
-            <a:pPr lvl="1" algn="just">
-              <a:buFont typeface="Wingdings" panose="05000000000000000000" pitchFamily="2" charset="2"/>
-              <a:buChar char="q"/>
-            </a:pPr>
-            <a:r>
-              <a:rPr lang="es-MX" dirty="0" err="1"/>
-              <a:t>SpringDAO</a:t>
-            </a:r>
-            <a:endParaRPr lang="es-MX" dirty="0"/>
-          </a:p>
-        </p:txBody>
-      </p:sp>
+              <a:t>Con Hibernate maneja el código de bajo nivel SQL, por lo que se minimiza la cantidad de código JDBC, por lo que Hibernate proporciona el objeto para el mapeo relacional y hace que sea fácil la recuperación e inserción de datos. </a:t>
+            </a:r>
+          </a:p>
+        </p:txBody>
+      </p:sp>
+      <p:sp>
+        <p:nvSpPr>
+          <p:cNvPr id="4" name="Diagrama de flujo: multidocumento 3">
+            <a:extLst>
+              <a:ext uri="{FF2B5EF4-FFF2-40B4-BE49-F238E27FC236}">
+                <a16:creationId xmlns:a16="http://schemas.microsoft.com/office/drawing/2014/main" id="{1AD0A7C6-1156-4C60-9FAA-4A0D36C1CD45}"/>
+              </a:ext>
+            </a:extLst>
+          </p:cNvPr>
+          <p:cNvSpPr/>
+          <p:nvPr/>
+        </p:nvSpPr>
+        <p:spPr>
+          <a:xfrm>
+            <a:off x="1178351" y="3685880"/>
+            <a:ext cx="2026762" cy="1640264"/>
+          </a:xfrm>
+          <a:prstGeom prst="flowChartMultidocument">
+            <a:avLst/>
+          </a:prstGeom>
+          <a:solidFill>
+            <a:schemeClr val="accent6">
+              <a:lumMod val="40000"/>
+              <a:lumOff val="60000"/>
+            </a:schemeClr>
+          </a:solidFill>
+          <a:ln>
+            <a:solidFill>
+              <a:schemeClr val="accent6">
+                <a:lumMod val="50000"/>
+              </a:schemeClr>
+            </a:solidFill>
+          </a:ln>
+        </p:spPr>
+        <p:style>
+          <a:lnRef idx="2">
+            <a:schemeClr val="accent1">
+              <a:shade val="50000"/>
+            </a:schemeClr>
+          </a:lnRef>
+          <a:fillRef idx="1">
+            <a:schemeClr val="accent1"/>
+          </a:fillRef>
+          <a:effectRef idx="0">
+            <a:schemeClr val="accent1"/>
+          </a:effectRef>
+          <a:fontRef idx="minor">
+            <a:schemeClr val="lt1"/>
+          </a:fontRef>
+        </p:style>
+        <p:txBody>
+          <a:bodyPr rtlCol="0" anchor="ctr"/>
+          <a:lstStyle/>
+          <a:p>
+            <a:pPr algn="ctr"/>
+            <a:r>
+              <a:rPr lang="es-MX" dirty="0">
+                <a:solidFill>
+                  <a:schemeClr val="tx1"/>
+                </a:solidFill>
+              </a:rPr>
+              <a:t>Java APP</a:t>
+            </a:r>
+          </a:p>
+        </p:txBody>
+      </p:sp>
+      <p:cxnSp>
+        <p:nvCxnSpPr>
+          <p:cNvPr id="6" name="Conector recto de flecha 5">
+            <a:extLst>
+              <a:ext uri="{FF2B5EF4-FFF2-40B4-BE49-F238E27FC236}">
+                <a16:creationId xmlns:a16="http://schemas.microsoft.com/office/drawing/2014/main" id="{7DDD3C45-CBA8-42EF-A14A-289DEF2EFDDB}"/>
+              </a:ext>
+            </a:extLst>
+          </p:cNvPr>
+          <p:cNvCxnSpPr>
+            <a:cxnSpLocks/>
+            <a:stCxn id="4" idx="3"/>
+            <a:endCxn id="7" idx="1"/>
+          </p:cNvCxnSpPr>
+          <p:nvPr/>
+        </p:nvCxnSpPr>
+        <p:spPr>
+          <a:xfrm flipV="1">
+            <a:off x="3205113" y="4487160"/>
+            <a:ext cx="2163452" cy="18852"/>
+          </a:xfrm>
+          <a:prstGeom prst="straightConnector1">
+            <a:avLst/>
+          </a:prstGeom>
+          <a:ln>
+            <a:tailEnd type="triangle"/>
+          </a:ln>
+        </p:spPr>
+        <p:style>
+          <a:lnRef idx="1">
+            <a:schemeClr val="accent1"/>
+          </a:lnRef>
+          <a:fillRef idx="0">
+            <a:schemeClr val="accent1"/>
+          </a:fillRef>
+          <a:effectRef idx="0">
+            <a:schemeClr val="accent1"/>
+          </a:effectRef>
+          <a:fontRef idx="minor">
+            <a:schemeClr val="tx1"/>
+          </a:fontRef>
+        </p:style>
+      </p:cxnSp>
+      <p:sp>
+        <p:nvSpPr>
+          <p:cNvPr id="7" name="Rectángulo: esquinas redondeadas 6">
+            <a:extLst>
+              <a:ext uri="{FF2B5EF4-FFF2-40B4-BE49-F238E27FC236}">
+                <a16:creationId xmlns:a16="http://schemas.microsoft.com/office/drawing/2014/main" id="{A279A973-6DFF-47FD-A9AF-5B38372B457E}"/>
+              </a:ext>
+            </a:extLst>
+          </p:cNvPr>
+          <p:cNvSpPr/>
+          <p:nvPr/>
+        </p:nvSpPr>
+        <p:spPr>
+          <a:xfrm>
+            <a:off x="5368565" y="4071432"/>
+            <a:ext cx="1739245" cy="831455"/>
+          </a:xfrm>
+          <a:prstGeom prst="roundRect">
+            <a:avLst/>
+          </a:prstGeom>
+          <a:solidFill>
+            <a:schemeClr val="accent5">
+              <a:lumMod val="40000"/>
+              <a:lumOff val="60000"/>
+            </a:schemeClr>
+          </a:solidFill>
+          <a:ln>
+            <a:solidFill>
+              <a:schemeClr val="accent5">
+                <a:lumMod val="50000"/>
+              </a:schemeClr>
+            </a:solidFill>
+          </a:ln>
+        </p:spPr>
+        <p:style>
+          <a:lnRef idx="2">
+            <a:schemeClr val="accent1">
+              <a:shade val="50000"/>
+            </a:schemeClr>
+          </a:lnRef>
+          <a:fillRef idx="1">
+            <a:schemeClr val="accent1"/>
+          </a:fillRef>
+          <a:effectRef idx="0">
+            <a:schemeClr val="accent1"/>
+          </a:effectRef>
+          <a:fontRef idx="minor">
+            <a:schemeClr val="lt1"/>
+          </a:fontRef>
+        </p:style>
+        <p:txBody>
+          <a:bodyPr rtlCol="0" anchor="ctr"/>
+          <a:lstStyle/>
+          <a:p>
+            <a:pPr algn="ctr"/>
+            <a:r>
+              <a:rPr lang="es-MX" dirty="0">
+                <a:solidFill>
+                  <a:schemeClr val="tx1"/>
+                </a:solidFill>
+              </a:rPr>
+              <a:t>HIBERNATE</a:t>
+            </a:r>
+          </a:p>
+        </p:txBody>
+      </p:sp>
+      <p:sp>
+        <p:nvSpPr>
+          <p:cNvPr id="13" name="Diagrama de flujo: disco magnético 12">
+            <a:extLst>
+              <a:ext uri="{FF2B5EF4-FFF2-40B4-BE49-F238E27FC236}">
+                <a16:creationId xmlns:a16="http://schemas.microsoft.com/office/drawing/2014/main" id="{A1F8D7DC-1D68-454A-BA44-9A5633E2D2DD}"/>
+              </a:ext>
+            </a:extLst>
+          </p:cNvPr>
+          <p:cNvSpPr/>
+          <p:nvPr/>
+        </p:nvSpPr>
+        <p:spPr>
+          <a:xfrm>
+            <a:off x="9327823" y="3779674"/>
+            <a:ext cx="1145356" cy="1452675"/>
+          </a:xfrm>
+          <a:prstGeom prst="flowChartMagneticDisk">
+            <a:avLst/>
+          </a:prstGeom>
+          <a:solidFill>
+            <a:schemeClr val="accent6">
+              <a:lumMod val="40000"/>
+              <a:lumOff val="60000"/>
+            </a:schemeClr>
+          </a:solidFill>
+          <a:ln>
+            <a:solidFill>
+              <a:schemeClr val="accent6">
+                <a:lumMod val="50000"/>
+              </a:schemeClr>
+            </a:solidFill>
+          </a:ln>
+        </p:spPr>
+        <p:style>
+          <a:lnRef idx="2">
+            <a:schemeClr val="accent1">
+              <a:shade val="50000"/>
+            </a:schemeClr>
+          </a:lnRef>
+          <a:fillRef idx="1">
+            <a:schemeClr val="accent1"/>
+          </a:fillRef>
+          <a:effectRef idx="0">
+            <a:schemeClr val="accent1"/>
+          </a:effectRef>
+          <a:fontRef idx="minor">
+            <a:schemeClr val="lt1"/>
+          </a:fontRef>
+        </p:style>
+        <p:txBody>
+          <a:bodyPr rtlCol="0" anchor="ctr"/>
+          <a:lstStyle/>
+          <a:p>
+            <a:pPr algn="ctr"/>
+            <a:r>
+              <a:rPr lang="es-MX" dirty="0">
+                <a:solidFill>
+                  <a:schemeClr val="tx1"/>
+                </a:solidFill>
+              </a:rPr>
+              <a:t>Database</a:t>
+            </a:r>
+          </a:p>
+        </p:txBody>
+      </p:sp>
+      <p:cxnSp>
+        <p:nvCxnSpPr>
+          <p:cNvPr id="15" name="Conector recto de flecha 14">
+            <a:extLst>
+              <a:ext uri="{FF2B5EF4-FFF2-40B4-BE49-F238E27FC236}">
+                <a16:creationId xmlns:a16="http://schemas.microsoft.com/office/drawing/2014/main" id="{61E35378-67A5-461F-BA17-CFDECED6E3FD}"/>
+              </a:ext>
+            </a:extLst>
+          </p:cNvPr>
+          <p:cNvCxnSpPr>
+            <a:cxnSpLocks/>
+            <a:stCxn id="7" idx="3"/>
+            <a:endCxn id="13" idx="2"/>
+          </p:cNvCxnSpPr>
+          <p:nvPr/>
+        </p:nvCxnSpPr>
+        <p:spPr>
+          <a:xfrm>
+            <a:off x="7107810" y="4487160"/>
+            <a:ext cx="2220013" cy="18852"/>
+          </a:xfrm>
+          <a:prstGeom prst="straightConnector1">
+            <a:avLst/>
+          </a:prstGeom>
+          <a:ln>
+            <a:tailEnd type="triangle"/>
+          </a:ln>
+        </p:spPr>
+        <p:style>
+          <a:lnRef idx="1">
+            <a:schemeClr val="accent1"/>
+          </a:lnRef>
+          <a:fillRef idx="0">
+            <a:schemeClr val="accent1"/>
+          </a:fillRef>
+          <a:effectRef idx="0">
+            <a:schemeClr val="accent1"/>
+          </a:effectRef>
+          <a:fontRef idx="minor">
+            <a:schemeClr val="tx1"/>
+          </a:fontRef>
+        </p:style>
+      </p:cxnSp>
     </p:spTree>
     <p:extLst>
       <p:ext uri="{BB962C8B-B14F-4D97-AF65-F5344CB8AC3E}">
-        <p14:creationId xmlns:p14="http://schemas.microsoft.com/office/powerpoint/2010/main" val="4194544621"/>
+        <p14:creationId xmlns:p14="http://schemas.microsoft.com/office/powerpoint/2010/main" val="2709381452"/>
       </p:ext>
     </p:extLst>
   </p:cSld>
@@ -4139,7 +4295,7 @@
           <p:cNvPr id="2" name="Título 1">
             <a:extLst>
               <a:ext uri="{FF2B5EF4-FFF2-40B4-BE49-F238E27FC236}">
-                <a16:creationId xmlns:a16="http://schemas.microsoft.com/office/drawing/2014/main" id="{7B1B380A-92E8-45CF-B6C0-43DC6E086888}"/>
+                <a16:creationId xmlns:a16="http://schemas.microsoft.com/office/drawing/2014/main" id="{94C7DEA8-8EE8-4B16-831B-08882F25D7A5}"/>
               </a:ext>
             </a:extLst>
           </p:cNvPr>
@@ -4155,7 +4311,10 @@
           <a:bodyPr/>
           <a:lstStyle/>
           <a:p>
-            <a:endParaRPr lang="es-MX" dirty="0"/>
+            <a:r>
+              <a:rPr lang="es-MX" b="1" dirty="0"/>
+              <a:t>ORM con Hibernate</a:t>
+            </a:r>
           </a:p>
         </p:txBody>
       </p:sp>
@@ -4164,7 +4323,7 @@
           <p:cNvPr id="3" name="Marcador de contenido 2">
             <a:extLst>
               <a:ext uri="{FF2B5EF4-FFF2-40B4-BE49-F238E27FC236}">
-                <a16:creationId xmlns:a16="http://schemas.microsoft.com/office/drawing/2014/main" id="{616B1D78-C0C6-440A-AA7E-9178F0430AC8}"/>
+                <a16:creationId xmlns:a16="http://schemas.microsoft.com/office/drawing/2014/main" id="{DAB08C85-835B-438F-B866-E3FED749F574}"/>
               </a:ext>
             </a:extLst>
           </p:cNvPr>
@@ -4175,19 +4334,3201 @@
             <p:ph idx="1"/>
           </p:nvPr>
         </p:nvSpPr>
-        <p:spPr/>
+        <p:spPr>
+          <a:xfrm>
+            <a:off x="838200" y="1295570"/>
+            <a:ext cx="10515600" cy="1108265"/>
+          </a:xfrm>
+        </p:spPr>
         <p:txBody>
           <a:bodyPr/>
           <a:lstStyle/>
           <a:p>
-            <a:endParaRPr lang="es-MX"/>
+            <a:r>
+              <a:rPr lang="es-MX" dirty="0"/>
+              <a:t>El programador define a Hibernate el mapeo de la clase u objeto JAVA como se asignan los datos a la base de datos. Entonces esa clase u objeto JAVA será asignada a una tabla determinada. </a:t>
+            </a:r>
+          </a:p>
+        </p:txBody>
+      </p:sp>
+      <p:pic>
+        <p:nvPicPr>
+          <p:cNvPr id="5" name="Imagen 4">
+            <a:extLst>
+              <a:ext uri="{FF2B5EF4-FFF2-40B4-BE49-F238E27FC236}">
+                <a16:creationId xmlns:a16="http://schemas.microsoft.com/office/drawing/2014/main" id="{85E7E41E-3C4E-496C-B60C-3C18A613826B}"/>
+              </a:ext>
+            </a:extLst>
+          </p:cNvPr>
+          <p:cNvPicPr>
+            <a:picLocks noChangeAspect="1"/>
+          </p:cNvPicPr>
+          <p:nvPr/>
+        </p:nvPicPr>
+        <p:blipFill>
+          <a:blip r:embed="rId2"/>
+          <a:stretch>
+            <a:fillRect/>
+          </a:stretch>
+        </p:blipFill>
+        <p:spPr>
+          <a:xfrm>
+            <a:off x="9268365" y="2636222"/>
+            <a:ext cx="2085435" cy="1585555"/>
+          </a:xfrm>
+          <a:prstGeom prst="rect">
+            <a:avLst/>
+          </a:prstGeom>
+        </p:spPr>
+      </p:pic>
+      <p:sp>
+        <p:nvSpPr>
+          <p:cNvPr id="6" name="Rectángulo: esquinas redondeadas 5">
+            <a:extLst>
+              <a:ext uri="{FF2B5EF4-FFF2-40B4-BE49-F238E27FC236}">
+                <a16:creationId xmlns:a16="http://schemas.microsoft.com/office/drawing/2014/main" id="{347CB76C-30C9-4009-BC6C-271B89B0851F}"/>
+              </a:ext>
+            </a:extLst>
+          </p:cNvPr>
+          <p:cNvSpPr/>
+          <p:nvPr/>
+        </p:nvSpPr>
+        <p:spPr>
+          <a:xfrm>
+            <a:off x="5302577" y="3013271"/>
+            <a:ext cx="1739245" cy="831455"/>
+          </a:xfrm>
+          <a:prstGeom prst="roundRect">
+            <a:avLst/>
+          </a:prstGeom>
+          <a:solidFill>
+            <a:schemeClr val="accent5">
+              <a:lumMod val="40000"/>
+              <a:lumOff val="60000"/>
+            </a:schemeClr>
+          </a:solidFill>
+          <a:ln>
+            <a:solidFill>
+              <a:schemeClr val="accent5">
+                <a:lumMod val="50000"/>
+              </a:schemeClr>
+            </a:solidFill>
+          </a:ln>
+        </p:spPr>
+        <p:style>
+          <a:lnRef idx="2">
+            <a:schemeClr val="accent1">
+              <a:shade val="50000"/>
+            </a:schemeClr>
+          </a:lnRef>
+          <a:fillRef idx="1">
+            <a:schemeClr val="accent1"/>
+          </a:fillRef>
+          <a:effectRef idx="0">
+            <a:schemeClr val="accent1"/>
+          </a:effectRef>
+          <a:fontRef idx="minor">
+            <a:schemeClr val="lt1"/>
+          </a:fontRef>
+        </p:style>
+        <p:txBody>
+          <a:bodyPr rtlCol="0" anchor="ctr"/>
+          <a:lstStyle/>
+          <a:p>
+            <a:pPr algn="ctr"/>
+            <a:r>
+              <a:rPr lang="es-MX" dirty="0">
+                <a:solidFill>
+                  <a:schemeClr val="tx1"/>
+                </a:solidFill>
+              </a:rPr>
+              <a:t>HIBERNATE</a:t>
+            </a:r>
+          </a:p>
+        </p:txBody>
+      </p:sp>
+      <p:pic>
+        <p:nvPicPr>
+          <p:cNvPr id="8" name="Imagen 7">
+            <a:extLst>
+              <a:ext uri="{FF2B5EF4-FFF2-40B4-BE49-F238E27FC236}">
+                <a16:creationId xmlns:a16="http://schemas.microsoft.com/office/drawing/2014/main" id="{5AE6060A-0835-4886-93F5-7D103CE9E6F0}"/>
+              </a:ext>
+            </a:extLst>
+          </p:cNvPr>
+          <p:cNvPicPr>
+            <a:picLocks noChangeAspect="1"/>
+          </p:cNvPicPr>
+          <p:nvPr/>
+        </p:nvPicPr>
+        <p:blipFill>
+          <a:blip r:embed="rId3"/>
+          <a:stretch>
+            <a:fillRect/>
+          </a:stretch>
+        </p:blipFill>
+        <p:spPr>
+          <a:xfrm>
+            <a:off x="1243404" y="2612052"/>
+            <a:ext cx="1895475" cy="1609725"/>
+          </a:xfrm>
+          <a:prstGeom prst="rect">
+            <a:avLst/>
+          </a:prstGeom>
+        </p:spPr>
+      </p:pic>
+      <p:cxnSp>
+        <p:nvCxnSpPr>
+          <p:cNvPr id="12" name="Conector recto de flecha 11">
+            <a:extLst>
+              <a:ext uri="{FF2B5EF4-FFF2-40B4-BE49-F238E27FC236}">
+                <a16:creationId xmlns:a16="http://schemas.microsoft.com/office/drawing/2014/main" id="{E1823F5B-595D-4138-B17D-16D4D939098D}"/>
+              </a:ext>
+            </a:extLst>
+          </p:cNvPr>
+          <p:cNvCxnSpPr/>
+          <p:nvPr/>
+        </p:nvCxnSpPr>
+        <p:spPr>
+          <a:xfrm>
+            <a:off x="3223967" y="3205113"/>
+            <a:ext cx="1819373" cy="0"/>
+          </a:xfrm>
+          <a:prstGeom prst="straightConnector1">
+            <a:avLst/>
+          </a:prstGeom>
+          <a:ln w="38100">
+            <a:tailEnd type="triangle"/>
+          </a:ln>
+        </p:spPr>
+        <p:style>
+          <a:lnRef idx="1">
+            <a:schemeClr val="accent1"/>
+          </a:lnRef>
+          <a:fillRef idx="0">
+            <a:schemeClr val="accent1"/>
+          </a:fillRef>
+          <a:effectRef idx="0">
+            <a:schemeClr val="accent1"/>
+          </a:effectRef>
+          <a:fontRef idx="minor">
+            <a:schemeClr val="tx1"/>
+          </a:fontRef>
+        </p:style>
+      </p:cxnSp>
+      <p:cxnSp>
+        <p:nvCxnSpPr>
+          <p:cNvPr id="13" name="Conector recto de flecha 12">
+            <a:extLst>
+              <a:ext uri="{FF2B5EF4-FFF2-40B4-BE49-F238E27FC236}">
+                <a16:creationId xmlns:a16="http://schemas.microsoft.com/office/drawing/2014/main" id="{A1F79A45-E9CC-41C3-B32D-D4E15CD2771E}"/>
+              </a:ext>
+            </a:extLst>
+          </p:cNvPr>
+          <p:cNvCxnSpPr/>
+          <p:nvPr/>
+        </p:nvCxnSpPr>
+        <p:spPr>
+          <a:xfrm>
+            <a:off x="7269637" y="3205113"/>
+            <a:ext cx="1819373" cy="0"/>
+          </a:xfrm>
+          <a:prstGeom prst="straightConnector1">
+            <a:avLst/>
+          </a:prstGeom>
+          <a:ln w="38100">
+            <a:tailEnd type="triangle"/>
+          </a:ln>
+        </p:spPr>
+        <p:style>
+          <a:lnRef idx="1">
+            <a:schemeClr val="accent1"/>
+          </a:lnRef>
+          <a:fillRef idx="0">
+            <a:schemeClr val="accent1"/>
+          </a:fillRef>
+          <a:effectRef idx="0">
+            <a:schemeClr val="accent1"/>
+          </a:effectRef>
+          <a:fontRef idx="minor">
+            <a:schemeClr val="tx1"/>
+          </a:fontRef>
+        </p:style>
+      </p:cxnSp>
+      <p:cxnSp>
+        <p:nvCxnSpPr>
+          <p:cNvPr id="15" name="Conector recto de flecha 14">
+            <a:extLst>
+              <a:ext uri="{FF2B5EF4-FFF2-40B4-BE49-F238E27FC236}">
+                <a16:creationId xmlns:a16="http://schemas.microsoft.com/office/drawing/2014/main" id="{3D39339F-A711-492C-92F5-8106974099B5}"/>
+              </a:ext>
+            </a:extLst>
+          </p:cNvPr>
+          <p:cNvCxnSpPr/>
+          <p:nvPr/>
+        </p:nvCxnSpPr>
+        <p:spPr>
+          <a:xfrm flipH="1">
+            <a:off x="7268066" y="3610466"/>
+            <a:ext cx="1781666" cy="0"/>
+          </a:xfrm>
+          <a:prstGeom prst="straightConnector1">
+            <a:avLst/>
+          </a:prstGeom>
+          <a:ln w="38100">
+            <a:tailEnd type="triangle"/>
+          </a:ln>
+        </p:spPr>
+        <p:style>
+          <a:lnRef idx="1">
+            <a:schemeClr val="accent1"/>
+          </a:lnRef>
+          <a:fillRef idx="0">
+            <a:schemeClr val="accent1"/>
+          </a:fillRef>
+          <a:effectRef idx="0">
+            <a:schemeClr val="accent1"/>
+          </a:effectRef>
+          <a:fontRef idx="minor">
+            <a:schemeClr val="tx1"/>
+          </a:fontRef>
+        </p:style>
+      </p:cxnSp>
+      <p:cxnSp>
+        <p:nvCxnSpPr>
+          <p:cNvPr id="16" name="Conector recto de flecha 15">
+            <a:extLst>
+              <a:ext uri="{FF2B5EF4-FFF2-40B4-BE49-F238E27FC236}">
+                <a16:creationId xmlns:a16="http://schemas.microsoft.com/office/drawing/2014/main" id="{87581C10-B3AE-4EE9-8064-AFD12F97492D}"/>
+              </a:ext>
+            </a:extLst>
+          </p:cNvPr>
+          <p:cNvCxnSpPr/>
+          <p:nvPr/>
+        </p:nvCxnSpPr>
+        <p:spPr>
+          <a:xfrm flipH="1">
+            <a:off x="3261674" y="3610466"/>
+            <a:ext cx="1781666" cy="0"/>
+          </a:xfrm>
+          <a:prstGeom prst="straightConnector1">
+            <a:avLst/>
+          </a:prstGeom>
+          <a:ln w="38100">
+            <a:tailEnd type="triangle"/>
+          </a:ln>
+        </p:spPr>
+        <p:style>
+          <a:lnRef idx="1">
+            <a:schemeClr val="accent1"/>
+          </a:lnRef>
+          <a:fillRef idx="0">
+            <a:schemeClr val="accent1"/>
+          </a:fillRef>
+          <a:effectRef idx="0">
+            <a:schemeClr val="accent1"/>
+          </a:effectRef>
+          <a:fontRef idx="minor">
+            <a:schemeClr val="tx1"/>
+          </a:fontRef>
+        </p:style>
+      </p:cxnSp>
+      <p:sp>
+        <p:nvSpPr>
+          <p:cNvPr id="17" name="Marcador de contenido 2">
+            <a:extLst>
+              <a:ext uri="{FF2B5EF4-FFF2-40B4-BE49-F238E27FC236}">
+                <a16:creationId xmlns:a16="http://schemas.microsoft.com/office/drawing/2014/main" id="{6231E887-B66E-4D17-845F-4BCF2A4316C1}"/>
+              </a:ext>
+            </a:extLst>
+          </p:cNvPr>
+          <p:cNvSpPr txBox="1">
+            <a:spLocks/>
+          </p:cNvSpPr>
+          <p:nvPr/>
+        </p:nvSpPr>
+        <p:spPr>
+          <a:xfrm>
+            <a:off x="838200" y="4646004"/>
+            <a:ext cx="10515600" cy="1471992"/>
+          </a:xfrm>
+          <a:prstGeom prst="rect">
+            <a:avLst/>
+          </a:prstGeom>
+        </p:spPr>
+        <p:txBody>
+          <a:bodyPr vert="horz" lIns="91440" tIns="45720" rIns="91440" bIns="45720" rtlCol="0">
+            <a:noAutofit/>
+          </a:bodyPr>
+          <a:lstStyle>
+            <a:lvl1pPr marL="228600" indent="-228600" algn="l" defTabSz="914400" rtl="0" eaLnBrk="1" latinLnBrk="0" hangingPunct="1">
+              <a:lnSpc>
+                <a:spcPct val="90000"/>
+              </a:lnSpc>
+              <a:spcBef>
+                <a:spcPts val="1000"/>
+              </a:spcBef>
+              <a:buFont typeface="Arial" panose="020B0604020202020204" pitchFamily="34" charset="0"/>
+              <a:buChar char="•"/>
+              <a:defRPr sz="2000" kern="1200">
+                <a:solidFill>
+                  <a:schemeClr val="tx1"/>
+                </a:solidFill>
+                <a:latin typeface="+mn-lt"/>
+                <a:ea typeface="+mn-ea"/>
+                <a:cs typeface="+mn-cs"/>
+              </a:defRPr>
+            </a:lvl1pPr>
+            <a:lvl2pPr marL="685800" indent="-228600" algn="l" defTabSz="914400" rtl="0" eaLnBrk="1" latinLnBrk="0" hangingPunct="1">
+              <a:lnSpc>
+                <a:spcPct val="90000"/>
+              </a:lnSpc>
+              <a:spcBef>
+                <a:spcPts val="500"/>
+              </a:spcBef>
+              <a:buFont typeface="Arial" panose="020B0604020202020204" pitchFamily="34" charset="0"/>
+              <a:buChar char="•"/>
+              <a:defRPr sz="2000" kern="1200">
+                <a:solidFill>
+                  <a:schemeClr val="tx1"/>
+                </a:solidFill>
+                <a:latin typeface="+mn-lt"/>
+                <a:ea typeface="+mn-ea"/>
+                <a:cs typeface="+mn-cs"/>
+              </a:defRPr>
+            </a:lvl2pPr>
+            <a:lvl3pPr marL="1143000" indent="-228600" algn="l" defTabSz="914400" rtl="0" eaLnBrk="1" latinLnBrk="0" hangingPunct="1">
+              <a:lnSpc>
+                <a:spcPct val="90000"/>
+              </a:lnSpc>
+              <a:spcBef>
+                <a:spcPts val="500"/>
+              </a:spcBef>
+              <a:buFont typeface="Arial" panose="020B0604020202020204" pitchFamily="34" charset="0"/>
+              <a:buChar char="•"/>
+              <a:defRPr sz="2000" kern="1200">
+                <a:solidFill>
+                  <a:schemeClr val="tx1"/>
+                </a:solidFill>
+                <a:latin typeface="+mn-lt"/>
+                <a:ea typeface="+mn-ea"/>
+                <a:cs typeface="+mn-cs"/>
+              </a:defRPr>
+            </a:lvl3pPr>
+            <a:lvl4pPr marL="1600200" indent="-228600" algn="l" defTabSz="914400" rtl="0" eaLnBrk="1" latinLnBrk="0" hangingPunct="1">
+              <a:lnSpc>
+                <a:spcPct val="90000"/>
+              </a:lnSpc>
+              <a:spcBef>
+                <a:spcPts val="500"/>
+              </a:spcBef>
+              <a:buFont typeface="Arial" panose="020B0604020202020204" pitchFamily="34" charset="0"/>
+              <a:buChar char="•"/>
+              <a:defRPr sz="2000" kern="1200">
+                <a:solidFill>
+                  <a:schemeClr val="tx1"/>
+                </a:solidFill>
+                <a:latin typeface="+mn-lt"/>
+                <a:ea typeface="+mn-ea"/>
+                <a:cs typeface="+mn-cs"/>
+              </a:defRPr>
+            </a:lvl4pPr>
+            <a:lvl5pPr marL="2057400" indent="-228600" algn="l" defTabSz="914400" rtl="0" eaLnBrk="1" latinLnBrk="0" hangingPunct="1">
+              <a:lnSpc>
+                <a:spcPct val="90000"/>
+              </a:lnSpc>
+              <a:spcBef>
+                <a:spcPts val="500"/>
+              </a:spcBef>
+              <a:buFont typeface="Arial" panose="020B0604020202020204" pitchFamily="34" charset="0"/>
+              <a:buChar char="•"/>
+              <a:defRPr sz="2000" kern="1200">
+                <a:solidFill>
+                  <a:schemeClr val="tx1"/>
+                </a:solidFill>
+                <a:latin typeface="+mn-lt"/>
+                <a:ea typeface="+mn-ea"/>
+                <a:cs typeface="+mn-cs"/>
+              </a:defRPr>
+            </a:lvl5pPr>
+            <a:lvl6pPr marL="2514600" indent="-228600" algn="l" defTabSz="914400" rtl="0" eaLnBrk="1" latinLnBrk="0" hangingPunct="1">
+              <a:lnSpc>
+                <a:spcPct val="90000"/>
+              </a:lnSpc>
+              <a:spcBef>
+                <a:spcPts val="500"/>
+              </a:spcBef>
+              <a:buFont typeface="Arial" panose="020B0604020202020204" pitchFamily="34" charset="0"/>
+              <a:buChar char="•"/>
+              <a:defRPr sz="1800" kern="1200">
+                <a:solidFill>
+                  <a:schemeClr val="tx1"/>
+                </a:solidFill>
+                <a:latin typeface="+mn-lt"/>
+                <a:ea typeface="+mn-ea"/>
+                <a:cs typeface="+mn-cs"/>
+              </a:defRPr>
+            </a:lvl6pPr>
+            <a:lvl7pPr marL="2971800" indent="-228600" algn="l" defTabSz="914400" rtl="0" eaLnBrk="1" latinLnBrk="0" hangingPunct="1">
+              <a:lnSpc>
+                <a:spcPct val="90000"/>
+              </a:lnSpc>
+              <a:spcBef>
+                <a:spcPts val="500"/>
+              </a:spcBef>
+              <a:buFont typeface="Arial" panose="020B0604020202020204" pitchFamily="34" charset="0"/>
+              <a:buChar char="•"/>
+              <a:defRPr sz="1800" kern="1200">
+                <a:solidFill>
+                  <a:schemeClr val="tx1"/>
+                </a:solidFill>
+                <a:latin typeface="+mn-lt"/>
+                <a:ea typeface="+mn-ea"/>
+                <a:cs typeface="+mn-cs"/>
+              </a:defRPr>
+            </a:lvl7pPr>
+            <a:lvl8pPr marL="3429000" indent="-228600" algn="l" defTabSz="914400" rtl="0" eaLnBrk="1" latinLnBrk="0" hangingPunct="1">
+              <a:lnSpc>
+                <a:spcPct val="90000"/>
+              </a:lnSpc>
+              <a:spcBef>
+                <a:spcPts val="500"/>
+              </a:spcBef>
+              <a:buFont typeface="Arial" panose="020B0604020202020204" pitchFamily="34" charset="0"/>
+              <a:buChar char="•"/>
+              <a:defRPr sz="1800" kern="1200">
+                <a:solidFill>
+                  <a:schemeClr val="tx1"/>
+                </a:solidFill>
+                <a:latin typeface="+mn-lt"/>
+                <a:ea typeface="+mn-ea"/>
+                <a:cs typeface="+mn-cs"/>
+              </a:defRPr>
+            </a:lvl8pPr>
+            <a:lvl9pPr marL="3886200" indent="-228600" algn="l" defTabSz="914400" rtl="0" eaLnBrk="1" latinLnBrk="0" hangingPunct="1">
+              <a:lnSpc>
+                <a:spcPct val="90000"/>
+              </a:lnSpc>
+              <a:spcBef>
+                <a:spcPts val="500"/>
+              </a:spcBef>
+              <a:buFont typeface="Arial" panose="020B0604020202020204" pitchFamily="34" charset="0"/>
+              <a:buChar char="•"/>
+              <a:defRPr sz="1800" kern="1200">
+                <a:solidFill>
+                  <a:schemeClr val="tx1"/>
+                </a:solidFill>
+                <a:latin typeface="+mn-lt"/>
+                <a:ea typeface="+mn-ea"/>
+                <a:cs typeface="+mn-cs"/>
+              </a:defRPr>
+            </a:lvl9pPr>
+          </a:lstStyle>
+          <a:p>
+            <a:r>
+              <a:rPr lang="es-MX" dirty="0"/>
+              <a:t>Con Hibernate indicamos que la clase Java dominara y configurara la tabla en la base de datos. </a:t>
+            </a:r>
+          </a:p>
+          <a:p>
+            <a:r>
+              <a:rPr lang="es-MX" dirty="0"/>
+              <a:t>Configurar el mapeo se realiza a través de un archivo de configuración ya sea a través de XML o Annotations Java. </a:t>
+            </a:r>
+          </a:p>
+        </p:txBody>
+      </p:sp>
+      <p:sp>
+        <p:nvSpPr>
+          <p:cNvPr id="18" name="CuadroTexto 17">
+            <a:extLst>
+              <a:ext uri="{FF2B5EF4-FFF2-40B4-BE49-F238E27FC236}">
+                <a16:creationId xmlns:a16="http://schemas.microsoft.com/office/drawing/2014/main" id="{3D4ADB07-53B7-4A70-80F4-21CD5539192A}"/>
+              </a:ext>
+            </a:extLst>
+          </p:cNvPr>
+          <p:cNvSpPr txBox="1"/>
+          <p:nvPr/>
+        </p:nvSpPr>
+        <p:spPr>
+          <a:xfrm>
+            <a:off x="1243404" y="2259765"/>
+            <a:ext cx="1895475" cy="369332"/>
+          </a:xfrm>
+          <a:prstGeom prst="rect">
+            <a:avLst/>
+          </a:prstGeom>
+          <a:noFill/>
+        </p:spPr>
+        <p:txBody>
+          <a:bodyPr wrap="square" rtlCol="0">
+            <a:spAutoFit/>
+          </a:bodyPr>
+          <a:lstStyle/>
+          <a:p>
+            <a:pPr algn="ctr"/>
+            <a:r>
+              <a:rPr lang="es-MX" b="1" dirty="0"/>
+              <a:t>Java Class</a:t>
+            </a:r>
+          </a:p>
+        </p:txBody>
+      </p:sp>
+      <p:sp>
+        <p:nvSpPr>
+          <p:cNvPr id="19" name="CuadroTexto 18">
+            <a:extLst>
+              <a:ext uri="{FF2B5EF4-FFF2-40B4-BE49-F238E27FC236}">
+                <a16:creationId xmlns:a16="http://schemas.microsoft.com/office/drawing/2014/main" id="{6ABD560A-BB79-4D4B-9328-1FCF1EF5A862}"/>
+              </a:ext>
+            </a:extLst>
+          </p:cNvPr>
+          <p:cNvSpPr txBox="1"/>
+          <p:nvPr/>
+        </p:nvSpPr>
+        <p:spPr>
+          <a:xfrm>
+            <a:off x="9226176" y="2266890"/>
+            <a:ext cx="2169811" cy="369332"/>
+          </a:xfrm>
+          <a:prstGeom prst="rect">
+            <a:avLst/>
+          </a:prstGeom>
+          <a:noFill/>
+        </p:spPr>
+        <p:txBody>
+          <a:bodyPr wrap="square" rtlCol="0">
+            <a:spAutoFit/>
+          </a:bodyPr>
+          <a:lstStyle/>
+          <a:p>
+            <a:pPr algn="ctr"/>
+            <a:r>
+              <a:rPr lang="es-MX" b="1" dirty="0"/>
+              <a:t>Database Table</a:t>
+            </a:r>
           </a:p>
         </p:txBody>
       </p:sp>
     </p:spTree>
     <p:extLst>
       <p:ext uri="{BB962C8B-B14F-4D97-AF65-F5344CB8AC3E}">
-        <p14:creationId xmlns:p14="http://schemas.microsoft.com/office/powerpoint/2010/main" val="2709381452"/>
+        <p14:creationId xmlns:p14="http://schemas.microsoft.com/office/powerpoint/2010/main" val="1796522335"/>
+      </p:ext>
+    </p:extLst>
+  </p:cSld>
+  <p:clrMapOvr>
+    <a:masterClrMapping/>
+  </p:clrMapOvr>
+</p:sld>
+</file>
+
+<file path=ppt/slides/slide12.xml><?xml version="1.0" encoding="utf-8"?>
+<p:sld xmlns:a="http://schemas.openxmlformats.org/drawingml/2006/main" xmlns:r="http://schemas.openxmlformats.org/officeDocument/2006/relationships" xmlns:p="http://schemas.openxmlformats.org/presentationml/2006/main">
+  <p:cSld>
+    <p:spTree>
+      <p:nvGrpSpPr>
+        <p:cNvPr id="1" name=""/>
+        <p:cNvGrpSpPr/>
+        <p:nvPr/>
+      </p:nvGrpSpPr>
+      <p:grpSpPr>
+        <a:xfrm>
+          <a:off x="0" y="0"/>
+          <a:ext cx="0" cy="0"/>
+          <a:chOff x="0" y="0"/>
+          <a:chExt cx="0" cy="0"/>
+        </a:xfrm>
+      </p:grpSpPr>
+      <p:sp>
+        <p:nvSpPr>
+          <p:cNvPr id="2" name="Título 1">
+            <a:extLst>
+              <a:ext uri="{FF2B5EF4-FFF2-40B4-BE49-F238E27FC236}">
+                <a16:creationId xmlns:a16="http://schemas.microsoft.com/office/drawing/2014/main" id="{31FC0BD0-7DCC-4F1C-A839-51DAA1C3E8A4}"/>
+              </a:ext>
+            </a:extLst>
+          </p:cNvPr>
+          <p:cNvSpPr>
+            <a:spLocks noGrp="1"/>
+          </p:cNvSpPr>
+          <p:nvPr>
+            <p:ph type="title"/>
+          </p:nvPr>
+        </p:nvSpPr>
+        <p:spPr/>
+        <p:txBody>
+          <a:bodyPr/>
+          <a:lstStyle/>
+          <a:p>
+            <a:r>
+              <a:rPr lang="es-MX" b="1" dirty="0"/>
+              <a:t>De forma gráfica…</a:t>
+            </a:r>
+          </a:p>
+        </p:txBody>
+      </p:sp>
+      <p:graphicFrame>
+        <p:nvGraphicFramePr>
+          <p:cNvPr id="6" name="Tabla 6">
+            <a:extLst>
+              <a:ext uri="{FF2B5EF4-FFF2-40B4-BE49-F238E27FC236}">
+                <a16:creationId xmlns:a16="http://schemas.microsoft.com/office/drawing/2014/main" id="{C6789225-CA7B-4D3D-B0E9-D93F3DB94C42}"/>
+              </a:ext>
+            </a:extLst>
+          </p:cNvPr>
+          <p:cNvGraphicFramePr>
+            <a:graphicFrameLocks noGrp="1"/>
+          </p:cNvGraphicFramePr>
+          <p:nvPr>
+            <p:extLst>
+              <p:ext uri="{D42A27DB-BD31-4B8C-83A1-F6EECF244321}">
+                <p14:modId xmlns:p14="http://schemas.microsoft.com/office/powerpoint/2010/main" val="3768850272"/>
+              </p:ext>
+            </p:extLst>
+          </p:nvPr>
+        </p:nvGraphicFramePr>
+        <p:xfrm>
+          <a:off x="841900" y="2496757"/>
+          <a:ext cx="4199118" cy="1809056"/>
+        </p:xfrm>
+        <a:graphic>
+          <a:graphicData uri="http://schemas.openxmlformats.org/drawingml/2006/table">
+            <a:tbl>
+              <a:tblPr firstRow="1" bandRow="1">
+                <a:tableStyleId>{2D5ABB26-0587-4C30-8999-92F81FD0307C}</a:tableStyleId>
+              </a:tblPr>
+              <a:tblGrid>
+                <a:gridCol w="2099559">
+                  <a:extLst>
+                    <a:ext uri="{9D8B030D-6E8A-4147-A177-3AD203B41FA5}">
+                      <a16:colId xmlns:a16="http://schemas.microsoft.com/office/drawing/2014/main" val="2507083078"/>
+                    </a:ext>
+                  </a:extLst>
+                </a:gridCol>
+                <a:gridCol w="2099559">
+                  <a:extLst>
+                    <a:ext uri="{9D8B030D-6E8A-4147-A177-3AD203B41FA5}">
+                      <a16:colId xmlns:a16="http://schemas.microsoft.com/office/drawing/2014/main" val="594498304"/>
+                    </a:ext>
+                  </a:extLst>
+                </a:gridCol>
+              </a:tblGrid>
+              <a:tr h="584488">
+                <a:tc>
+                  <a:txBody>
+                    <a:bodyPr/>
+                    <a:lstStyle/>
+                    <a:p>
+                      <a:pPr algn="ctr"/>
+                      <a:r>
+                        <a:rPr lang="es-MX" dirty="0">
+                          <a:solidFill>
+                            <a:sysClr val="windowText" lastClr="000000"/>
+                          </a:solidFill>
+                        </a:rPr>
+                        <a:t>JAVA Persistence API</a:t>
+                      </a:r>
+                    </a:p>
+                  </a:txBody>
+                  <a:tcPr anchor="ctr">
+                    <a:lnL w="12700" cap="flat" cmpd="sng" algn="ctr">
+                      <a:solidFill>
+                        <a:schemeClr val="tx1"/>
+                      </a:solidFill>
+                      <a:prstDash val="solid"/>
+                      <a:round/>
+                      <a:headEnd type="none" w="med" len="med"/>
+                      <a:tailEnd type="none" w="med" len="med"/>
+                    </a:lnL>
+                    <a:lnR w="12700" cap="flat" cmpd="sng" algn="ctr">
+                      <a:solidFill>
+                        <a:schemeClr val="tx1"/>
+                      </a:solidFill>
+                      <a:prstDash val="solid"/>
+                      <a:round/>
+                      <a:headEnd type="none" w="med" len="med"/>
+                      <a:tailEnd type="none" w="med" len="med"/>
+                    </a:lnR>
+                    <a:lnT w="12700" cap="flat" cmpd="sng" algn="ctr">
+                      <a:solidFill>
+                        <a:schemeClr val="tx1"/>
+                      </a:solidFill>
+                      <a:prstDash val="solid"/>
+                      <a:round/>
+                      <a:headEnd type="none" w="med" len="med"/>
+                      <a:tailEnd type="none" w="med" len="med"/>
+                    </a:lnT>
+                    <a:lnB w="12700" cap="flat" cmpd="sng" algn="ctr">
+                      <a:solidFill>
+                        <a:schemeClr val="tx1"/>
+                      </a:solidFill>
+                      <a:prstDash val="solid"/>
+                      <a:round/>
+                      <a:headEnd type="none" w="med" len="med"/>
+                      <a:tailEnd type="none" w="med" len="med"/>
+                    </a:lnB>
+                    <a:solidFill>
+                      <a:schemeClr val="accent2">
+                        <a:lumMod val="40000"/>
+                        <a:lumOff val="60000"/>
+                      </a:schemeClr>
+                    </a:solidFill>
+                  </a:tcPr>
+                </a:tc>
+                <a:tc>
+                  <a:txBody>
+                    <a:bodyPr/>
+                    <a:lstStyle/>
+                    <a:p>
+                      <a:pPr algn="ctr"/>
+                      <a:r>
+                        <a:rPr lang="es-MX" dirty="0">
+                          <a:solidFill>
+                            <a:sysClr val="windowText" lastClr="000000"/>
+                          </a:solidFill>
+                        </a:rPr>
+                        <a:t>Hibernate Native API</a:t>
+                      </a:r>
+                    </a:p>
+                  </a:txBody>
+                  <a:tcPr anchor="ctr">
+                    <a:lnL w="12700" cap="flat" cmpd="sng" algn="ctr">
+                      <a:solidFill>
+                        <a:schemeClr val="tx1"/>
+                      </a:solidFill>
+                      <a:prstDash val="solid"/>
+                      <a:round/>
+                      <a:headEnd type="none" w="med" len="med"/>
+                      <a:tailEnd type="none" w="med" len="med"/>
+                    </a:lnL>
+                    <a:lnR w="12700" cap="flat" cmpd="sng" algn="ctr">
+                      <a:solidFill>
+                        <a:schemeClr val="tx1"/>
+                      </a:solidFill>
+                      <a:prstDash val="solid"/>
+                      <a:round/>
+                      <a:headEnd type="none" w="med" len="med"/>
+                      <a:tailEnd type="none" w="med" len="med"/>
+                    </a:lnR>
+                    <a:lnT w="12700" cap="flat" cmpd="sng" algn="ctr">
+                      <a:solidFill>
+                        <a:schemeClr val="tx1"/>
+                      </a:solidFill>
+                      <a:prstDash val="solid"/>
+                      <a:round/>
+                      <a:headEnd type="none" w="med" len="med"/>
+                      <a:tailEnd type="none" w="med" len="med"/>
+                    </a:lnT>
+                    <a:lnB w="12700" cap="flat" cmpd="sng" algn="ctr">
+                      <a:solidFill>
+                        <a:schemeClr val="tx1"/>
+                      </a:solidFill>
+                      <a:prstDash val="solid"/>
+                      <a:round/>
+                      <a:headEnd type="none" w="med" len="med"/>
+                      <a:tailEnd type="none" w="med" len="med"/>
+                    </a:lnB>
+                    <a:solidFill>
+                      <a:schemeClr val="accent2">
+                        <a:lumMod val="40000"/>
+                        <a:lumOff val="60000"/>
+                      </a:schemeClr>
+                    </a:solidFill>
+                  </a:tcPr>
+                </a:tc>
+                <a:extLst>
+                  <a:ext uri="{0D108BD9-81ED-4DB2-BD59-A6C34878D82A}">
+                    <a16:rowId xmlns:a16="http://schemas.microsoft.com/office/drawing/2014/main" val="3569654071"/>
+                  </a:ext>
+                </a:extLst>
+              </a:tr>
+              <a:tr h="584488">
+                <a:tc gridSpan="2">
+                  <a:txBody>
+                    <a:bodyPr/>
+                    <a:lstStyle/>
+                    <a:p>
+                      <a:pPr algn="ctr"/>
+                      <a:r>
+                        <a:rPr lang="es-MX" dirty="0">
+                          <a:solidFill>
+                            <a:sysClr val="windowText" lastClr="000000"/>
+                          </a:solidFill>
+                        </a:rPr>
+                        <a:t>Hibernate</a:t>
+                      </a:r>
+                    </a:p>
+                  </a:txBody>
+                  <a:tcPr anchor="ctr">
+                    <a:lnL w="12700" cap="flat" cmpd="sng" algn="ctr">
+                      <a:solidFill>
+                        <a:schemeClr val="tx1"/>
+                      </a:solidFill>
+                      <a:prstDash val="solid"/>
+                      <a:round/>
+                      <a:headEnd type="none" w="med" len="med"/>
+                      <a:tailEnd type="none" w="med" len="med"/>
+                    </a:lnL>
+                    <a:lnR w="12700" cap="flat" cmpd="sng" algn="ctr">
+                      <a:solidFill>
+                        <a:schemeClr val="tx1"/>
+                      </a:solidFill>
+                      <a:prstDash val="solid"/>
+                      <a:round/>
+                      <a:headEnd type="none" w="med" len="med"/>
+                      <a:tailEnd type="none" w="med" len="med"/>
+                    </a:lnR>
+                    <a:lnT w="12700" cap="flat" cmpd="sng" algn="ctr">
+                      <a:solidFill>
+                        <a:schemeClr val="tx1"/>
+                      </a:solidFill>
+                      <a:prstDash val="solid"/>
+                      <a:round/>
+                      <a:headEnd type="none" w="med" len="med"/>
+                      <a:tailEnd type="none" w="med" len="med"/>
+                    </a:lnT>
+                    <a:lnB w="12700" cap="flat" cmpd="sng" algn="ctr">
+                      <a:solidFill>
+                        <a:schemeClr val="tx1"/>
+                      </a:solidFill>
+                      <a:prstDash val="solid"/>
+                      <a:round/>
+                      <a:headEnd type="none" w="med" len="med"/>
+                      <a:tailEnd type="none" w="med" len="med"/>
+                    </a:lnB>
+                    <a:solidFill>
+                      <a:schemeClr val="accent6">
+                        <a:lumMod val="40000"/>
+                        <a:lumOff val="60000"/>
+                      </a:schemeClr>
+                    </a:solidFill>
+                  </a:tcPr>
+                </a:tc>
+                <a:tc hMerge="1">
+                  <a:txBody>
+                    <a:bodyPr/>
+                    <a:lstStyle/>
+                    <a:p>
+                      <a:endParaRPr lang="es-MX"/>
+                    </a:p>
+                  </a:txBody>
+                  <a:tcPr/>
+                </a:tc>
+                <a:extLst>
+                  <a:ext uri="{0D108BD9-81ED-4DB2-BD59-A6C34878D82A}">
+                    <a16:rowId xmlns:a16="http://schemas.microsoft.com/office/drawing/2014/main" val="1537212770"/>
+                  </a:ext>
+                </a:extLst>
+              </a:tr>
+              <a:tr h="584488">
+                <a:tc gridSpan="2">
+                  <a:txBody>
+                    <a:bodyPr/>
+                    <a:lstStyle/>
+                    <a:p>
+                      <a:pPr algn="ctr"/>
+                      <a:r>
+                        <a:rPr lang="es-MX" dirty="0">
+                          <a:solidFill>
+                            <a:sysClr val="windowText" lastClr="000000"/>
+                          </a:solidFill>
+                        </a:rPr>
+                        <a:t>JDBC</a:t>
+                      </a:r>
+                    </a:p>
+                  </a:txBody>
+                  <a:tcPr anchor="ctr">
+                    <a:lnL w="12700" cap="flat" cmpd="sng" algn="ctr">
+                      <a:solidFill>
+                        <a:schemeClr val="tx1"/>
+                      </a:solidFill>
+                      <a:prstDash val="solid"/>
+                      <a:round/>
+                      <a:headEnd type="none" w="med" len="med"/>
+                      <a:tailEnd type="none" w="med" len="med"/>
+                    </a:lnL>
+                    <a:lnR w="12700" cap="flat" cmpd="sng" algn="ctr">
+                      <a:solidFill>
+                        <a:schemeClr val="tx1"/>
+                      </a:solidFill>
+                      <a:prstDash val="solid"/>
+                      <a:round/>
+                      <a:headEnd type="none" w="med" len="med"/>
+                      <a:tailEnd type="none" w="med" len="med"/>
+                    </a:lnR>
+                    <a:lnT w="12700" cap="flat" cmpd="sng" algn="ctr">
+                      <a:solidFill>
+                        <a:schemeClr val="tx1"/>
+                      </a:solidFill>
+                      <a:prstDash val="solid"/>
+                      <a:round/>
+                      <a:headEnd type="none" w="med" len="med"/>
+                      <a:tailEnd type="none" w="med" len="med"/>
+                    </a:lnT>
+                    <a:lnB w="12700" cap="flat" cmpd="sng" algn="ctr">
+                      <a:solidFill>
+                        <a:schemeClr val="tx1"/>
+                      </a:solidFill>
+                      <a:prstDash val="solid"/>
+                      <a:round/>
+                      <a:headEnd type="none" w="med" len="med"/>
+                      <a:tailEnd type="none" w="med" len="med"/>
+                    </a:lnB>
+                    <a:solidFill>
+                      <a:schemeClr val="accent1">
+                        <a:lumMod val="40000"/>
+                        <a:lumOff val="60000"/>
+                      </a:schemeClr>
+                    </a:solidFill>
+                  </a:tcPr>
+                </a:tc>
+                <a:tc hMerge="1">
+                  <a:txBody>
+                    <a:bodyPr/>
+                    <a:lstStyle/>
+                    <a:p>
+                      <a:endParaRPr lang="es-MX"/>
+                    </a:p>
+                  </a:txBody>
+                  <a:tcPr/>
+                </a:tc>
+                <a:extLst>
+                  <a:ext uri="{0D108BD9-81ED-4DB2-BD59-A6C34878D82A}">
+                    <a16:rowId xmlns:a16="http://schemas.microsoft.com/office/drawing/2014/main" val="1763516888"/>
+                  </a:ext>
+                </a:extLst>
+              </a:tr>
+            </a:tbl>
+          </a:graphicData>
+        </a:graphic>
+      </p:graphicFrame>
+      <p:graphicFrame>
+        <p:nvGraphicFramePr>
+          <p:cNvPr id="7" name="Tabla 7">
+            <a:extLst>
+              <a:ext uri="{FF2B5EF4-FFF2-40B4-BE49-F238E27FC236}">
+                <a16:creationId xmlns:a16="http://schemas.microsoft.com/office/drawing/2014/main" id="{65B85ABD-9D86-4E2F-9261-530E33BC75CD}"/>
+              </a:ext>
+            </a:extLst>
+          </p:cNvPr>
+          <p:cNvGraphicFramePr>
+            <a:graphicFrameLocks noGrp="1"/>
+          </p:cNvGraphicFramePr>
+          <p:nvPr>
+            <p:extLst>
+              <p:ext uri="{D42A27DB-BD31-4B8C-83A1-F6EECF244321}">
+                <p14:modId xmlns:p14="http://schemas.microsoft.com/office/powerpoint/2010/main" val="3746729105"/>
+              </p:ext>
+            </p:extLst>
+          </p:nvPr>
+        </p:nvGraphicFramePr>
+        <p:xfrm>
+          <a:off x="841899" y="1397755"/>
+          <a:ext cx="4199119" cy="478820"/>
+        </p:xfrm>
+        <a:graphic>
+          <a:graphicData uri="http://schemas.openxmlformats.org/drawingml/2006/table">
+            <a:tbl>
+              <a:tblPr firstRow="1" bandRow="1">
+                <a:tableStyleId>{5C22544A-7EE6-4342-B048-85BDC9FD1C3A}</a:tableStyleId>
+              </a:tblPr>
+              <a:tblGrid>
+                <a:gridCol w="4199119">
+                  <a:extLst>
+                    <a:ext uri="{9D8B030D-6E8A-4147-A177-3AD203B41FA5}">
+                      <a16:colId xmlns:a16="http://schemas.microsoft.com/office/drawing/2014/main" val="812977697"/>
+                    </a:ext>
+                  </a:extLst>
+                </a:gridCol>
+              </a:tblGrid>
+              <a:tr h="478820">
+                <a:tc>
+                  <a:txBody>
+                    <a:bodyPr/>
+                    <a:lstStyle/>
+                    <a:p>
+                      <a:pPr algn="ctr"/>
+                      <a:r>
+                        <a:rPr lang="es-MX" b="0" dirty="0">
+                          <a:solidFill>
+                            <a:schemeClr val="tx1"/>
+                          </a:solidFill>
+                        </a:rPr>
+                        <a:t>Data Access Layer</a:t>
+                      </a:r>
+                    </a:p>
+                  </a:txBody>
+                  <a:tcPr anchor="ctr">
+                    <a:lnL w="12700" cap="flat" cmpd="sng" algn="ctr">
+                      <a:solidFill>
+                        <a:schemeClr val="tx1"/>
+                      </a:solidFill>
+                      <a:prstDash val="solid"/>
+                      <a:round/>
+                      <a:headEnd type="none" w="med" len="med"/>
+                      <a:tailEnd type="none" w="med" len="med"/>
+                    </a:lnL>
+                    <a:lnR w="12700" cap="flat" cmpd="sng" algn="ctr">
+                      <a:solidFill>
+                        <a:schemeClr val="tx1"/>
+                      </a:solidFill>
+                      <a:prstDash val="solid"/>
+                      <a:round/>
+                      <a:headEnd type="none" w="med" len="med"/>
+                      <a:tailEnd type="none" w="med" len="med"/>
+                    </a:lnR>
+                    <a:lnT w="12700" cap="flat" cmpd="sng" algn="ctr">
+                      <a:solidFill>
+                        <a:schemeClr val="tx1"/>
+                      </a:solidFill>
+                      <a:prstDash val="solid"/>
+                      <a:round/>
+                      <a:headEnd type="none" w="med" len="med"/>
+                      <a:tailEnd type="none" w="med" len="med"/>
+                    </a:lnT>
+                    <a:lnB w="12700" cap="flat" cmpd="sng" algn="ctr">
+                      <a:solidFill>
+                        <a:schemeClr val="tx1"/>
+                      </a:solidFill>
+                      <a:prstDash val="solid"/>
+                      <a:round/>
+                      <a:headEnd type="none" w="med" len="med"/>
+                      <a:tailEnd type="none" w="med" len="med"/>
+                    </a:lnB>
+                    <a:solidFill>
+                      <a:schemeClr val="accent4">
+                        <a:lumMod val="40000"/>
+                        <a:lumOff val="60000"/>
+                      </a:schemeClr>
+                    </a:solidFill>
+                  </a:tcPr>
+                </a:tc>
+                <a:extLst>
+                  <a:ext uri="{0D108BD9-81ED-4DB2-BD59-A6C34878D82A}">
+                    <a16:rowId xmlns:a16="http://schemas.microsoft.com/office/drawing/2014/main" val="2200075588"/>
+                  </a:ext>
+                </a:extLst>
+              </a:tr>
+            </a:tbl>
+          </a:graphicData>
+        </a:graphic>
+      </p:graphicFrame>
+      <p:grpSp>
+        <p:nvGrpSpPr>
+          <p:cNvPr id="21" name="Grupo 20">
+            <a:extLst>
+              <a:ext uri="{FF2B5EF4-FFF2-40B4-BE49-F238E27FC236}">
+                <a16:creationId xmlns:a16="http://schemas.microsoft.com/office/drawing/2014/main" id="{E4388AA7-DBC8-48DD-AB35-BFC28D28D6F2}"/>
+              </a:ext>
+            </a:extLst>
+          </p:cNvPr>
+          <p:cNvGrpSpPr/>
+          <p:nvPr/>
+        </p:nvGrpSpPr>
+        <p:grpSpPr>
+          <a:xfrm>
+            <a:off x="1838524" y="1876575"/>
+            <a:ext cx="2205866" cy="4679669"/>
+            <a:chOff x="1838524" y="1876575"/>
+            <a:chExt cx="2205866" cy="4679669"/>
+          </a:xfrm>
+        </p:grpSpPr>
+        <p:cxnSp>
+          <p:nvCxnSpPr>
+            <p:cNvPr id="9" name="Conector recto de flecha 8">
+              <a:extLst>
+                <a:ext uri="{FF2B5EF4-FFF2-40B4-BE49-F238E27FC236}">
+                  <a16:creationId xmlns:a16="http://schemas.microsoft.com/office/drawing/2014/main" id="{B2C67DFF-4685-434C-B54C-623DB9A660A4}"/>
+                </a:ext>
+              </a:extLst>
+            </p:cNvPr>
+            <p:cNvCxnSpPr>
+              <a:cxnSpLocks/>
+            </p:cNvCxnSpPr>
+            <p:nvPr/>
+          </p:nvCxnSpPr>
+          <p:spPr>
+            <a:xfrm>
+              <a:off x="1939600" y="1876575"/>
+              <a:ext cx="0" cy="620182"/>
+            </a:xfrm>
+            <a:prstGeom prst="straightConnector1">
+              <a:avLst/>
+            </a:prstGeom>
+            <a:ln w="38100">
+              <a:solidFill>
+                <a:schemeClr val="tx1"/>
+              </a:solidFill>
+              <a:tailEnd type="triangle"/>
+            </a:ln>
+          </p:spPr>
+          <p:style>
+            <a:lnRef idx="1">
+              <a:schemeClr val="accent1"/>
+            </a:lnRef>
+            <a:fillRef idx="0">
+              <a:schemeClr val="accent1"/>
+            </a:fillRef>
+            <a:effectRef idx="0">
+              <a:schemeClr val="accent1"/>
+            </a:effectRef>
+            <a:fontRef idx="minor">
+              <a:schemeClr val="tx1"/>
+            </a:fontRef>
+          </p:style>
+        </p:cxnSp>
+        <p:cxnSp>
+          <p:nvCxnSpPr>
+            <p:cNvPr id="12" name="Conector recto de flecha 11">
+              <a:extLst>
+                <a:ext uri="{FF2B5EF4-FFF2-40B4-BE49-F238E27FC236}">
+                  <a16:creationId xmlns:a16="http://schemas.microsoft.com/office/drawing/2014/main" id="{B67EE37F-64E1-4DAC-8C74-6FD23A0C887D}"/>
+                </a:ext>
+              </a:extLst>
+            </p:cNvPr>
+            <p:cNvCxnSpPr>
+              <a:cxnSpLocks/>
+            </p:cNvCxnSpPr>
+            <p:nvPr/>
+          </p:nvCxnSpPr>
+          <p:spPr>
+            <a:xfrm>
+              <a:off x="4043349" y="1876575"/>
+              <a:ext cx="0" cy="620182"/>
+            </a:xfrm>
+            <a:prstGeom prst="straightConnector1">
+              <a:avLst/>
+            </a:prstGeom>
+            <a:ln w="38100">
+              <a:solidFill>
+                <a:schemeClr val="tx1"/>
+              </a:solidFill>
+              <a:tailEnd type="triangle"/>
+            </a:ln>
+          </p:spPr>
+          <p:style>
+            <a:lnRef idx="1">
+              <a:schemeClr val="accent1"/>
+            </a:lnRef>
+            <a:fillRef idx="0">
+              <a:schemeClr val="accent1"/>
+            </a:fillRef>
+            <a:effectRef idx="0">
+              <a:schemeClr val="accent1"/>
+            </a:effectRef>
+            <a:fontRef idx="minor">
+              <a:schemeClr val="tx1"/>
+            </a:fontRef>
+          </p:style>
+        </p:cxnSp>
+        <p:cxnSp>
+          <p:nvCxnSpPr>
+            <p:cNvPr id="13" name="Conector recto de flecha 12">
+              <a:extLst>
+                <a:ext uri="{FF2B5EF4-FFF2-40B4-BE49-F238E27FC236}">
+                  <a16:creationId xmlns:a16="http://schemas.microsoft.com/office/drawing/2014/main" id="{527C3311-5972-40E3-B57A-AEB546B58999}"/>
+                </a:ext>
+              </a:extLst>
+            </p:cNvPr>
+            <p:cNvCxnSpPr>
+              <a:cxnSpLocks/>
+            </p:cNvCxnSpPr>
+            <p:nvPr/>
+          </p:nvCxnSpPr>
+          <p:spPr>
+            <a:xfrm>
+              <a:off x="2941457" y="4305813"/>
+              <a:ext cx="1" cy="855853"/>
+            </a:xfrm>
+            <a:prstGeom prst="straightConnector1">
+              <a:avLst/>
+            </a:prstGeom>
+            <a:ln w="38100">
+              <a:solidFill>
+                <a:schemeClr val="tx1"/>
+              </a:solidFill>
+              <a:tailEnd type="triangle"/>
+            </a:ln>
+          </p:spPr>
+          <p:style>
+            <a:lnRef idx="1">
+              <a:schemeClr val="accent1"/>
+            </a:lnRef>
+            <a:fillRef idx="0">
+              <a:schemeClr val="accent1"/>
+            </a:fillRef>
+            <a:effectRef idx="0">
+              <a:schemeClr val="accent1"/>
+            </a:effectRef>
+            <a:fontRef idx="minor">
+              <a:schemeClr val="tx1"/>
+            </a:fontRef>
+          </p:style>
+        </p:cxnSp>
+        <p:sp>
+          <p:nvSpPr>
+            <p:cNvPr id="14" name="CuadroTexto 13">
+              <a:extLst>
+                <a:ext uri="{FF2B5EF4-FFF2-40B4-BE49-F238E27FC236}">
+                  <a16:creationId xmlns:a16="http://schemas.microsoft.com/office/drawing/2014/main" id="{8F578307-7967-42B0-8CA0-BDB81756DC40}"/>
+                </a:ext>
+              </a:extLst>
+            </p:cNvPr>
+            <p:cNvSpPr txBox="1"/>
+            <p:nvPr/>
+          </p:nvSpPr>
+          <p:spPr>
+            <a:xfrm>
+              <a:off x="1838524" y="6186912"/>
+              <a:ext cx="2205866" cy="369332"/>
+            </a:xfrm>
+            <a:prstGeom prst="rect">
+              <a:avLst/>
+            </a:prstGeom>
+            <a:noFill/>
+          </p:spPr>
+          <p:txBody>
+            <a:bodyPr wrap="square" rtlCol="0">
+              <a:spAutoFit/>
+            </a:bodyPr>
+            <a:lstStyle/>
+            <a:p>
+              <a:r>
+                <a:rPr lang="es-MX" dirty="0"/>
+                <a:t>Relational Database</a:t>
+              </a:r>
+            </a:p>
+          </p:txBody>
+        </p:sp>
+        <p:pic>
+          <p:nvPicPr>
+            <p:cNvPr id="20" name="Gráfico 19" descr="Database con relleno sólido">
+              <a:extLst>
+                <a:ext uri="{FF2B5EF4-FFF2-40B4-BE49-F238E27FC236}">
+                  <a16:creationId xmlns:a16="http://schemas.microsoft.com/office/drawing/2014/main" id="{395E4868-7E09-47EB-8FDA-3CE526802887}"/>
+                </a:ext>
+              </a:extLst>
+            </p:cNvPr>
+            <p:cNvPicPr>
+              <a:picLocks noChangeAspect="1"/>
+            </p:cNvPicPr>
+            <p:nvPr/>
+          </p:nvPicPr>
+          <p:blipFill>
+            <a:blip r:embed="rId2">
+              <a:extLst>
+                <a:ext uri="{28A0092B-C50C-407E-A947-70E740481C1C}">
+                  <a14:useLocalDpi xmlns:a14="http://schemas.microsoft.com/office/drawing/2010/main" val="0"/>
+                </a:ext>
+                <a:ext uri="{96DAC541-7B7A-43D3-8B79-37D633B846F1}">
+                  <asvg:svgBlip xmlns:asvg="http://schemas.microsoft.com/office/drawing/2016/SVG/main" r:embed="rId3"/>
+                </a:ext>
+              </a:extLst>
+            </a:blip>
+            <a:stretch>
+              <a:fillRect/>
+            </a:stretch>
+          </p:blipFill>
+          <p:spPr>
+            <a:xfrm>
+              <a:off x="2381131" y="5161666"/>
+              <a:ext cx="1120651" cy="1120651"/>
+            </a:xfrm>
+            <a:prstGeom prst="rect">
+              <a:avLst/>
+            </a:prstGeom>
+          </p:spPr>
+        </p:pic>
+      </p:grpSp>
+      <p:cxnSp>
+        <p:nvCxnSpPr>
+          <p:cNvPr id="23" name="Conector: angular 22">
+            <a:extLst>
+              <a:ext uri="{FF2B5EF4-FFF2-40B4-BE49-F238E27FC236}">
+                <a16:creationId xmlns:a16="http://schemas.microsoft.com/office/drawing/2014/main" id="{5C1E8807-3FC5-4715-823A-0F71F52A3118}"/>
+              </a:ext>
+            </a:extLst>
+          </p:cNvPr>
+          <p:cNvCxnSpPr>
+            <a:cxnSpLocks/>
+          </p:cNvCxnSpPr>
+          <p:nvPr/>
+        </p:nvCxnSpPr>
+        <p:spPr>
+          <a:xfrm rot="10800000">
+            <a:off x="5041018" y="4044103"/>
+            <a:ext cx="1039742" cy="948058"/>
+          </a:xfrm>
+          <a:prstGeom prst="bentConnector3">
+            <a:avLst/>
+          </a:prstGeom>
+          <a:ln w="28575">
+            <a:solidFill>
+              <a:schemeClr val="tx1"/>
+            </a:solidFill>
+            <a:tailEnd type="triangle"/>
+          </a:ln>
+        </p:spPr>
+        <p:style>
+          <a:lnRef idx="1">
+            <a:schemeClr val="accent1"/>
+          </a:lnRef>
+          <a:fillRef idx="0">
+            <a:schemeClr val="accent1"/>
+          </a:fillRef>
+          <a:effectRef idx="0">
+            <a:schemeClr val="accent1"/>
+          </a:effectRef>
+          <a:fontRef idx="minor">
+            <a:schemeClr val="tx1"/>
+          </a:fontRef>
+        </p:style>
+      </p:cxnSp>
+      <p:sp>
+        <p:nvSpPr>
+          <p:cNvPr id="25" name="CuadroTexto 24">
+            <a:extLst>
+              <a:ext uri="{FF2B5EF4-FFF2-40B4-BE49-F238E27FC236}">
+                <a16:creationId xmlns:a16="http://schemas.microsoft.com/office/drawing/2014/main" id="{F3E3972F-3FA7-4866-B795-94669AB076F6}"/>
+              </a:ext>
+            </a:extLst>
+          </p:cNvPr>
+          <p:cNvSpPr txBox="1"/>
+          <p:nvPr/>
+        </p:nvSpPr>
+        <p:spPr>
+          <a:xfrm>
+            <a:off x="6096000" y="4668996"/>
+            <a:ext cx="2516956" cy="646331"/>
+          </a:xfrm>
+          <a:prstGeom prst="rect">
+            <a:avLst/>
+          </a:prstGeom>
+          <a:noFill/>
+        </p:spPr>
+        <p:txBody>
+          <a:bodyPr wrap="square" rtlCol="0">
+            <a:spAutoFit/>
+          </a:bodyPr>
+          <a:lstStyle/>
+          <a:p>
+            <a:r>
+              <a:rPr lang="es-MX" dirty="0"/>
+              <a:t>Conexión con la base de datos.</a:t>
+            </a:r>
+          </a:p>
+        </p:txBody>
+      </p:sp>
+      <p:sp>
+        <p:nvSpPr>
+          <p:cNvPr id="31" name="CuadroTexto 30">
+            <a:extLst>
+              <a:ext uri="{FF2B5EF4-FFF2-40B4-BE49-F238E27FC236}">
+                <a16:creationId xmlns:a16="http://schemas.microsoft.com/office/drawing/2014/main" id="{579B3E05-A30B-4F6C-A6C4-B3BECE1943DD}"/>
+              </a:ext>
+            </a:extLst>
+          </p:cNvPr>
+          <p:cNvSpPr txBox="1"/>
+          <p:nvPr/>
+        </p:nvSpPr>
+        <p:spPr>
+          <a:xfrm>
+            <a:off x="6111242" y="3495724"/>
+            <a:ext cx="4199118" cy="646331"/>
+          </a:xfrm>
+          <a:prstGeom prst="rect">
+            <a:avLst/>
+          </a:prstGeom>
+          <a:noFill/>
+        </p:spPr>
+        <p:txBody>
+          <a:bodyPr wrap="square" rtlCol="0">
+            <a:spAutoFit/>
+          </a:bodyPr>
+          <a:lstStyle/>
+          <a:p>
+            <a:r>
+              <a:rPr lang="es-MX" dirty="0"/>
+              <a:t>ORM Framework para el servicio de consulta y persistencia objeto relacional. </a:t>
+            </a:r>
+          </a:p>
+        </p:txBody>
+      </p:sp>
+      <p:cxnSp>
+        <p:nvCxnSpPr>
+          <p:cNvPr id="36" name="Conector recto de flecha 35">
+            <a:extLst>
+              <a:ext uri="{FF2B5EF4-FFF2-40B4-BE49-F238E27FC236}">
+                <a16:creationId xmlns:a16="http://schemas.microsoft.com/office/drawing/2014/main" id="{FF3708E2-D8E6-4941-AFF8-D76AA94F22B1}"/>
+              </a:ext>
+            </a:extLst>
+          </p:cNvPr>
+          <p:cNvCxnSpPr>
+            <a:cxnSpLocks/>
+          </p:cNvCxnSpPr>
+          <p:nvPr/>
+        </p:nvCxnSpPr>
+        <p:spPr>
+          <a:xfrm>
+            <a:off x="2290713" y="2263140"/>
+            <a:ext cx="0" cy="233617"/>
+          </a:xfrm>
+          <a:prstGeom prst="straightConnector1">
+            <a:avLst/>
+          </a:prstGeom>
+          <a:ln w="28575">
+            <a:solidFill>
+              <a:schemeClr val="tx1"/>
+            </a:solidFill>
+            <a:tailEnd type="triangle"/>
+          </a:ln>
+        </p:spPr>
+        <p:style>
+          <a:lnRef idx="1">
+            <a:schemeClr val="accent1"/>
+          </a:lnRef>
+          <a:fillRef idx="0">
+            <a:schemeClr val="accent1"/>
+          </a:fillRef>
+          <a:effectRef idx="0">
+            <a:schemeClr val="accent1"/>
+          </a:effectRef>
+          <a:fontRef idx="minor">
+            <a:schemeClr val="tx1"/>
+          </a:fontRef>
+        </p:style>
+      </p:cxnSp>
+      <p:sp>
+        <p:nvSpPr>
+          <p:cNvPr id="44" name="CuadroTexto 43">
+            <a:extLst>
+              <a:ext uri="{FF2B5EF4-FFF2-40B4-BE49-F238E27FC236}">
+                <a16:creationId xmlns:a16="http://schemas.microsoft.com/office/drawing/2014/main" id="{B2209B76-456E-4FA2-BD78-9C3578F5B1B4}"/>
+              </a:ext>
+            </a:extLst>
+          </p:cNvPr>
+          <p:cNvSpPr txBox="1"/>
+          <p:nvPr/>
+        </p:nvSpPr>
+        <p:spPr>
+          <a:xfrm>
+            <a:off x="6092190" y="1076991"/>
+            <a:ext cx="5760717" cy="646331"/>
+          </a:xfrm>
+          <a:prstGeom prst="rect">
+            <a:avLst/>
+          </a:prstGeom>
+          <a:noFill/>
+        </p:spPr>
+        <p:txBody>
+          <a:bodyPr wrap="square" rtlCol="0">
+            <a:spAutoFit/>
+          </a:bodyPr>
+          <a:lstStyle/>
+          <a:p>
+            <a:r>
+              <a:rPr lang="es-MX" dirty="0"/>
+              <a:t>Etiquetas en archivo XML para asignación de Objetos Java a Relacionales.</a:t>
+            </a:r>
+          </a:p>
+        </p:txBody>
+      </p:sp>
+      <p:grpSp>
+        <p:nvGrpSpPr>
+          <p:cNvPr id="56" name="Grupo 55">
+            <a:extLst>
+              <a:ext uri="{FF2B5EF4-FFF2-40B4-BE49-F238E27FC236}">
+                <a16:creationId xmlns:a16="http://schemas.microsoft.com/office/drawing/2014/main" id="{39EF551A-6FEF-47D5-BDC3-8C3AC89B8C8F}"/>
+              </a:ext>
+            </a:extLst>
+          </p:cNvPr>
+          <p:cNvGrpSpPr/>
+          <p:nvPr/>
+        </p:nvGrpSpPr>
+        <p:grpSpPr>
+          <a:xfrm>
+            <a:off x="5041017" y="3413760"/>
+            <a:ext cx="1051173" cy="405130"/>
+            <a:chOff x="5041017" y="3413760"/>
+            <a:chExt cx="1051173" cy="405130"/>
+          </a:xfrm>
+        </p:grpSpPr>
+        <p:cxnSp>
+          <p:nvCxnSpPr>
+            <p:cNvPr id="29" name="Conector recto de flecha 28">
+              <a:extLst>
+                <a:ext uri="{FF2B5EF4-FFF2-40B4-BE49-F238E27FC236}">
+                  <a16:creationId xmlns:a16="http://schemas.microsoft.com/office/drawing/2014/main" id="{5427FA6D-BBC1-4E2C-A37E-2D607DE9F4CD}"/>
+                </a:ext>
+              </a:extLst>
+            </p:cNvPr>
+            <p:cNvCxnSpPr>
+              <a:cxnSpLocks/>
+            </p:cNvCxnSpPr>
+            <p:nvPr/>
+          </p:nvCxnSpPr>
+          <p:spPr>
+            <a:xfrm flipH="1">
+              <a:off x="5041017" y="3429565"/>
+              <a:ext cx="800983" cy="0"/>
+            </a:xfrm>
+            <a:prstGeom prst="straightConnector1">
+              <a:avLst/>
+            </a:prstGeom>
+            <a:ln w="28575">
+              <a:solidFill>
+                <a:schemeClr val="tx1"/>
+              </a:solidFill>
+              <a:tailEnd type="triangle"/>
+            </a:ln>
+          </p:spPr>
+          <p:style>
+            <a:lnRef idx="1">
+              <a:schemeClr val="accent1"/>
+            </a:lnRef>
+            <a:fillRef idx="0">
+              <a:schemeClr val="accent1"/>
+            </a:fillRef>
+            <a:effectRef idx="0">
+              <a:schemeClr val="accent1"/>
+            </a:effectRef>
+            <a:fontRef idx="minor">
+              <a:schemeClr val="tx1"/>
+            </a:fontRef>
+          </p:style>
+        </p:cxnSp>
+        <p:grpSp>
+          <p:nvGrpSpPr>
+            <p:cNvPr id="55" name="Grupo 54">
+              <a:extLst>
+                <a:ext uri="{FF2B5EF4-FFF2-40B4-BE49-F238E27FC236}">
+                  <a16:creationId xmlns:a16="http://schemas.microsoft.com/office/drawing/2014/main" id="{855D1165-BD61-4631-8DD7-FD7384E9940D}"/>
+                </a:ext>
+              </a:extLst>
+            </p:cNvPr>
+            <p:cNvGrpSpPr/>
+            <p:nvPr/>
+          </p:nvGrpSpPr>
+          <p:grpSpPr>
+            <a:xfrm>
+              <a:off x="5838190" y="3413760"/>
+              <a:ext cx="254000" cy="405130"/>
+              <a:chOff x="5838190" y="3413760"/>
+              <a:chExt cx="254000" cy="405130"/>
+            </a:xfrm>
+          </p:grpSpPr>
+          <p:cxnSp>
+            <p:nvCxnSpPr>
+              <p:cNvPr id="52" name="Conector recto 51">
+                <a:extLst>
+                  <a:ext uri="{FF2B5EF4-FFF2-40B4-BE49-F238E27FC236}">
+                    <a16:creationId xmlns:a16="http://schemas.microsoft.com/office/drawing/2014/main" id="{3E965D5F-F93B-4F87-9265-47C5593A1AF0}"/>
+                  </a:ext>
+                </a:extLst>
+              </p:cNvPr>
+              <p:cNvCxnSpPr/>
+              <p:nvPr/>
+            </p:nvCxnSpPr>
+            <p:spPr>
+              <a:xfrm>
+                <a:off x="5852160" y="3413760"/>
+                <a:ext cx="0" cy="391160"/>
+              </a:xfrm>
+              <a:prstGeom prst="line">
+                <a:avLst/>
+              </a:prstGeom>
+              <a:ln w="28575">
+                <a:solidFill>
+                  <a:schemeClr val="tx1"/>
+                </a:solidFill>
+              </a:ln>
+            </p:spPr>
+            <p:style>
+              <a:lnRef idx="1">
+                <a:schemeClr val="accent1"/>
+              </a:lnRef>
+              <a:fillRef idx="0">
+                <a:schemeClr val="accent1"/>
+              </a:fillRef>
+              <a:effectRef idx="0">
+                <a:schemeClr val="accent1"/>
+              </a:effectRef>
+              <a:fontRef idx="minor">
+                <a:schemeClr val="tx1"/>
+              </a:fontRef>
+            </p:style>
+          </p:cxnSp>
+          <p:cxnSp>
+            <p:nvCxnSpPr>
+              <p:cNvPr id="54" name="Conector recto 53">
+                <a:extLst>
+                  <a:ext uri="{FF2B5EF4-FFF2-40B4-BE49-F238E27FC236}">
+                    <a16:creationId xmlns:a16="http://schemas.microsoft.com/office/drawing/2014/main" id="{9E91975E-8590-4E71-8D60-60C78880410F}"/>
+                  </a:ext>
+                </a:extLst>
+              </p:cNvPr>
+              <p:cNvCxnSpPr/>
+              <p:nvPr/>
+            </p:nvCxnSpPr>
+            <p:spPr>
+              <a:xfrm>
+                <a:off x="5838190" y="3818890"/>
+                <a:ext cx="254000" cy="0"/>
+              </a:xfrm>
+              <a:prstGeom prst="line">
+                <a:avLst/>
+              </a:prstGeom>
+              <a:ln w="28575">
+                <a:solidFill>
+                  <a:schemeClr val="tx1"/>
+                </a:solidFill>
+              </a:ln>
+            </p:spPr>
+            <p:style>
+              <a:lnRef idx="1">
+                <a:schemeClr val="accent1"/>
+              </a:lnRef>
+              <a:fillRef idx="0">
+                <a:schemeClr val="accent1"/>
+              </a:fillRef>
+              <a:effectRef idx="0">
+                <a:schemeClr val="accent1"/>
+              </a:effectRef>
+              <a:fontRef idx="minor">
+                <a:schemeClr val="tx1"/>
+              </a:fontRef>
+            </p:style>
+          </p:cxnSp>
+        </p:grpSp>
+      </p:grpSp>
+      <p:grpSp>
+        <p:nvGrpSpPr>
+          <p:cNvPr id="58" name="Grupo 57">
+            <a:extLst>
+              <a:ext uri="{FF2B5EF4-FFF2-40B4-BE49-F238E27FC236}">
+                <a16:creationId xmlns:a16="http://schemas.microsoft.com/office/drawing/2014/main" id="{83BFB62B-85BB-4BC3-A9F5-01D7140AAA8D}"/>
+              </a:ext>
+            </a:extLst>
+          </p:cNvPr>
+          <p:cNvGrpSpPr/>
+          <p:nvPr/>
+        </p:nvGrpSpPr>
+        <p:grpSpPr>
+          <a:xfrm>
+            <a:off x="2275473" y="2257566"/>
+            <a:ext cx="3819146" cy="391160"/>
+            <a:chOff x="2275473" y="2257566"/>
+            <a:chExt cx="3819146" cy="391160"/>
+          </a:xfrm>
+        </p:grpSpPr>
+        <p:cxnSp>
+          <p:nvCxnSpPr>
+            <p:cNvPr id="38" name="Conector recto 37">
+              <a:extLst>
+                <a:ext uri="{FF2B5EF4-FFF2-40B4-BE49-F238E27FC236}">
+                  <a16:creationId xmlns:a16="http://schemas.microsoft.com/office/drawing/2014/main" id="{07C9635D-3A95-48BB-8C6E-497D5A9EB169}"/>
+                </a:ext>
+              </a:extLst>
+            </p:cNvPr>
+            <p:cNvCxnSpPr>
+              <a:cxnSpLocks/>
+            </p:cNvCxnSpPr>
+            <p:nvPr/>
+          </p:nvCxnSpPr>
+          <p:spPr>
+            <a:xfrm>
+              <a:off x="2275473" y="2263140"/>
+              <a:ext cx="3576687" cy="0"/>
+            </a:xfrm>
+            <a:prstGeom prst="line">
+              <a:avLst/>
+            </a:prstGeom>
+            <a:ln w="28575">
+              <a:solidFill>
+                <a:schemeClr val="tx1"/>
+              </a:solidFill>
+            </a:ln>
+          </p:spPr>
+          <p:style>
+            <a:lnRef idx="1">
+              <a:schemeClr val="accent1"/>
+            </a:lnRef>
+            <a:fillRef idx="0">
+              <a:schemeClr val="accent1"/>
+            </a:fillRef>
+            <a:effectRef idx="0">
+              <a:schemeClr val="accent1"/>
+            </a:effectRef>
+            <a:fontRef idx="minor">
+              <a:schemeClr val="tx1"/>
+            </a:fontRef>
+          </p:style>
+        </p:cxnSp>
+        <p:cxnSp>
+          <p:nvCxnSpPr>
+            <p:cNvPr id="59" name="Conector recto 58">
+              <a:extLst>
+                <a:ext uri="{FF2B5EF4-FFF2-40B4-BE49-F238E27FC236}">
+                  <a16:creationId xmlns:a16="http://schemas.microsoft.com/office/drawing/2014/main" id="{61DCA102-425A-498C-8808-73F93FCF14E3}"/>
+                </a:ext>
+              </a:extLst>
+            </p:cNvPr>
+            <p:cNvCxnSpPr/>
+            <p:nvPr/>
+          </p:nvCxnSpPr>
+          <p:spPr>
+            <a:xfrm>
+              <a:off x="5838190" y="2257566"/>
+              <a:ext cx="0" cy="391160"/>
+            </a:xfrm>
+            <a:prstGeom prst="line">
+              <a:avLst/>
+            </a:prstGeom>
+            <a:ln w="28575">
+              <a:solidFill>
+                <a:schemeClr val="tx1"/>
+              </a:solidFill>
+            </a:ln>
+          </p:spPr>
+          <p:style>
+            <a:lnRef idx="1">
+              <a:schemeClr val="accent1"/>
+            </a:lnRef>
+            <a:fillRef idx="0">
+              <a:schemeClr val="accent1"/>
+            </a:fillRef>
+            <a:effectRef idx="0">
+              <a:schemeClr val="accent1"/>
+            </a:effectRef>
+            <a:fontRef idx="minor">
+              <a:schemeClr val="tx1"/>
+            </a:fontRef>
+          </p:style>
+        </p:cxnSp>
+        <p:cxnSp>
+          <p:nvCxnSpPr>
+            <p:cNvPr id="60" name="Conector recto 59">
+              <a:extLst>
+                <a:ext uri="{FF2B5EF4-FFF2-40B4-BE49-F238E27FC236}">
+                  <a16:creationId xmlns:a16="http://schemas.microsoft.com/office/drawing/2014/main" id="{30D63D08-46EA-45A7-A455-226F67E028E8}"/>
+                </a:ext>
+              </a:extLst>
+            </p:cNvPr>
+            <p:cNvCxnSpPr/>
+            <p:nvPr/>
+          </p:nvCxnSpPr>
+          <p:spPr>
+            <a:xfrm>
+              <a:off x="5840619" y="2634121"/>
+              <a:ext cx="254000" cy="0"/>
+            </a:xfrm>
+            <a:prstGeom prst="line">
+              <a:avLst/>
+            </a:prstGeom>
+            <a:ln w="28575">
+              <a:solidFill>
+                <a:schemeClr val="tx1"/>
+              </a:solidFill>
+            </a:ln>
+          </p:spPr>
+          <p:style>
+            <a:lnRef idx="1">
+              <a:schemeClr val="accent1"/>
+            </a:lnRef>
+            <a:fillRef idx="0">
+              <a:schemeClr val="accent1"/>
+            </a:fillRef>
+            <a:effectRef idx="0">
+              <a:schemeClr val="accent1"/>
+            </a:effectRef>
+            <a:fontRef idx="minor">
+              <a:schemeClr val="tx1"/>
+            </a:fontRef>
+          </p:style>
+        </p:cxnSp>
+      </p:grpSp>
+      <p:grpSp>
+        <p:nvGrpSpPr>
+          <p:cNvPr id="62" name="Grupo 61">
+            <a:extLst>
+              <a:ext uri="{FF2B5EF4-FFF2-40B4-BE49-F238E27FC236}">
+                <a16:creationId xmlns:a16="http://schemas.microsoft.com/office/drawing/2014/main" id="{18B9AD23-2166-48A1-AC91-B4DA56E3A1BA}"/>
+              </a:ext>
+            </a:extLst>
+          </p:cNvPr>
+          <p:cNvGrpSpPr/>
+          <p:nvPr/>
+        </p:nvGrpSpPr>
+        <p:grpSpPr>
+          <a:xfrm>
+            <a:off x="3240673" y="1614946"/>
+            <a:ext cx="2821037" cy="881811"/>
+            <a:chOff x="3240673" y="1614946"/>
+            <a:chExt cx="2821037" cy="881811"/>
+          </a:xfrm>
+        </p:grpSpPr>
+        <p:cxnSp>
+          <p:nvCxnSpPr>
+            <p:cNvPr id="46" name="Conector recto de flecha 45">
+              <a:extLst>
+                <a:ext uri="{FF2B5EF4-FFF2-40B4-BE49-F238E27FC236}">
+                  <a16:creationId xmlns:a16="http://schemas.microsoft.com/office/drawing/2014/main" id="{6BCFC53B-8588-4158-B690-DEF91F0BE8F2}"/>
+                </a:ext>
+              </a:extLst>
+            </p:cNvPr>
+            <p:cNvCxnSpPr>
+              <a:cxnSpLocks/>
+            </p:cNvCxnSpPr>
+            <p:nvPr/>
+          </p:nvCxnSpPr>
+          <p:spPr>
+            <a:xfrm>
+              <a:off x="3255913" y="2008215"/>
+              <a:ext cx="0" cy="488542"/>
+            </a:xfrm>
+            <a:prstGeom prst="straightConnector1">
+              <a:avLst/>
+            </a:prstGeom>
+            <a:ln w="28575">
+              <a:tailEnd type="triangle"/>
+            </a:ln>
+          </p:spPr>
+          <p:style>
+            <a:lnRef idx="1">
+              <a:schemeClr val="accent1"/>
+            </a:lnRef>
+            <a:fillRef idx="0">
+              <a:schemeClr val="accent1"/>
+            </a:fillRef>
+            <a:effectRef idx="0">
+              <a:schemeClr val="accent1"/>
+            </a:effectRef>
+            <a:fontRef idx="minor">
+              <a:schemeClr val="tx1"/>
+            </a:fontRef>
+          </p:style>
+        </p:cxnSp>
+        <p:cxnSp>
+          <p:nvCxnSpPr>
+            <p:cNvPr id="47" name="Conector recto 46">
+              <a:extLst>
+                <a:ext uri="{FF2B5EF4-FFF2-40B4-BE49-F238E27FC236}">
+                  <a16:creationId xmlns:a16="http://schemas.microsoft.com/office/drawing/2014/main" id="{DF9D2667-FA8B-4AA3-8BCF-B6669F480CA4}"/>
+                </a:ext>
+              </a:extLst>
+            </p:cNvPr>
+            <p:cNvCxnSpPr>
+              <a:cxnSpLocks/>
+            </p:cNvCxnSpPr>
+            <p:nvPr/>
+          </p:nvCxnSpPr>
+          <p:spPr>
+            <a:xfrm>
+              <a:off x="3240673" y="2008215"/>
+              <a:ext cx="2597517" cy="0"/>
+            </a:xfrm>
+            <a:prstGeom prst="line">
+              <a:avLst/>
+            </a:prstGeom>
+            <a:ln w="28575"/>
+          </p:spPr>
+          <p:style>
+            <a:lnRef idx="1">
+              <a:schemeClr val="accent1"/>
+            </a:lnRef>
+            <a:fillRef idx="0">
+              <a:schemeClr val="accent1"/>
+            </a:fillRef>
+            <a:effectRef idx="0">
+              <a:schemeClr val="accent1"/>
+            </a:effectRef>
+            <a:fontRef idx="minor">
+              <a:schemeClr val="tx1"/>
+            </a:fontRef>
+          </p:style>
+        </p:cxnSp>
+        <p:cxnSp>
+          <p:nvCxnSpPr>
+            <p:cNvPr id="63" name="Conector recto 62">
+              <a:extLst>
+                <a:ext uri="{FF2B5EF4-FFF2-40B4-BE49-F238E27FC236}">
+                  <a16:creationId xmlns:a16="http://schemas.microsoft.com/office/drawing/2014/main" id="{9DEDB6B1-8786-40E9-8B92-8C27681A43A5}"/>
+                </a:ext>
+              </a:extLst>
+            </p:cNvPr>
+            <p:cNvCxnSpPr/>
+            <p:nvPr/>
+          </p:nvCxnSpPr>
+          <p:spPr>
+            <a:xfrm>
+              <a:off x="5822950" y="1629545"/>
+              <a:ext cx="0" cy="391160"/>
+            </a:xfrm>
+            <a:prstGeom prst="line">
+              <a:avLst/>
+            </a:prstGeom>
+            <a:ln w="28575"/>
+          </p:spPr>
+          <p:style>
+            <a:lnRef idx="1">
+              <a:schemeClr val="accent1"/>
+            </a:lnRef>
+            <a:fillRef idx="0">
+              <a:schemeClr val="accent1"/>
+            </a:fillRef>
+            <a:effectRef idx="0">
+              <a:schemeClr val="accent1"/>
+            </a:effectRef>
+            <a:fontRef idx="minor">
+              <a:schemeClr val="tx1"/>
+            </a:fontRef>
+          </p:style>
+        </p:cxnSp>
+        <p:cxnSp>
+          <p:nvCxnSpPr>
+            <p:cNvPr id="64" name="Conector recto 63">
+              <a:extLst>
+                <a:ext uri="{FF2B5EF4-FFF2-40B4-BE49-F238E27FC236}">
+                  <a16:creationId xmlns:a16="http://schemas.microsoft.com/office/drawing/2014/main" id="{547DC408-2434-4F62-8CE4-050179F02C18}"/>
+                </a:ext>
+              </a:extLst>
+            </p:cNvPr>
+            <p:cNvCxnSpPr/>
+            <p:nvPr/>
+          </p:nvCxnSpPr>
+          <p:spPr>
+            <a:xfrm>
+              <a:off x="5807710" y="1614946"/>
+              <a:ext cx="254000" cy="0"/>
+            </a:xfrm>
+            <a:prstGeom prst="line">
+              <a:avLst/>
+            </a:prstGeom>
+            <a:ln w="28575"/>
+          </p:spPr>
+          <p:style>
+            <a:lnRef idx="1">
+              <a:schemeClr val="accent1"/>
+            </a:lnRef>
+            <a:fillRef idx="0">
+              <a:schemeClr val="accent1"/>
+            </a:fillRef>
+            <a:effectRef idx="0">
+              <a:schemeClr val="accent1"/>
+            </a:effectRef>
+            <a:fontRef idx="minor">
+              <a:schemeClr val="tx1"/>
+            </a:fontRef>
+          </p:style>
+        </p:cxnSp>
+      </p:grpSp>
+      <p:sp>
+        <p:nvSpPr>
+          <p:cNvPr id="66" name="CuadroTexto 65">
+            <a:extLst>
+              <a:ext uri="{FF2B5EF4-FFF2-40B4-BE49-F238E27FC236}">
+                <a16:creationId xmlns:a16="http://schemas.microsoft.com/office/drawing/2014/main" id="{E68624F3-8E76-4337-A9B4-8DCC705771BB}"/>
+              </a:ext>
+            </a:extLst>
+          </p:cNvPr>
+          <p:cNvSpPr txBox="1"/>
+          <p:nvPr/>
+        </p:nvSpPr>
+        <p:spPr>
+          <a:xfrm>
+            <a:off x="6138718" y="2310030"/>
+            <a:ext cx="5760717" cy="923330"/>
+          </a:xfrm>
+          <a:prstGeom prst="rect">
+            <a:avLst/>
+          </a:prstGeom>
+          <a:noFill/>
+        </p:spPr>
+        <p:txBody>
+          <a:bodyPr wrap="square" rtlCol="0">
+            <a:spAutoFit/>
+          </a:bodyPr>
+          <a:lstStyle/>
+          <a:p>
+            <a:r>
+              <a:rPr lang="es-MX" dirty="0"/>
+              <a:t>Anotaciones estándar de EJB3 están contenidas en el paquete </a:t>
+            </a:r>
+            <a:r>
+              <a:rPr lang="es-MX" b="1" dirty="0"/>
+              <a:t>javax.Persistence </a:t>
+            </a:r>
+            <a:r>
+              <a:rPr lang="es-MX" dirty="0"/>
+              <a:t>para asignación de Objetos Java a Relacionales.</a:t>
+            </a:r>
+          </a:p>
+        </p:txBody>
+      </p:sp>
+    </p:spTree>
+    <p:extLst>
+      <p:ext uri="{BB962C8B-B14F-4D97-AF65-F5344CB8AC3E}">
+        <p14:creationId xmlns:p14="http://schemas.microsoft.com/office/powerpoint/2010/main" val="3108055817"/>
+      </p:ext>
+    </p:extLst>
+  </p:cSld>
+  <p:clrMapOvr>
+    <a:masterClrMapping/>
+  </p:clrMapOvr>
+</p:sld>
+</file>
+
+<file path=ppt/slides/slide13.xml><?xml version="1.0" encoding="utf-8"?>
+<p:sld xmlns:a="http://schemas.openxmlformats.org/drawingml/2006/main" xmlns:r="http://schemas.openxmlformats.org/officeDocument/2006/relationships" xmlns:p="http://schemas.openxmlformats.org/presentationml/2006/main">
+  <p:cSld>
+    <p:spTree>
+      <p:nvGrpSpPr>
+        <p:cNvPr id="1" name=""/>
+        <p:cNvGrpSpPr/>
+        <p:nvPr/>
+      </p:nvGrpSpPr>
+      <p:grpSpPr>
+        <a:xfrm>
+          <a:off x="0" y="0"/>
+          <a:ext cx="0" cy="0"/>
+          <a:chOff x="0" y="0"/>
+          <a:chExt cx="0" cy="0"/>
+        </a:xfrm>
+      </p:grpSpPr>
+      <p:sp>
+        <p:nvSpPr>
+          <p:cNvPr id="2" name="Título 1">
+            <a:extLst>
+              <a:ext uri="{FF2B5EF4-FFF2-40B4-BE49-F238E27FC236}">
+                <a16:creationId xmlns:a16="http://schemas.microsoft.com/office/drawing/2014/main" id="{440E466B-8D82-43C0-B0BB-FD33E6A98B25}"/>
+              </a:ext>
+            </a:extLst>
+          </p:cNvPr>
+          <p:cNvSpPr>
+            <a:spLocks noGrp="1"/>
+          </p:cNvSpPr>
+          <p:nvPr>
+            <p:ph type="title"/>
+          </p:nvPr>
+        </p:nvSpPr>
+        <p:spPr/>
+        <p:txBody>
+          <a:bodyPr/>
+          <a:lstStyle/>
+          <a:p>
+            <a:r>
+              <a:rPr lang="es-MX" b="1" dirty="0"/>
+              <a:t>Spring Framework (núcleo) + JPA, Hibernate</a:t>
+            </a:r>
+          </a:p>
+        </p:txBody>
+      </p:sp>
+      <p:sp>
+        <p:nvSpPr>
+          <p:cNvPr id="3" name="Marcador de contenido 2">
+            <a:extLst>
+              <a:ext uri="{FF2B5EF4-FFF2-40B4-BE49-F238E27FC236}">
+                <a16:creationId xmlns:a16="http://schemas.microsoft.com/office/drawing/2014/main" id="{98B5C109-F7AC-4D36-9B99-668177BF2B1E}"/>
+              </a:ext>
+            </a:extLst>
+          </p:cNvPr>
+          <p:cNvSpPr>
+            <a:spLocks noGrp="1"/>
+          </p:cNvSpPr>
+          <p:nvPr>
+            <p:ph idx="1"/>
+          </p:nvPr>
+        </p:nvSpPr>
+        <p:spPr>
+          <a:xfrm>
+            <a:off x="841899" y="2236512"/>
+            <a:ext cx="4227941" cy="2384975"/>
+          </a:xfrm>
+        </p:spPr>
+        <p:txBody>
+          <a:bodyPr/>
+          <a:lstStyle/>
+          <a:p>
+            <a:pPr marL="0" indent="0">
+              <a:buNone/>
+            </a:pPr>
+            <a:r>
+              <a:rPr lang="es-MX" dirty="0"/>
+              <a:t>Dependencias Spring versión 5.1.3:</a:t>
+            </a:r>
+          </a:p>
+          <a:p>
+            <a:pPr lvl="1"/>
+            <a:r>
+              <a:rPr lang="es-MX" dirty="0"/>
+              <a:t>Spring-</a:t>
+            </a:r>
+            <a:r>
+              <a:rPr lang="es-MX" dirty="0" err="1"/>
+              <a:t>core</a:t>
+            </a:r>
+            <a:endParaRPr lang="es-MX" dirty="0"/>
+          </a:p>
+          <a:p>
+            <a:pPr lvl="1"/>
+            <a:r>
+              <a:rPr lang="es-MX" dirty="0"/>
+              <a:t>Spring-</a:t>
+            </a:r>
+            <a:r>
+              <a:rPr lang="es-MX" dirty="0" err="1"/>
+              <a:t>beans</a:t>
+            </a:r>
+            <a:endParaRPr lang="es-MX" dirty="0"/>
+          </a:p>
+          <a:p>
+            <a:pPr lvl="1"/>
+            <a:r>
+              <a:rPr lang="es-MX" dirty="0"/>
+              <a:t>Spring-</a:t>
+            </a:r>
+            <a:r>
+              <a:rPr lang="es-MX" dirty="0" err="1"/>
+              <a:t>context</a:t>
+            </a:r>
+            <a:endParaRPr lang="es-MX" dirty="0"/>
+          </a:p>
+          <a:p>
+            <a:pPr lvl="1"/>
+            <a:r>
+              <a:rPr lang="es-MX" dirty="0"/>
+              <a:t>Spring-</a:t>
+            </a:r>
+            <a:r>
+              <a:rPr lang="es-MX" dirty="0" err="1"/>
+              <a:t>jdbc</a:t>
+            </a:r>
+            <a:endParaRPr lang="es-MX" dirty="0"/>
+          </a:p>
+          <a:p>
+            <a:pPr lvl="1"/>
+            <a:r>
+              <a:rPr lang="es-MX" dirty="0"/>
+              <a:t>Spring-</a:t>
+            </a:r>
+            <a:r>
+              <a:rPr lang="es-MX" dirty="0" err="1"/>
+              <a:t>orm</a:t>
+            </a:r>
+            <a:endParaRPr lang="es-MX" dirty="0"/>
+          </a:p>
+          <a:p>
+            <a:pPr lvl="1"/>
+            <a:endParaRPr lang="es-MX" dirty="0"/>
+          </a:p>
+        </p:txBody>
+      </p:sp>
+      <p:pic>
+        <p:nvPicPr>
+          <p:cNvPr id="5" name="Imagen 4">
+            <a:extLst>
+              <a:ext uri="{FF2B5EF4-FFF2-40B4-BE49-F238E27FC236}">
+                <a16:creationId xmlns:a16="http://schemas.microsoft.com/office/drawing/2014/main" id="{FC072A06-928C-426B-A046-4293EC69625D}"/>
+              </a:ext>
+            </a:extLst>
+          </p:cNvPr>
+          <p:cNvPicPr>
+            <a:picLocks noChangeAspect="1"/>
+          </p:cNvPicPr>
+          <p:nvPr/>
+        </p:nvPicPr>
+        <p:blipFill>
+          <a:blip r:embed="rId2"/>
+          <a:stretch>
+            <a:fillRect/>
+          </a:stretch>
+        </p:blipFill>
+        <p:spPr>
+          <a:xfrm>
+            <a:off x="5608320" y="1198486"/>
+            <a:ext cx="5098909" cy="5518102"/>
+          </a:xfrm>
+          <a:prstGeom prst="rect">
+            <a:avLst/>
+          </a:prstGeom>
+        </p:spPr>
+      </p:pic>
+    </p:spTree>
+    <p:extLst>
+      <p:ext uri="{BB962C8B-B14F-4D97-AF65-F5344CB8AC3E}">
+        <p14:creationId xmlns:p14="http://schemas.microsoft.com/office/powerpoint/2010/main" val="3967531122"/>
+      </p:ext>
+    </p:extLst>
+  </p:cSld>
+  <p:clrMapOvr>
+    <a:masterClrMapping/>
+  </p:clrMapOvr>
+</p:sld>
+</file>
+
+<file path=ppt/slides/slide14.xml><?xml version="1.0" encoding="utf-8"?>
+<p:sld xmlns:a="http://schemas.openxmlformats.org/drawingml/2006/main" xmlns:r="http://schemas.openxmlformats.org/officeDocument/2006/relationships" xmlns:p="http://schemas.openxmlformats.org/presentationml/2006/main">
+  <p:cSld>
+    <p:spTree>
+      <p:nvGrpSpPr>
+        <p:cNvPr id="1" name=""/>
+        <p:cNvGrpSpPr/>
+        <p:nvPr/>
+      </p:nvGrpSpPr>
+      <p:grpSpPr>
+        <a:xfrm>
+          <a:off x="0" y="0"/>
+          <a:ext cx="0" cy="0"/>
+          <a:chOff x="0" y="0"/>
+          <a:chExt cx="0" cy="0"/>
+        </a:xfrm>
+      </p:grpSpPr>
+      <p:sp>
+        <p:nvSpPr>
+          <p:cNvPr id="3" name="Marcador de contenido 2">
+            <a:extLst>
+              <a:ext uri="{FF2B5EF4-FFF2-40B4-BE49-F238E27FC236}">
+                <a16:creationId xmlns:a16="http://schemas.microsoft.com/office/drawing/2014/main" id="{A8981286-89B0-4705-9D1C-4D489275130A}"/>
+              </a:ext>
+            </a:extLst>
+          </p:cNvPr>
+          <p:cNvSpPr>
+            <a:spLocks noGrp="1"/>
+          </p:cNvSpPr>
+          <p:nvPr>
+            <p:ph idx="1"/>
+          </p:nvPr>
+        </p:nvSpPr>
+        <p:spPr>
+          <a:xfrm>
+            <a:off x="626110" y="1007849"/>
+            <a:ext cx="6405880" cy="563710"/>
+          </a:xfrm>
+        </p:spPr>
+        <p:txBody>
+          <a:bodyPr/>
+          <a:lstStyle/>
+          <a:p>
+            <a:r>
+              <a:rPr lang="es-MX" dirty="0"/>
+              <a:t>Dependencia MySQL-Conector-java versión 8.0.27:</a:t>
+            </a:r>
+          </a:p>
+          <a:p>
+            <a:endParaRPr lang="es-MX" dirty="0"/>
+          </a:p>
+        </p:txBody>
+      </p:sp>
+      <p:pic>
+        <p:nvPicPr>
+          <p:cNvPr id="5" name="Imagen 4">
+            <a:extLst>
+              <a:ext uri="{FF2B5EF4-FFF2-40B4-BE49-F238E27FC236}">
+                <a16:creationId xmlns:a16="http://schemas.microsoft.com/office/drawing/2014/main" id="{F8AEA02E-81BD-4F3A-8EBD-2F43C2CAB0A2}"/>
+              </a:ext>
+            </a:extLst>
+          </p:cNvPr>
+          <p:cNvPicPr>
+            <a:picLocks noChangeAspect="1"/>
+          </p:cNvPicPr>
+          <p:nvPr/>
+        </p:nvPicPr>
+        <p:blipFill>
+          <a:blip r:embed="rId2"/>
+          <a:stretch>
+            <a:fillRect/>
+          </a:stretch>
+        </p:blipFill>
+        <p:spPr>
+          <a:xfrm>
+            <a:off x="3333395" y="1679172"/>
+            <a:ext cx="5525210" cy="1369695"/>
+          </a:xfrm>
+          <a:prstGeom prst="rect">
+            <a:avLst/>
+          </a:prstGeom>
+        </p:spPr>
+      </p:pic>
+      <p:sp>
+        <p:nvSpPr>
+          <p:cNvPr id="6" name="Marcador de contenido 2">
+            <a:extLst>
+              <a:ext uri="{FF2B5EF4-FFF2-40B4-BE49-F238E27FC236}">
+                <a16:creationId xmlns:a16="http://schemas.microsoft.com/office/drawing/2014/main" id="{2DAAA271-6B61-4797-87EE-16450F755B1B}"/>
+              </a:ext>
+            </a:extLst>
+          </p:cNvPr>
+          <p:cNvSpPr txBox="1">
+            <a:spLocks/>
+          </p:cNvSpPr>
+          <p:nvPr/>
+        </p:nvSpPr>
+        <p:spPr>
+          <a:xfrm>
+            <a:off x="626110" y="3429000"/>
+            <a:ext cx="6405880" cy="563710"/>
+          </a:xfrm>
+          <a:prstGeom prst="rect">
+            <a:avLst/>
+          </a:prstGeom>
+        </p:spPr>
+        <p:txBody>
+          <a:bodyPr vert="horz" lIns="91440" tIns="45720" rIns="91440" bIns="45720" rtlCol="0">
+            <a:noAutofit/>
+          </a:bodyPr>
+          <a:lstStyle>
+            <a:lvl1pPr marL="228600" indent="-228600" algn="l" defTabSz="914400" rtl="0" eaLnBrk="1" latinLnBrk="0" hangingPunct="1">
+              <a:lnSpc>
+                <a:spcPct val="90000"/>
+              </a:lnSpc>
+              <a:spcBef>
+                <a:spcPts val="1000"/>
+              </a:spcBef>
+              <a:buFont typeface="Arial" panose="020B0604020202020204" pitchFamily="34" charset="0"/>
+              <a:buChar char="•"/>
+              <a:defRPr sz="2000" kern="1200">
+                <a:solidFill>
+                  <a:schemeClr val="tx1"/>
+                </a:solidFill>
+                <a:latin typeface="+mn-lt"/>
+                <a:ea typeface="+mn-ea"/>
+                <a:cs typeface="+mn-cs"/>
+              </a:defRPr>
+            </a:lvl1pPr>
+            <a:lvl2pPr marL="685800" indent="-228600" algn="l" defTabSz="914400" rtl="0" eaLnBrk="1" latinLnBrk="0" hangingPunct="1">
+              <a:lnSpc>
+                <a:spcPct val="90000"/>
+              </a:lnSpc>
+              <a:spcBef>
+                <a:spcPts val="500"/>
+              </a:spcBef>
+              <a:buFont typeface="Arial" panose="020B0604020202020204" pitchFamily="34" charset="0"/>
+              <a:buChar char="•"/>
+              <a:defRPr sz="2000" kern="1200">
+                <a:solidFill>
+                  <a:schemeClr val="tx1"/>
+                </a:solidFill>
+                <a:latin typeface="+mn-lt"/>
+                <a:ea typeface="+mn-ea"/>
+                <a:cs typeface="+mn-cs"/>
+              </a:defRPr>
+            </a:lvl2pPr>
+            <a:lvl3pPr marL="1143000" indent="-228600" algn="l" defTabSz="914400" rtl="0" eaLnBrk="1" latinLnBrk="0" hangingPunct="1">
+              <a:lnSpc>
+                <a:spcPct val="90000"/>
+              </a:lnSpc>
+              <a:spcBef>
+                <a:spcPts val="500"/>
+              </a:spcBef>
+              <a:buFont typeface="Arial" panose="020B0604020202020204" pitchFamily="34" charset="0"/>
+              <a:buChar char="•"/>
+              <a:defRPr sz="2000" kern="1200">
+                <a:solidFill>
+                  <a:schemeClr val="tx1"/>
+                </a:solidFill>
+                <a:latin typeface="+mn-lt"/>
+                <a:ea typeface="+mn-ea"/>
+                <a:cs typeface="+mn-cs"/>
+              </a:defRPr>
+            </a:lvl3pPr>
+            <a:lvl4pPr marL="1600200" indent="-228600" algn="l" defTabSz="914400" rtl="0" eaLnBrk="1" latinLnBrk="0" hangingPunct="1">
+              <a:lnSpc>
+                <a:spcPct val="90000"/>
+              </a:lnSpc>
+              <a:spcBef>
+                <a:spcPts val="500"/>
+              </a:spcBef>
+              <a:buFont typeface="Arial" panose="020B0604020202020204" pitchFamily="34" charset="0"/>
+              <a:buChar char="•"/>
+              <a:defRPr sz="2000" kern="1200">
+                <a:solidFill>
+                  <a:schemeClr val="tx1"/>
+                </a:solidFill>
+                <a:latin typeface="+mn-lt"/>
+                <a:ea typeface="+mn-ea"/>
+                <a:cs typeface="+mn-cs"/>
+              </a:defRPr>
+            </a:lvl4pPr>
+            <a:lvl5pPr marL="2057400" indent="-228600" algn="l" defTabSz="914400" rtl="0" eaLnBrk="1" latinLnBrk="0" hangingPunct="1">
+              <a:lnSpc>
+                <a:spcPct val="90000"/>
+              </a:lnSpc>
+              <a:spcBef>
+                <a:spcPts val="500"/>
+              </a:spcBef>
+              <a:buFont typeface="Arial" panose="020B0604020202020204" pitchFamily="34" charset="0"/>
+              <a:buChar char="•"/>
+              <a:defRPr sz="2000" kern="1200">
+                <a:solidFill>
+                  <a:schemeClr val="tx1"/>
+                </a:solidFill>
+                <a:latin typeface="+mn-lt"/>
+                <a:ea typeface="+mn-ea"/>
+                <a:cs typeface="+mn-cs"/>
+              </a:defRPr>
+            </a:lvl5pPr>
+            <a:lvl6pPr marL="2514600" indent="-228600" algn="l" defTabSz="914400" rtl="0" eaLnBrk="1" latinLnBrk="0" hangingPunct="1">
+              <a:lnSpc>
+                <a:spcPct val="90000"/>
+              </a:lnSpc>
+              <a:spcBef>
+                <a:spcPts val="500"/>
+              </a:spcBef>
+              <a:buFont typeface="Arial" panose="020B0604020202020204" pitchFamily="34" charset="0"/>
+              <a:buChar char="•"/>
+              <a:defRPr sz="1800" kern="1200">
+                <a:solidFill>
+                  <a:schemeClr val="tx1"/>
+                </a:solidFill>
+                <a:latin typeface="+mn-lt"/>
+                <a:ea typeface="+mn-ea"/>
+                <a:cs typeface="+mn-cs"/>
+              </a:defRPr>
+            </a:lvl6pPr>
+            <a:lvl7pPr marL="2971800" indent="-228600" algn="l" defTabSz="914400" rtl="0" eaLnBrk="1" latinLnBrk="0" hangingPunct="1">
+              <a:lnSpc>
+                <a:spcPct val="90000"/>
+              </a:lnSpc>
+              <a:spcBef>
+                <a:spcPts val="500"/>
+              </a:spcBef>
+              <a:buFont typeface="Arial" panose="020B0604020202020204" pitchFamily="34" charset="0"/>
+              <a:buChar char="•"/>
+              <a:defRPr sz="1800" kern="1200">
+                <a:solidFill>
+                  <a:schemeClr val="tx1"/>
+                </a:solidFill>
+                <a:latin typeface="+mn-lt"/>
+                <a:ea typeface="+mn-ea"/>
+                <a:cs typeface="+mn-cs"/>
+              </a:defRPr>
+            </a:lvl7pPr>
+            <a:lvl8pPr marL="3429000" indent="-228600" algn="l" defTabSz="914400" rtl="0" eaLnBrk="1" latinLnBrk="0" hangingPunct="1">
+              <a:lnSpc>
+                <a:spcPct val="90000"/>
+              </a:lnSpc>
+              <a:spcBef>
+                <a:spcPts val="500"/>
+              </a:spcBef>
+              <a:buFont typeface="Arial" panose="020B0604020202020204" pitchFamily="34" charset="0"/>
+              <a:buChar char="•"/>
+              <a:defRPr sz="1800" kern="1200">
+                <a:solidFill>
+                  <a:schemeClr val="tx1"/>
+                </a:solidFill>
+                <a:latin typeface="+mn-lt"/>
+                <a:ea typeface="+mn-ea"/>
+                <a:cs typeface="+mn-cs"/>
+              </a:defRPr>
+            </a:lvl8pPr>
+            <a:lvl9pPr marL="3886200" indent="-228600" algn="l" defTabSz="914400" rtl="0" eaLnBrk="1" latinLnBrk="0" hangingPunct="1">
+              <a:lnSpc>
+                <a:spcPct val="90000"/>
+              </a:lnSpc>
+              <a:spcBef>
+                <a:spcPts val="500"/>
+              </a:spcBef>
+              <a:buFont typeface="Arial" panose="020B0604020202020204" pitchFamily="34" charset="0"/>
+              <a:buChar char="•"/>
+              <a:defRPr sz="1800" kern="1200">
+                <a:solidFill>
+                  <a:schemeClr val="tx1"/>
+                </a:solidFill>
+                <a:latin typeface="+mn-lt"/>
+                <a:ea typeface="+mn-ea"/>
+                <a:cs typeface="+mn-cs"/>
+              </a:defRPr>
+            </a:lvl9pPr>
+          </a:lstStyle>
+          <a:p>
+            <a:r>
+              <a:rPr lang="es-MX" dirty="0"/>
+              <a:t>Dependencia Hibernate versión 5.6.7.final:</a:t>
+            </a:r>
+          </a:p>
+        </p:txBody>
+      </p:sp>
+      <p:pic>
+        <p:nvPicPr>
+          <p:cNvPr id="8" name="Imagen 7">
+            <a:extLst>
+              <a:ext uri="{FF2B5EF4-FFF2-40B4-BE49-F238E27FC236}">
+                <a16:creationId xmlns:a16="http://schemas.microsoft.com/office/drawing/2014/main" id="{39D941CD-0B2F-419D-BAA1-5F6562F833E6}"/>
+              </a:ext>
+            </a:extLst>
+          </p:cNvPr>
+          <p:cNvPicPr>
+            <a:picLocks noChangeAspect="1"/>
+          </p:cNvPicPr>
+          <p:nvPr/>
+        </p:nvPicPr>
+        <p:blipFill>
+          <a:blip r:embed="rId3"/>
+          <a:stretch>
+            <a:fillRect/>
+          </a:stretch>
+        </p:blipFill>
+        <p:spPr>
+          <a:xfrm>
+            <a:off x="3363820" y="4063661"/>
+            <a:ext cx="5494785" cy="1530690"/>
+          </a:xfrm>
+          <a:prstGeom prst="rect">
+            <a:avLst/>
+          </a:prstGeom>
+        </p:spPr>
+      </p:pic>
+    </p:spTree>
+    <p:extLst>
+      <p:ext uri="{BB962C8B-B14F-4D97-AF65-F5344CB8AC3E}">
+        <p14:creationId xmlns:p14="http://schemas.microsoft.com/office/powerpoint/2010/main" val="3361027710"/>
+      </p:ext>
+    </p:extLst>
+  </p:cSld>
+  <p:clrMapOvr>
+    <a:masterClrMapping/>
+  </p:clrMapOvr>
+</p:sld>
+</file>
+
+<file path=ppt/slides/slide15.xml><?xml version="1.0" encoding="utf-8"?>
+<p:sld xmlns:a="http://schemas.openxmlformats.org/drawingml/2006/main" xmlns:r="http://schemas.openxmlformats.org/officeDocument/2006/relationships" xmlns:p="http://schemas.openxmlformats.org/presentationml/2006/main">
+  <p:cSld>
+    <p:spTree>
+      <p:nvGrpSpPr>
+        <p:cNvPr id="1" name=""/>
+        <p:cNvGrpSpPr/>
+        <p:nvPr/>
+      </p:nvGrpSpPr>
+      <p:grpSpPr>
+        <a:xfrm>
+          <a:off x="0" y="0"/>
+          <a:ext cx="0" cy="0"/>
+          <a:chOff x="0" y="0"/>
+          <a:chExt cx="0" cy="0"/>
+        </a:xfrm>
+      </p:grpSpPr>
+      <p:sp>
+        <p:nvSpPr>
+          <p:cNvPr id="2" name="Título 1">
+            <a:extLst>
+              <a:ext uri="{FF2B5EF4-FFF2-40B4-BE49-F238E27FC236}">
+                <a16:creationId xmlns:a16="http://schemas.microsoft.com/office/drawing/2014/main" id="{E77A0B5B-EEF4-4C39-A379-34CFCB19EA07}"/>
+              </a:ext>
+            </a:extLst>
+          </p:cNvPr>
+          <p:cNvSpPr>
+            <a:spLocks noGrp="1"/>
+          </p:cNvSpPr>
+          <p:nvPr>
+            <p:ph type="title"/>
+          </p:nvPr>
+        </p:nvSpPr>
+        <p:spPr/>
+        <p:txBody>
+          <a:bodyPr/>
+          <a:lstStyle/>
+          <a:p>
+            <a:r>
+              <a:rPr lang="es-MX" dirty="0"/>
+              <a:t>Para Hibernate trabaje con Spring ORM</a:t>
+            </a:r>
+          </a:p>
+        </p:txBody>
+      </p:sp>
+      <p:sp>
+        <p:nvSpPr>
+          <p:cNvPr id="4" name="Rectángulo: esquinas redondeadas 3">
+            <a:extLst>
+              <a:ext uri="{FF2B5EF4-FFF2-40B4-BE49-F238E27FC236}">
+                <a16:creationId xmlns:a16="http://schemas.microsoft.com/office/drawing/2014/main" id="{6C8E5785-5097-4912-95FD-10065819CB59}"/>
+              </a:ext>
+            </a:extLst>
+          </p:cNvPr>
+          <p:cNvSpPr/>
+          <p:nvPr/>
+        </p:nvSpPr>
+        <p:spPr>
+          <a:xfrm>
+            <a:off x="963819" y="1818856"/>
+            <a:ext cx="1686560" cy="712064"/>
+          </a:xfrm>
+          <a:prstGeom prst="roundRect">
+            <a:avLst/>
+          </a:prstGeom>
+          <a:solidFill>
+            <a:schemeClr val="accent5">
+              <a:lumMod val="40000"/>
+              <a:lumOff val="60000"/>
+            </a:schemeClr>
+          </a:solidFill>
+        </p:spPr>
+        <p:style>
+          <a:lnRef idx="2">
+            <a:schemeClr val="accent1">
+              <a:shade val="50000"/>
+            </a:schemeClr>
+          </a:lnRef>
+          <a:fillRef idx="1">
+            <a:schemeClr val="accent1"/>
+          </a:fillRef>
+          <a:effectRef idx="0">
+            <a:schemeClr val="accent1"/>
+          </a:effectRef>
+          <a:fontRef idx="minor">
+            <a:schemeClr val="lt1"/>
+          </a:fontRef>
+        </p:style>
+        <p:txBody>
+          <a:bodyPr rtlCol="0" anchor="ctr"/>
+          <a:lstStyle/>
+          <a:p>
+            <a:pPr algn="ctr"/>
+            <a:r>
+              <a:rPr lang="es-MX" dirty="0" err="1">
+                <a:solidFill>
+                  <a:schemeClr val="tx1"/>
+                </a:solidFill>
+              </a:rPr>
+              <a:t>DataSources</a:t>
+            </a:r>
+            <a:endParaRPr lang="es-MX" dirty="0">
+              <a:solidFill>
+                <a:schemeClr val="tx1"/>
+              </a:solidFill>
+            </a:endParaRPr>
+          </a:p>
+        </p:txBody>
+      </p:sp>
+      <p:sp>
+        <p:nvSpPr>
+          <p:cNvPr id="5" name="Rectángulo: esquinas redondeadas 4">
+            <a:extLst>
+              <a:ext uri="{FF2B5EF4-FFF2-40B4-BE49-F238E27FC236}">
+                <a16:creationId xmlns:a16="http://schemas.microsoft.com/office/drawing/2014/main" id="{3D723878-EF49-465B-A153-A0F51DD9A536}"/>
+              </a:ext>
+            </a:extLst>
+          </p:cNvPr>
+          <p:cNvSpPr/>
+          <p:nvPr/>
+        </p:nvSpPr>
+        <p:spPr>
+          <a:xfrm>
+            <a:off x="4805681" y="1414735"/>
+            <a:ext cx="2930469" cy="1070927"/>
+          </a:xfrm>
+          <a:prstGeom prst="roundRect">
+            <a:avLst/>
+          </a:prstGeom>
+          <a:solidFill>
+            <a:schemeClr val="accent5">
+              <a:lumMod val="40000"/>
+              <a:lumOff val="60000"/>
+            </a:schemeClr>
+          </a:solidFill>
+        </p:spPr>
+        <p:style>
+          <a:lnRef idx="2">
+            <a:schemeClr val="accent1">
+              <a:shade val="50000"/>
+            </a:schemeClr>
+          </a:lnRef>
+          <a:fillRef idx="1">
+            <a:schemeClr val="accent1"/>
+          </a:fillRef>
+          <a:effectRef idx="0">
+            <a:schemeClr val="accent1"/>
+          </a:effectRef>
+          <a:fontRef idx="minor">
+            <a:schemeClr val="lt1"/>
+          </a:fontRef>
+        </p:style>
+        <p:txBody>
+          <a:bodyPr rtlCol="0" anchor="ctr"/>
+          <a:lstStyle/>
+          <a:p>
+            <a:pPr algn="ctr"/>
+            <a:r>
+              <a:rPr lang="es-MX" dirty="0" err="1">
+                <a:solidFill>
+                  <a:schemeClr val="tx1"/>
+                </a:solidFill>
+              </a:rPr>
+              <a:t>LocalSessionFactoryBean</a:t>
+            </a:r>
+            <a:endParaRPr lang="es-MX" dirty="0">
+              <a:solidFill>
+                <a:schemeClr val="tx1"/>
+              </a:solidFill>
+            </a:endParaRPr>
+          </a:p>
+        </p:txBody>
+      </p:sp>
+      <p:sp>
+        <p:nvSpPr>
+          <p:cNvPr id="6" name="Rectángulo: esquinas redondeadas 5">
+            <a:extLst>
+              <a:ext uri="{FF2B5EF4-FFF2-40B4-BE49-F238E27FC236}">
+                <a16:creationId xmlns:a16="http://schemas.microsoft.com/office/drawing/2014/main" id="{0C84A93D-C717-4C33-9E37-FEFFEC455F82}"/>
+              </a:ext>
+            </a:extLst>
+          </p:cNvPr>
+          <p:cNvSpPr/>
+          <p:nvPr/>
+        </p:nvSpPr>
+        <p:spPr>
+          <a:xfrm>
+            <a:off x="8741297" y="4499800"/>
+            <a:ext cx="2206103" cy="712064"/>
+          </a:xfrm>
+          <a:prstGeom prst="roundRect">
+            <a:avLst/>
+          </a:prstGeom>
+          <a:solidFill>
+            <a:schemeClr val="accent5">
+              <a:lumMod val="40000"/>
+              <a:lumOff val="60000"/>
+            </a:schemeClr>
+          </a:solidFill>
+        </p:spPr>
+        <p:style>
+          <a:lnRef idx="2">
+            <a:schemeClr val="accent1">
+              <a:shade val="50000"/>
+            </a:schemeClr>
+          </a:lnRef>
+          <a:fillRef idx="1">
+            <a:schemeClr val="accent1"/>
+          </a:fillRef>
+          <a:effectRef idx="0">
+            <a:schemeClr val="accent1"/>
+          </a:effectRef>
+          <a:fontRef idx="minor">
+            <a:schemeClr val="lt1"/>
+          </a:fontRef>
+        </p:style>
+        <p:txBody>
+          <a:bodyPr rtlCol="0" anchor="ctr"/>
+          <a:lstStyle/>
+          <a:p>
+            <a:pPr algn="ctr"/>
+            <a:r>
+              <a:rPr lang="es-MX" dirty="0" err="1">
+                <a:solidFill>
+                  <a:schemeClr val="tx1"/>
+                </a:solidFill>
+              </a:rPr>
+              <a:t>HibernateTemplate</a:t>
+            </a:r>
+            <a:endParaRPr lang="es-MX" dirty="0">
+              <a:solidFill>
+                <a:schemeClr val="tx1"/>
+              </a:solidFill>
+            </a:endParaRPr>
+          </a:p>
+        </p:txBody>
+      </p:sp>
+      <p:sp>
+        <p:nvSpPr>
+          <p:cNvPr id="7" name="Rectángulo: esquinas redondeadas 6">
+            <a:extLst>
+              <a:ext uri="{FF2B5EF4-FFF2-40B4-BE49-F238E27FC236}">
+                <a16:creationId xmlns:a16="http://schemas.microsoft.com/office/drawing/2014/main" id="{B8A1D9FB-B8F1-40B6-AFC2-6FE8FB1B1CC8}"/>
+              </a:ext>
+            </a:extLst>
+          </p:cNvPr>
+          <p:cNvSpPr/>
+          <p:nvPr/>
+        </p:nvSpPr>
+        <p:spPr>
+          <a:xfrm>
+            <a:off x="8837819" y="1950199"/>
+            <a:ext cx="2013061" cy="712064"/>
+          </a:xfrm>
+          <a:prstGeom prst="roundRect">
+            <a:avLst/>
+          </a:prstGeom>
+          <a:solidFill>
+            <a:schemeClr val="accent5">
+              <a:lumMod val="40000"/>
+              <a:lumOff val="60000"/>
+            </a:schemeClr>
+          </a:solidFill>
+        </p:spPr>
+        <p:style>
+          <a:lnRef idx="2">
+            <a:schemeClr val="accent1">
+              <a:shade val="50000"/>
+            </a:schemeClr>
+          </a:lnRef>
+          <a:fillRef idx="1">
+            <a:schemeClr val="accent1"/>
+          </a:fillRef>
+          <a:effectRef idx="0">
+            <a:schemeClr val="accent1"/>
+          </a:effectRef>
+          <a:fontRef idx="minor">
+            <a:schemeClr val="lt1"/>
+          </a:fontRef>
+        </p:style>
+        <p:txBody>
+          <a:bodyPr rtlCol="0" anchor="ctr"/>
+          <a:lstStyle/>
+          <a:p>
+            <a:pPr algn="ctr"/>
+            <a:r>
+              <a:rPr lang="es-MX" dirty="0" err="1">
+                <a:solidFill>
+                  <a:schemeClr val="tx1"/>
+                </a:solidFill>
+              </a:rPr>
+              <a:t>SessionFactory</a:t>
+            </a:r>
+            <a:endParaRPr lang="es-MX" dirty="0">
+              <a:solidFill>
+                <a:schemeClr val="tx1"/>
+              </a:solidFill>
+            </a:endParaRPr>
+          </a:p>
+        </p:txBody>
+      </p:sp>
+      <p:sp>
+        <p:nvSpPr>
+          <p:cNvPr id="8" name="Rectángulo: esquinas redondeadas 7">
+            <a:extLst>
+              <a:ext uri="{FF2B5EF4-FFF2-40B4-BE49-F238E27FC236}">
+                <a16:creationId xmlns:a16="http://schemas.microsoft.com/office/drawing/2014/main" id="{170D1781-3559-44B6-919F-18583B3A3B1C}"/>
+              </a:ext>
+            </a:extLst>
+          </p:cNvPr>
+          <p:cNvSpPr/>
+          <p:nvPr/>
+        </p:nvSpPr>
+        <p:spPr>
+          <a:xfrm>
+            <a:off x="3373933" y="5415064"/>
+            <a:ext cx="2206103" cy="712064"/>
+          </a:xfrm>
+          <a:prstGeom prst="roundRect">
+            <a:avLst/>
+          </a:prstGeom>
+          <a:solidFill>
+            <a:schemeClr val="accent5">
+              <a:lumMod val="40000"/>
+              <a:lumOff val="60000"/>
+            </a:schemeClr>
+          </a:solidFill>
+        </p:spPr>
+        <p:style>
+          <a:lnRef idx="2">
+            <a:schemeClr val="accent1">
+              <a:shade val="50000"/>
+            </a:schemeClr>
+          </a:lnRef>
+          <a:fillRef idx="1">
+            <a:schemeClr val="accent1"/>
+          </a:fillRef>
+          <a:effectRef idx="0">
+            <a:schemeClr val="accent1"/>
+          </a:effectRef>
+          <a:fontRef idx="minor">
+            <a:schemeClr val="lt1"/>
+          </a:fontRef>
+        </p:style>
+        <p:txBody>
+          <a:bodyPr rtlCol="0" anchor="ctr"/>
+          <a:lstStyle/>
+          <a:p>
+            <a:pPr algn="ctr"/>
+            <a:r>
+              <a:rPr lang="es-MX" dirty="0" err="1">
+                <a:solidFill>
+                  <a:schemeClr val="tx1"/>
+                </a:solidFill>
+              </a:rPr>
+              <a:t>ClassDao</a:t>
+            </a:r>
+            <a:endParaRPr lang="es-MX" dirty="0">
+              <a:solidFill>
+                <a:schemeClr val="tx1"/>
+              </a:solidFill>
+            </a:endParaRPr>
+          </a:p>
+        </p:txBody>
+      </p:sp>
+      <p:cxnSp>
+        <p:nvCxnSpPr>
+          <p:cNvPr id="12" name="Conector recto de flecha 11">
+            <a:extLst>
+              <a:ext uri="{FF2B5EF4-FFF2-40B4-BE49-F238E27FC236}">
+                <a16:creationId xmlns:a16="http://schemas.microsoft.com/office/drawing/2014/main" id="{52A84562-76AF-421D-A163-14CF2B22BD05}"/>
+              </a:ext>
+            </a:extLst>
+          </p:cNvPr>
+          <p:cNvCxnSpPr>
+            <a:cxnSpLocks/>
+            <a:stCxn id="4" idx="3"/>
+            <a:endCxn id="5" idx="1"/>
+          </p:cNvCxnSpPr>
+          <p:nvPr/>
+        </p:nvCxnSpPr>
+        <p:spPr>
+          <a:xfrm flipV="1">
+            <a:off x="2650379" y="1950199"/>
+            <a:ext cx="2155302" cy="224689"/>
+          </a:xfrm>
+          <a:prstGeom prst="straightConnector1">
+            <a:avLst/>
+          </a:prstGeom>
+          <a:ln w="12700">
+            <a:solidFill>
+              <a:schemeClr val="tx1"/>
+            </a:solidFill>
+            <a:tailEnd type="triangle"/>
+          </a:ln>
+        </p:spPr>
+        <p:style>
+          <a:lnRef idx="1">
+            <a:schemeClr val="accent1"/>
+          </a:lnRef>
+          <a:fillRef idx="0">
+            <a:schemeClr val="accent1"/>
+          </a:fillRef>
+          <a:effectRef idx="0">
+            <a:schemeClr val="accent1"/>
+          </a:effectRef>
+          <a:fontRef idx="minor">
+            <a:schemeClr val="tx1"/>
+          </a:fontRef>
+        </p:style>
+      </p:cxnSp>
+      <p:cxnSp>
+        <p:nvCxnSpPr>
+          <p:cNvPr id="13" name="Conector recto de flecha 12">
+            <a:extLst>
+              <a:ext uri="{FF2B5EF4-FFF2-40B4-BE49-F238E27FC236}">
+                <a16:creationId xmlns:a16="http://schemas.microsoft.com/office/drawing/2014/main" id="{C44D4998-8542-471B-8561-C5F8AE467B4B}"/>
+              </a:ext>
+            </a:extLst>
+          </p:cNvPr>
+          <p:cNvCxnSpPr>
+            <a:cxnSpLocks/>
+            <a:stCxn id="5" idx="3"/>
+            <a:endCxn id="7" idx="1"/>
+          </p:cNvCxnSpPr>
+          <p:nvPr/>
+        </p:nvCxnSpPr>
+        <p:spPr>
+          <a:xfrm>
+            <a:off x="7736150" y="1950199"/>
+            <a:ext cx="1101669" cy="356032"/>
+          </a:xfrm>
+          <a:prstGeom prst="straightConnector1">
+            <a:avLst/>
+          </a:prstGeom>
+          <a:ln w="12700">
+            <a:solidFill>
+              <a:schemeClr val="tx1"/>
+            </a:solidFill>
+            <a:tailEnd type="triangle"/>
+          </a:ln>
+        </p:spPr>
+        <p:style>
+          <a:lnRef idx="1">
+            <a:schemeClr val="accent1"/>
+          </a:lnRef>
+          <a:fillRef idx="0">
+            <a:schemeClr val="accent1"/>
+          </a:fillRef>
+          <a:effectRef idx="0">
+            <a:schemeClr val="accent1"/>
+          </a:effectRef>
+          <a:fontRef idx="minor">
+            <a:schemeClr val="tx1"/>
+          </a:fontRef>
+        </p:style>
+      </p:cxnSp>
+      <p:cxnSp>
+        <p:nvCxnSpPr>
+          <p:cNvPr id="19" name="Conector recto de flecha 18">
+            <a:extLst>
+              <a:ext uri="{FF2B5EF4-FFF2-40B4-BE49-F238E27FC236}">
+                <a16:creationId xmlns:a16="http://schemas.microsoft.com/office/drawing/2014/main" id="{054AEC92-0DA4-48F8-B1FF-1AD8F10AB949}"/>
+              </a:ext>
+            </a:extLst>
+          </p:cNvPr>
+          <p:cNvCxnSpPr>
+            <a:stCxn id="6" idx="1"/>
+            <a:endCxn id="8" idx="3"/>
+          </p:cNvCxnSpPr>
+          <p:nvPr/>
+        </p:nvCxnSpPr>
+        <p:spPr>
+          <a:xfrm flipH="1">
+            <a:off x="5580036" y="4855832"/>
+            <a:ext cx="3161261" cy="915264"/>
+          </a:xfrm>
+          <a:prstGeom prst="straightConnector1">
+            <a:avLst/>
+          </a:prstGeom>
+          <a:ln w="12700">
+            <a:solidFill>
+              <a:schemeClr val="tx1"/>
+            </a:solidFill>
+            <a:tailEnd type="triangle"/>
+          </a:ln>
+        </p:spPr>
+        <p:style>
+          <a:lnRef idx="1">
+            <a:schemeClr val="accent1"/>
+          </a:lnRef>
+          <a:fillRef idx="0">
+            <a:schemeClr val="accent1"/>
+          </a:fillRef>
+          <a:effectRef idx="0">
+            <a:schemeClr val="accent1"/>
+          </a:effectRef>
+          <a:fontRef idx="minor">
+            <a:schemeClr val="tx1"/>
+          </a:fontRef>
+        </p:style>
+      </p:cxnSp>
+      <p:cxnSp>
+        <p:nvCxnSpPr>
+          <p:cNvPr id="21" name="Conector recto de flecha 20">
+            <a:extLst>
+              <a:ext uri="{FF2B5EF4-FFF2-40B4-BE49-F238E27FC236}">
+                <a16:creationId xmlns:a16="http://schemas.microsoft.com/office/drawing/2014/main" id="{4AD40FDB-BA43-4E2A-834B-1D928B2B3267}"/>
+              </a:ext>
+            </a:extLst>
+          </p:cNvPr>
+          <p:cNvCxnSpPr>
+            <a:stCxn id="7" idx="2"/>
+            <a:endCxn id="6" idx="0"/>
+          </p:cNvCxnSpPr>
+          <p:nvPr/>
+        </p:nvCxnSpPr>
+        <p:spPr>
+          <a:xfrm flipH="1">
+            <a:off x="9844349" y="2662263"/>
+            <a:ext cx="1" cy="1837537"/>
+          </a:xfrm>
+          <a:prstGeom prst="straightConnector1">
+            <a:avLst/>
+          </a:prstGeom>
+          <a:ln w="12700">
+            <a:solidFill>
+              <a:schemeClr val="tx1"/>
+            </a:solidFill>
+            <a:tailEnd type="triangle"/>
+          </a:ln>
+        </p:spPr>
+        <p:style>
+          <a:lnRef idx="1">
+            <a:schemeClr val="accent1"/>
+          </a:lnRef>
+          <a:fillRef idx="0">
+            <a:schemeClr val="accent1"/>
+          </a:fillRef>
+          <a:effectRef idx="0">
+            <a:schemeClr val="accent1"/>
+          </a:effectRef>
+          <a:fontRef idx="minor">
+            <a:schemeClr val="tx1"/>
+          </a:fontRef>
+        </p:style>
+      </p:cxnSp>
+      <p:sp>
+        <p:nvSpPr>
+          <p:cNvPr id="36" name="CuadroTexto 35">
+            <a:extLst>
+              <a:ext uri="{FF2B5EF4-FFF2-40B4-BE49-F238E27FC236}">
+                <a16:creationId xmlns:a16="http://schemas.microsoft.com/office/drawing/2014/main" id="{1BC66DE3-6B46-4857-8890-D1B817DA149C}"/>
+              </a:ext>
+            </a:extLst>
+          </p:cNvPr>
+          <p:cNvSpPr txBox="1"/>
+          <p:nvPr/>
+        </p:nvSpPr>
+        <p:spPr>
+          <a:xfrm>
+            <a:off x="729448" y="2697052"/>
+            <a:ext cx="2155301" cy="369332"/>
+          </a:xfrm>
+          <a:prstGeom prst="rect">
+            <a:avLst/>
+          </a:prstGeom>
+          <a:noFill/>
+        </p:spPr>
+        <p:txBody>
+          <a:bodyPr wrap="square" rtlCol="0">
+            <a:spAutoFit/>
+          </a:bodyPr>
+          <a:lstStyle/>
+          <a:p>
+            <a:r>
+              <a:rPr lang="es-MX" dirty="0"/>
+              <a:t>Database properties</a:t>
+            </a:r>
+          </a:p>
+        </p:txBody>
+      </p:sp>
+      <p:sp>
+        <p:nvSpPr>
+          <p:cNvPr id="37" name="CuadroTexto 36">
+            <a:extLst>
+              <a:ext uri="{FF2B5EF4-FFF2-40B4-BE49-F238E27FC236}">
+                <a16:creationId xmlns:a16="http://schemas.microsoft.com/office/drawing/2014/main" id="{CE67139D-46CE-4FDE-AD26-558322FFDD2C}"/>
+              </a:ext>
+            </a:extLst>
+          </p:cNvPr>
+          <p:cNvSpPr txBox="1"/>
+          <p:nvPr/>
+        </p:nvSpPr>
+        <p:spPr>
+          <a:xfrm>
+            <a:off x="5000164" y="2565368"/>
+            <a:ext cx="2541501" cy="923330"/>
+          </a:xfrm>
+          <a:prstGeom prst="rect">
+            <a:avLst/>
+          </a:prstGeom>
+          <a:noFill/>
+        </p:spPr>
+        <p:txBody>
+          <a:bodyPr wrap="square" rtlCol="0">
+            <a:spAutoFit/>
+          </a:bodyPr>
+          <a:lstStyle/>
+          <a:p>
+            <a:r>
+              <a:rPr lang="es-MX" dirty="0"/>
+              <a:t>dataSource</a:t>
+            </a:r>
+          </a:p>
+          <a:p>
+            <a:r>
+              <a:rPr lang="es-MX" dirty="0"/>
+              <a:t>Hibernate properties</a:t>
+            </a:r>
+          </a:p>
+          <a:p>
+            <a:r>
+              <a:rPr lang="es-MX" dirty="0" err="1"/>
+              <a:t>Annotated</a:t>
+            </a:r>
+            <a:r>
+              <a:rPr lang="es-MX" dirty="0"/>
+              <a:t> Class</a:t>
+            </a:r>
+          </a:p>
+        </p:txBody>
+      </p:sp>
+    </p:spTree>
+    <p:extLst>
+      <p:ext uri="{BB962C8B-B14F-4D97-AF65-F5344CB8AC3E}">
+        <p14:creationId xmlns:p14="http://schemas.microsoft.com/office/powerpoint/2010/main" val="3227729375"/>
       </p:ext>
     </p:extLst>
   </p:cSld>
@@ -6619,10 +9960,78 @@
       </p:grpSpPr>
       <p:sp>
         <p:nvSpPr>
-          <p:cNvPr id="2" name="Título 1">
-            <a:extLst>
-              <a:ext uri="{FF2B5EF4-FFF2-40B4-BE49-F238E27FC236}">
-                <a16:creationId xmlns:a16="http://schemas.microsoft.com/office/drawing/2014/main" id="{9D04E482-B315-4B9E-AA4D-6731C4E6B545}"/>
+          <p:cNvPr id="3" name="Marcador de contenido 2">
+            <a:extLst>
+              <a:ext uri="{FF2B5EF4-FFF2-40B4-BE49-F238E27FC236}">
+                <a16:creationId xmlns:a16="http://schemas.microsoft.com/office/drawing/2014/main" id="{2A9A201F-30B6-4620-83ED-3896CE6B3DE5}"/>
+              </a:ext>
+            </a:extLst>
+          </p:cNvPr>
+          <p:cNvSpPr>
+            <a:spLocks noGrp="1"/>
+          </p:cNvSpPr>
+          <p:nvPr>
+            <p:ph idx="1"/>
+          </p:nvPr>
+        </p:nvSpPr>
+        <p:spPr/>
+        <p:txBody>
+          <a:bodyPr/>
+          <a:lstStyle/>
+          <a:p>
+            <a:pPr algn="just"/>
+            <a:r>
+              <a:rPr lang="es-MX" dirty="0"/>
+              <a:t>Con JDBC realizamos la conexión con la base de datos además de realizar consultas nativas a la misma, siendo de gran ayuda en tiempos de respuesta, pero el mantenimiento del código es mucho más costos, además de facilitar los errores en tiempos de ejecución y un desarrollo lento.</a:t>
+            </a:r>
+          </a:p>
+          <a:p>
+            <a:pPr algn="just"/>
+            <a:r>
+              <a:rPr lang="es-MX" dirty="0"/>
+              <a:t>En el ejemplo </a:t>
+            </a:r>
+            <a:r>
+              <a:rPr lang="es-MX" b="1" dirty="0" err="1">
+                <a:hlinkClick r:id="rId2"/>
+              </a:rPr>
+              <a:t>SpringFrameworkJDBC</a:t>
+            </a:r>
+            <a:r>
+              <a:rPr lang="es-MX" dirty="0"/>
+              <a:t> se utiliza una única tabla, pero imagine que se obtienen más entidades, realizar el mapeo de las estructuras seria una enorme labor, además de una gran taza de errores al realizar consultas. </a:t>
+            </a:r>
+          </a:p>
+          <a:p>
+            <a:pPr algn="just"/>
+            <a:r>
+              <a:rPr lang="es-MX" dirty="0"/>
+              <a:t> Es por eso que existe los ORM u Object Relational Mapping que son modelos que nos permiten mapear estructuras de una base de datos relaciones (SQL Server, Oracle, MySQL, </a:t>
+            </a:r>
+            <a:r>
+              <a:rPr lang="es-MX" dirty="0" err="1"/>
+              <a:t>etc</a:t>
+            </a:r>
+            <a:r>
+              <a:rPr lang="es-MX" dirty="0"/>
+              <a:t>).</a:t>
+            </a:r>
+          </a:p>
+          <a:p>
+            <a:pPr algn="just"/>
+            <a:r>
+              <a:rPr lang="es-MX" dirty="0"/>
+              <a:t>La estructura de una BD Relacional queda vinculada con las entidades lógicas del ORM de tal modo que las acciones CRUD pueden ser ejecutadas sobre la base de datos física de forma indirecta por medio del ORM.</a:t>
+            </a:r>
+          </a:p>
+        </p:txBody>
+      </p:sp>
+      <p:sp>
+        <p:nvSpPr>
+          <p:cNvPr id="5" name="Título 4">
+            <a:extLst>
+              <a:ext uri="{FF2B5EF4-FFF2-40B4-BE49-F238E27FC236}">
+                <a16:creationId xmlns:a16="http://schemas.microsoft.com/office/drawing/2014/main" id="{A3C3A254-14D9-44EA-957A-14317A7A1EAE}"/>
               </a:ext>
             </a:extLst>
           </p:cNvPr>
@@ -6640,142 +10049,15 @@
           <a:p>
             <a:r>
               <a:rPr lang="es-MX" b="1" dirty="0"/>
-              <a:t>Estructura de proyecto</a:t>
-            </a:r>
-          </a:p>
-        </p:txBody>
-      </p:sp>
-      <p:sp>
-        <p:nvSpPr>
-          <p:cNvPr id="3" name="Marcador de contenido 2">
-            <a:extLst>
-              <a:ext uri="{FF2B5EF4-FFF2-40B4-BE49-F238E27FC236}">
-                <a16:creationId xmlns:a16="http://schemas.microsoft.com/office/drawing/2014/main" id="{861FE74F-F49C-4D0F-9771-0E4A916E92B1}"/>
-              </a:ext>
-            </a:extLst>
-          </p:cNvPr>
-          <p:cNvSpPr>
-            <a:spLocks noGrp="1"/>
-          </p:cNvSpPr>
-          <p:nvPr>
-            <p:ph idx="1"/>
-          </p:nvPr>
-        </p:nvSpPr>
-        <p:spPr>
-          <a:xfrm>
-            <a:off x="838200" y="1295570"/>
-            <a:ext cx="4384249" cy="4699877"/>
-          </a:xfrm>
-        </p:spPr>
-        <p:txBody>
-          <a:bodyPr/>
-          <a:lstStyle/>
-          <a:p>
-            <a:r>
-              <a:rPr lang="es-MX" dirty="0"/>
-              <a:t>El proyecto cuenta con la sig. estructura.</a:t>
-            </a:r>
-          </a:p>
-          <a:p>
-            <a:r>
-              <a:rPr lang="es-MX" dirty="0"/>
-              <a:t>Donde “</a:t>
-            </a:r>
-            <a:r>
-              <a:rPr lang="es-MX" dirty="0" err="1"/>
-              <a:t>com.cperez.example</a:t>
-            </a:r>
-            <a:r>
-              <a:rPr lang="es-MX" dirty="0"/>
-              <a:t>” tiene la nuestra clase </a:t>
-            </a:r>
-            <a:r>
-              <a:rPr lang="es-MX" dirty="0" err="1"/>
-              <a:t>main</a:t>
-            </a:r>
-            <a:r>
-              <a:rPr lang="es-MX" dirty="0"/>
-              <a:t>,</a:t>
-            </a:r>
-          </a:p>
-          <a:p>
-            <a:r>
-              <a:rPr lang="es-MX" dirty="0"/>
-              <a:t>“.</a:t>
-            </a:r>
-            <a:r>
-              <a:rPr lang="es-MX" dirty="0" err="1"/>
-              <a:t>bean</a:t>
-            </a:r>
-            <a:r>
-              <a:rPr lang="es-MX" dirty="0"/>
-              <a:t>” son los Beans que usaremos o la clase Identidad.</a:t>
-            </a:r>
-          </a:p>
-          <a:p>
-            <a:r>
-              <a:rPr lang="es-MX" dirty="0"/>
-              <a:t>“.</a:t>
-            </a:r>
-            <a:r>
-              <a:rPr lang="es-MX" dirty="0" err="1"/>
-              <a:t>configuration</a:t>
-            </a:r>
-            <a:r>
-              <a:rPr lang="es-MX" dirty="0"/>
-              <a:t>” es donde haremos los Beans con las interfaces de las dependencias que descargamos.</a:t>
-            </a:r>
-          </a:p>
-          <a:p>
-            <a:r>
-              <a:rPr lang="es-MX" dirty="0"/>
-              <a:t>“.</a:t>
-            </a:r>
-            <a:r>
-              <a:rPr lang="es-MX" dirty="0" err="1"/>
-              <a:t>service</a:t>
-            </a:r>
-            <a:r>
-              <a:rPr lang="es-MX" dirty="0"/>
-              <a:t>” estarán los Beans con la notación @Service.</a:t>
-            </a:r>
-          </a:p>
-        </p:txBody>
-      </p:sp>
-      <p:pic>
-        <p:nvPicPr>
-          <p:cNvPr id="5" name="Imagen 4">
-            <a:extLst>
-              <a:ext uri="{FF2B5EF4-FFF2-40B4-BE49-F238E27FC236}">
-                <a16:creationId xmlns:a16="http://schemas.microsoft.com/office/drawing/2014/main" id="{FC61E40D-B93A-44C0-85BE-AD750071C817}"/>
-              </a:ext>
-            </a:extLst>
-          </p:cNvPr>
-          <p:cNvPicPr>
-            <a:picLocks noChangeAspect="1"/>
-          </p:cNvPicPr>
-          <p:nvPr/>
-        </p:nvPicPr>
-        <p:blipFill>
-          <a:blip r:embed="rId2"/>
-          <a:stretch>
-            <a:fillRect/>
-          </a:stretch>
-        </p:blipFill>
-        <p:spPr>
-          <a:xfrm>
-            <a:off x="6969553" y="675268"/>
-            <a:ext cx="3729372" cy="5507463"/>
-          </a:xfrm>
-          <a:prstGeom prst="rect">
-            <a:avLst/>
-          </a:prstGeom>
-        </p:spPr>
-      </p:pic>
+              <a:t>Relaciones</a:t>
+            </a:r>
+          </a:p>
+        </p:txBody>
+      </p:sp>
     </p:spTree>
     <p:extLst>
       <p:ext uri="{BB962C8B-B14F-4D97-AF65-F5344CB8AC3E}">
-        <p14:creationId xmlns:p14="http://schemas.microsoft.com/office/powerpoint/2010/main" val="4114992954"/>
+        <p14:creationId xmlns:p14="http://schemas.microsoft.com/office/powerpoint/2010/main" val="3060386633"/>
       </p:ext>
     </p:extLst>
   </p:cSld>
@@ -6804,10 +10086,43 @@
       </p:grpSpPr>
       <p:sp>
         <p:nvSpPr>
+          <p:cNvPr id="2" name="Título 1">
+            <a:extLst>
+              <a:ext uri="{FF2B5EF4-FFF2-40B4-BE49-F238E27FC236}">
+                <a16:creationId xmlns:a16="http://schemas.microsoft.com/office/drawing/2014/main" id="{B0AA5EBA-8A29-40B4-A9CA-B2ED8FF82375}"/>
+              </a:ext>
+            </a:extLst>
+          </p:cNvPr>
+          <p:cNvSpPr>
+            <a:spLocks noGrp="1"/>
+          </p:cNvSpPr>
+          <p:nvPr>
+            <p:ph type="title"/>
+          </p:nvPr>
+        </p:nvSpPr>
+        <p:spPr>
+          <a:xfrm>
+            <a:off x="838200" y="325226"/>
+            <a:ext cx="10515600" cy="712064"/>
+          </a:xfrm>
+        </p:spPr>
+        <p:txBody>
+          <a:bodyPr/>
+          <a:lstStyle/>
+          <a:p>
+            <a:r>
+              <a:rPr lang="es-MX" b="1" dirty="0"/>
+              <a:t>ORM’s</a:t>
+            </a:r>
+          </a:p>
+        </p:txBody>
+      </p:sp>
+      <p:sp>
+        <p:nvSpPr>
           <p:cNvPr id="3" name="Marcador de contenido 2">
             <a:extLst>
               <a:ext uri="{FF2B5EF4-FFF2-40B4-BE49-F238E27FC236}">
-                <a16:creationId xmlns:a16="http://schemas.microsoft.com/office/drawing/2014/main" id="{2A9A201F-30B6-4620-83ED-3896CE6B3DE5}"/>
+                <a16:creationId xmlns:a16="http://schemas.microsoft.com/office/drawing/2014/main" id="{56A0ADC7-85E0-43F6-B98C-3B69D6ECF443}"/>
               </a:ext>
             </a:extLst>
           </p:cNvPr>
@@ -6818,7 +10133,12 @@
             <p:ph idx="1"/>
           </p:nvPr>
         </p:nvSpPr>
-        <p:spPr/>
+        <p:spPr>
+          <a:xfrm>
+            <a:off x="838200" y="1037290"/>
+            <a:ext cx="10515600" cy="5237205"/>
+          </a:xfrm>
+        </p:spPr>
         <p:txBody>
           <a:bodyPr/>
           <a:lstStyle/>
@@ -6826,80 +10146,146 @@
             <a:pPr algn="just"/>
             <a:r>
               <a:rPr lang="es-MX" dirty="0"/>
-              <a:t>Con JDBC realizamos la conexión con la base de datos además de realizar consultas nativas a la misma, siendo de gran ayuda en tiempos de respuesta, pero el mantenimiento del código es mucho más costos, además de facilitar los errores en tiempos de ejecución y un desarrollo lento.</a:t>
+              <a:t>Existen distintas ORM pero tienen la misma finalidad de convertir datos entre base de datos relaciones a lenguajes de programación orientados a objetos.</a:t>
             </a:r>
           </a:p>
           <a:p>
             <a:pPr algn="just"/>
             <a:r>
+              <a:rPr lang="es-MX" b="1" dirty="0"/>
+              <a:t>Un Framework ORM tiene como ventaja sobre JDBC :</a:t>
+            </a:r>
+          </a:p>
+          <a:p>
+            <a:pPr marL="914400" lvl="1" indent="-457200" algn="just">
+              <a:buFont typeface="+mj-lt"/>
+              <a:buAutoNum type="arabicPeriod"/>
+            </a:pPr>
+            <a:r>
               <a:rPr lang="es-MX" dirty="0"/>
-              <a:t>En el ejemplo </a:t>
+              <a:t>Acceso a los objetos mediante el código en lugar de las tablas de bases de datos.</a:t>
+            </a:r>
+          </a:p>
+          <a:p>
+            <a:pPr marL="914400" lvl="1" indent="-457200" algn="just">
+              <a:buFont typeface="+mj-lt"/>
+              <a:buAutoNum type="arabicPeriod"/>
+            </a:pPr>
+            <a:r>
+              <a:rPr lang="es-MX" dirty="0"/>
+              <a:t>Ocultar detalles de consultas SQL de la lógica Orientada a Objetos.</a:t>
+            </a:r>
+          </a:p>
+          <a:p>
+            <a:pPr marL="914400" lvl="1" indent="-457200" algn="just">
+              <a:buFont typeface="+mj-lt"/>
+              <a:buAutoNum type="arabicPeriod"/>
+            </a:pPr>
+            <a:r>
+              <a:rPr lang="es-MX" dirty="0"/>
+              <a:t>No hay necesidad de liderar con la implementación de la base de datos.</a:t>
+            </a:r>
+          </a:p>
+          <a:p>
+            <a:pPr marL="914400" lvl="1" indent="-457200" algn="just">
+              <a:buFont typeface="+mj-lt"/>
+              <a:buAutoNum type="arabicPeriod"/>
+            </a:pPr>
+            <a:r>
+              <a:rPr lang="es-MX" dirty="0"/>
+              <a:t>Entidades basadas en conceptos comerciales en lugar de estructuras de base de datos.</a:t>
+            </a:r>
+          </a:p>
+          <a:p>
+            <a:pPr marL="914400" lvl="1" indent="-457200" algn="just">
+              <a:buFont typeface="+mj-lt"/>
+              <a:buAutoNum type="arabicPeriod"/>
+            </a:pPr>
+            <a:r>
+              <a:rPr lang="es-MX" dirty="0"/>
+              <a:t>Gestión de transacciones y generación automática de claves.</a:t>
+            </a:r>
+          </a:p>
+          <a:p>
+            <a:pPr marL="914400" lvl="1" indent="-457200" algn="just">
+              <a:buFont typeface="+mj-lt"/>
+              <a:buAutoNum type="arabicPeriod"/>
+            </a:pPr>
+            <a:r>
+              <a:rPr lang="es-MX" dirty="0"/>
+              <a:t>Rápido desarrollo de una aplicación.</a:t>
+            </a:r>
+          </a:p>
+          <a:p>
+            <a:pPr algn="just"/>
+            <a:r>
+              <a:rPr lang="es-MX" b="1" dirty="0"/>
+              <a:t>JAVA ORM Frameworks</a:t>
+            </a:r>
+          </a:p>
+          <a:p>
+            <a:pPr lvl="1" algn="just">
+              <a:buFont typeface="Wingdings" panose="05000000000000000000" pitchFamily="2" charset="2"/>
+              <a:buChar char="q"/>
+            </a:pPr>
+            <a:r>
+              <a:rPr lang="es-MX" dirty="0"/>
+              <a:t>Java Data </a:t>
             </a:r>
             <a:r>
               <a:rPr lang="es-MX" dirty="0" err="1"/>
-              <a:t>SpringFrameworkJDBC</a:t>
-            </a:r>
+              <a:t>Objects</a:t>
+            </a:r>
+            <a:endParaRPr lang="es-MX" dirty="0"/>
+          </a:p>
+          <a:p>
+            <a:pPr lvl="1" algn="just">
+              <a:buFont typeface="Wingdings" panose="05000000000000000000" pitchFamily="2" charset="2"/>
+              <a:buChar char="q"/>
+            </a:pPr>
             <a:r>
               <a:rPr lang="es-MX" dirty="0"/>
-              <a:t> se utiliza una única tabla, pero imagine que se obtienen más entidades, realizar el mapeo de las estructuras seria una enorme labor, además de una gran taza de errores al realizar consultas. </a:t>
-            </a:r>
-          </a:p>
-          <a:p>
-            <a:pPr algn="just"/>
-            <a:r>
-              <a:rPr lang="es-MX" dirty="0"/>
-              <a:t> Es por eso que existe los ORM u Object Relational Mapping que son modelos que nos permiten mapear estructuras de una base de datos relaciones (SQL Server, Oracle, MySQL, </a:t>
-            </a:r>
+              <a:t>Castor</a:t>
+            </a:r>
+          </a:p>
+          <a:p>
+            <a:pPr lvl="1" algn="just">
+              <a:buFont typeface="Wingdings" panose="05000000000000000000" pitchFamily="2" charset="2"/>
+              <a:buChar char="q"/>
+            </a:pPr>
             <a:r>
               <a:rPr lang="es-MX" dirty="0" err="1"/>
-              <a:t>etc</a:t>
-            </a:r>
-            <a:r>
-              <a:rPr lang="es-MX" dirty="0"/>
-              <a:t>).</a:t>
-            </a:r>
-          </a:p>
-          <a:p>
-            <a:pPr algn="just"/>
-            <a:r>
-              <a:rPr lang="es-MX" dirty="0"/>
-              <a:t>La estructura de una BD Relacional queda vinculada con las entidades lógicas del ORM de tal modo que las acciones CRUD pueden ser ejecutadas sobre la base de datos física de forma indirecta por medio del ORM.</a:t>
-            </a:r>
-          </a:p>
-        </p:txBody>
-      </p:sp>
-      <p:sp>
-        <p:nvSpPr>
-          <p:cNvPr id="5" name="Título 4">
-            <a:extLst>
-              <a:ext uri="{FF2B5EF4-FFF2-40B4-BE49-F238E27FC236}">
-                <a16:creationId xmlns:a16="http://schemas.microsoft.com/office/drawing/2014/main" id="{A3C3A254-14D9-44EA-957A-14317A7A1EAE}"/>
-              </a:ext>
-            </a:extLst>
-          </p:cNvPr>
-          <p:cNvSpPr>
-            <a:spLocks noGrp="1"/>
-          </p:cNvSpPr>
-          <p:nvPr>
-            <p:ph type="title"/>
-          </p:nvPr>
-        </p:nvSpPr>
-        <p:spPr/>
-        <p:txBody>
-          <a:bodyPr/>
-          <a:lstStyle/>
-          <a:p>
-            <a:r>
-              <a:rPr lang="es-MX" dirty="0"/>
-              <a:t>Relaciones</a:t>
-            </a:r>
+              <a:t>TopLink</a:t>
+            </a:r>
+            <a:endParaRPr lang="es-MX" dirty="0"/>
+          </a:p>
+          <a:p>
+            <a:pPr lvl="1" algn="just">
+              <a:buFont typeface="Wingdings" panose="05000000000000000000" pitchFamily="2" charset="2"/>
+              <a:buChar char="q"/>
+            </a:pPr>
+            <a:r>
+              <a:rPr lang="es-MX" b="1" dirty="0"/>
+              <a:t>Hibernate</a:t>
+            </a:r>
+          </a:p>
+          <a:p>
+            <a:pPr lvl="1" algn="just">
+              <a:buFont typeface="Wingdings" panose="05000000000000000000" pitchFamily="2" charset="2"/>
+              <a:buChar char="q"/>
+            </a:pPr>
+            <a:r>
+              <a:rPr lang="es-MX" dirty="0" err="1"/>
+              <a:t>SpringDAO</a:t>
+            </a:r>
+            <a:endParaRPr lang="es-MX" dirty="0"/>
           </a:p>
         </p:txBody>
       </p:sp>
     </p:spTree>
     <p:extLst>
       <p:ext uri="{BB962C8B-B14F-4D97-AF65-F5344CB8AC3E}">
-        <p14:creationId xmlns:p14="http://schemas.microsoft.com/office/powerpoint/2010/main" val="3060386633"/>
+        <p14:creationId xmlns:p14="http://schemas.microsoft.com/office/powerpoint/2010/main" val="4194544621"/>
       </p:ext>
     </p:extLst>
   </p:cSld>

</xml_diff>

<commit_message>
Modificacion teorica sobre clases Hibernate
</commit_message>
<xml_diff>
--- a/Persistencia con JDBC.pptx
+++ b/Persistencia con JDBC.pptx
@@ -5,7 +5,7 @@
     <p:sldMasterId id="2147483660" r:id="rId1"/>
   </p:sldMasterIdLst>
   <p:notesMasterIdLst>
-    <p:notesMasterId r:id="rId17"/>
+    <p:notesMasterId r:id="rId21"/>
   </p:notesMasterIdLst>
   <p:sldIdLst>
     <p:sldId id="256" r:id="rId2"/>
@@ -23,6 +23,10 @@
     <p:sldId id="270" r:id="rId14"/>
     <p:sldId id="271" r:id="rId15"/>
     <p:sldId id="272" r:id="rId16"/>
+    <p:sldId id="273" r:id="rId17"/>
+    <p:sldId id="274" r:id="rId18"/>
+    <p:sldId id="275" r:id="rId19"/>
+    <p:sldId id="276" r:id="rId20"/>
   </p:sldIdLst>
   <p:sldSz cx="12192000" cy="6858000"/>
   <p:notesSz cx="6858000" cy="9144000"/>
@@ -6510,13 +6514,8 @@
             <a:pPr lvl="1"/>
             <a:r>
               <a:rPr lang="es-MX" dirty="0"/>
-              <a:t>Spring-</a:t>
-            </a:r>
-            <a:r>
-              <a:rPr lang="es-MX" dirty="0" err="1"/>
-              <a:t>orm</a:t>
-            </a:r>
-            <a:endParaRPr lang="es-MX" dirty="0"/>
+              <a:t>Spring-orm</a:t>
+            </a:r>
           </a:p>
           <a:p>
             <a:pPr lvl="1"/>
@@ -6925,14 +6924,19 @@
             <p:ph type="title"/>
           </p:nvPr>
         </p:nvSpPr>
-        <p:spPr/>
+        <p:spPr>
+          <a:xfrm>
+            <a:off x="1787560" y="571796"/>
+            <a:ext cx="5284581" cy="712064"/>
+          </a:xfrm>
+        </p:spPr>
         <p:txBody>
           <a:bodyPr/>
           <a:lstStyle/>
           <a:p>
             <a:r>
-              <a:rPr lang="es-MX" dirty="0"/>
-              <a:t>Para Hibernate trabaje con Spring ORM</a:t>
+              <a:rPr lang="es-MX" sz="2400" b="1" dirty="0"/>
+              <a:t>Configuración de Hibernate</a:t>
             </a:r>
           </a:p>
         </p:txBody>
@@ -6951,7 +6955,7 @@
         </p:nvSpPr>
         <p:spPr>
           <a:xfrm>
-            <a:off x="963819" y="1818856"/>
+            <a:off x="491836" y="1825816"/>
             <a:ext cx="1686560" cy="712064"/>
           </a:xfrm>
           <a:prstGeom prst="roundRect">
@@ -7050,18 +7054,24 @@
           <a:p>
             <a:pPr algn="ctr"/>
             <a:r>
-              <a:rPr lang="es-MX" dirty="0" err="1">
+              <a:rPr lang="es-MX" dirty="0">
+                <a:solidFill>
+                  <a:schemeClr val="tx1"/>
+                </a:solidFill>
+              </a:rPr>
+              <a:t>SessionFactory()</a:t>
+            </a:r>
+          </a:p>
+          <a:p>
+            <a:pPr algn="ctr"/>
+            <a:r>
+              <a:rPr lang="es-MX" dirty="0">
                 <a:solidFill>
                   <a:schemeClr val="tx1"/>
                 </a:solidFill>
               </a:rPr>
               <a:t>LocalSessionFactoryBean</a:t>
             </a:r>
-            <a:endParaRPr lang="es-MX" dirty="0">
-              <a:solidFill>
-                <a:schemeClr val="tx1"/>
-              </a:solidFill>
-            </a:endParaRPr>
           </a:p>
         </p:txBody>
       </p:sp>
@@ -7079,7 +7089,7 @@
         </p:nvSpPr>
         <p:spPr>
           <a:xfrm>
-            <a:off x="8741297" y="4499800"/>
+            <a:off x="8741297" y="3653690"/>
             <a:ext cx="2206103" cy="712064"/>
           </a:xfrm>
           <a:prstGeom prst="roundRect">
@@ -7114,18 +7124,13 @@
           <a:p>
             <a:pPr algn="ctr"/>
             <a:r>
-              <a:rPr lang="es-MX" dirty="0" err="1">
+              <a:rPr lang="es-MX" dirty="0">
                 <a:solidFill>
                   <a:schemeClr val="tx1"/>
                 </a:solidFill>
               </a:rPr>
               <a:t>HibernateTemplate</a:t>
             </a:r>
-            <a:endParaRPr lang="es-MX" dirty="0">
-              <a:solidFill>
-                <a:schemeClr val="tx1"/>
-              </a:solidFill>
-            </a:endParaRPr>
           </a:p>
         </p:txBody>
       </p:sp>
@@ -7143,8 +7148,8 @@
         </p:nvSpPr>
         <p:spPr>
           <a:xfrm>
-            <a:off x="8837819" y="1950199"/>
-            <a:ext cx="2013061" cy="712064"/>
+            <a:off x="8459012" y="1647226"/>
+            <a:ext cx="3354181" cy="712064"/>
           </a:xfrm>
           <a:prstGeom prst="roundRect">
             <a:avLst/>
@@ -7178,18 +7183,13 @@
           <a:p>
             <a:pPr algn="ctr"/>
             <a:r>
-              <a:rPr lang="es-MX" dirty="0" err="1">
+              <a:rPr lang="es-MX" dirty="0">
                 <a:solidFill>
                   <a:schemeClr val="tx1"/>
                 </a:solidFill>
               </a:rPr>
-              <a:t>SessionFactory</a:t>
-            </a:r>
-            <a:endParaRPr lang="es-MX" dirty="0">
-              <a:solidFill>
-                <a:schemeClr val="tx1"/>
-              </a:solidFill>
-            </a:endParaRPr>
+              <a:t>HibernateTransactionManager</a:t>
+            </a:r>
           </a:p>
         </p:txBody>
       </p:sp>
@@ -7207,7 +7207,7 @@
         </p:nvSpPr>
         <p:spPr>
           <a:xfrm>
-            <a:off x="3373933" y="5415064"/>
+            <a:off x="3196883" y="5211864"/>
             <a:ext cx="2206103" cy="712064"/>
           </a:xfrm>
           <a:prstGeom prst="roundRect">
@@ -7275,8 +7275,8 @@
         </p:nvCxnSpPr>
         <p:spPr>
           <a:xfrm flipV="1">
-            <a:off x="2650379" y="1950199"/>
-            <a:ext cx="2155302" cy="224689"/>
+            <a:off x="2178396" y="1950199"/>
+            <a:ext cx="2627285" cy="231649"/>
           </a:xfrm>
           <a:prstGeom prst="straightConnector1">
             <a:avLst/>
@@ -7322,7 +7322,7 @@
         <p:spPr>
           <a:xfrm>
             <a:off x="7736150" y="1950199"/>
-            <a:ext cx="1101669" cy="356032"/>
+            <a:ext cx="722862" cy="53059"/>
           </a:xfrm>
           <a:prstGeom prst="straightConnector1">
             <a:avLst/>
@@ -7366,8 +7366,8 @@
         </p:nvCxnSpPr>
         <p:spPr>
           <a:xfrm flipH="1">
-            <a:off x="5580036" y="4855832"/>
-            <a:ext cx="3161261" cy="915264"/>
+            <a:off x="5402986" y="4009722"/>
+            <a:ext cx="3338311" cy="1558174"/>
           </a:xfrm>
           <a:prstGeom prst="straightConnector1">
             <a:avLst/>
@@ -7404,15 +7404,16 @@
             </a:extLst>
           </p:cNvPr>
           <p:cNvCxnSpPr>
-            <a:stCxn id="7" idx="2"/>
+            <a:cxnSpLocks/>
+            <a:stCxn id="5" idx="2"/>
             <a:endCxn id="6" idx="0"/>
           </p:cNvCxnSpPr>
           <p:nvPr/>
         </p:nvCxnSpPr>
         <p:spPr>
-          <a:xfrm flipH="1">
-            <a:off x="9844349" y="2662263"/>
-            <a:ext cx="1" cy="1837537"/>
+          <a:xfrm>
+            <a:off x="6270916" y="2485662"/>
+            <a:ext cx="3573433" cy="1168028"/>
           </a:xfrm>
           <a:prstGeom prst="straightConnector1">
             <a:avLst/>
@@ -7453,7 +7454,7 @@
         </p:nvSpPr>
         <p:spPr>
           <a:xfrm>
-            <a:off x="729448" y="2697052"/>
+            <a:off x="279810" y="2578457"/>
             <a:ext cx="2155301" cy="369332"/>
           </a:xfrm>
           <a:prstGeom prst="rect">
@@ -7468,9 +7469,10 @@
           <a:lstStyle/>
           <a:p>
             <a:r>
-              <a:rPr lang="es-MX" dirty="0"/>
-              <a:t>Database properties</a:t>
-            </a:r>
+              <a:rPr lang="es-MX" dirty="0" err="1"/>
+              <a:t>Database.properties</a:t>
+            </a:r>
+            <a:endParaRPr lang="es-MX" dirty="0"/>
           </a:p>
         </p:txBody>
       </p:sp>
@@ -7488,7 +7490,7 @@
         </p:nvSpPr>
         <p:spPr>
           <a:xfrm>
-            <a:off x="5000164" y="2565368"/>
+            <a:off x="3584979" y="2420053"/>
             <a:ext cx="2541501" cy="923330"/>
           </a:xfrm>
           <a:prstGeom prst="rect">
@@ -7504,13 +7506,7 @@
           <a:p>
             <a:r>
               <a:rPr lang="es-MX" dirty="0"/>
-              <a:t>dataSource</a:t>
-            </a:r>
-          </a:p>
-          <a:p>
-            <a:r>
-              <a:rPr lang="es-MX" dirty="0"/>
-              <a:t>Hibernate properties</a:t>
+              <a:t>dataSource()</a:t>
             </a:r>
           </a:p>
           <a:p>
@@ -7521,6 +7517,356 @@
             <a:r>
               <a:rPr lang="es-MX" dirty="0"/>
               <a:t> Class</a:t>
+            </a:r>
+          </a:p>
+          <a:p>
+            <a:r>
+              <a:rPr lang="es-MX" dirty="0" err="1"/>
+              <a:t>Hibernate.properties</a:t>
+            </a:r>
+            <a:endParaRPr lang="es-MX" dirty="0"/>
+          </a:p>
+        </p:txBody>
+      </p:sp>
+      <p:sp>
+        <p:nvSpPr>
+          <p:cNvPr id="38" name="CuadroTexto 37">
+            <a:extLst>
+              <a:ext uri="{FF2B5EF4-FFF2-40B4-BE49-F238E27FC236}">
+                <a16:creationId xmlns:a16="http://schemas.microsoft.com/office/drawing/2014/main" id="{5F910A96-6316-495F-B882-6872EA0D1304}"/>
+              </a:ext>
+            </a:extLst>
+          </p:cNvPr>
+          <p:cNvSpPr txBox="1"/>
+          <p:nvPr/>
+        </p:nvSpPr>
+        <p:spPr>
+          <a:xfrm>
+            <a:off x="8368264" y="4450224"/>
+            <a:ext cx="3535680" cy="830997"/>
+          </a:xfrm>
+          <a:prstGeom prst="rect">
+            <a:avLst/>
+          </a:prstGeom>
+          <a:noFill/>
+        </p:spPr>
+        <p:txBody>
+          <a:bodyPr wrap="square" rtlCol="0">
+            <a:spAutoFit/>
+          </a:bodyPr>
+          <a:lstStyle/>
+          <a:p>
+            <a:pPr marL="171450" indent="-171450">
+              <a:buFont typeface="Arial" panose="020B0604020202020204" pitchFamily="34" charset="0"/>
+              <a:buChar char="•"/>
+            </a:pPr>
+            <a:r>
+              <a:rPr lang="es-MX" sz="1200" dirty="0"/>
+              <a:t>Opcional si no quieres hacer mucho código Hibernate, viene de la librería “</a:t>
+            </a:r>
+            <a:r>
+              <a:rPr lang="es-MX" sz="1200" dirty="0">
+                <a:highlight>
+                  <a:srgbClr val="E8F2FE"/>
+                </a:highlight>
+                <a:latin typeface="Consolas" panose="020B0609020204030204" pitchFamily="49" charset="0"/>
+              </a:rPr>
+              <a:t>org.springframework.orm.hibernate5.</a:t>
+            </a:r>
+            <a:r>
+              <a:rPr lang="es-MX" sz="1200" u="sng" dirty="0">
+                <a:highlight>
+                  <a:srgbClr val="E8F2FE"/>
+                </a:highlight>
+                <a:latin typeface="Consolas" panose="020B0609020204030204" pitchFamily="49" charset="0"/>
+              </a:rPr>
+              <a:t>HibernateTemplate;”</a:t>
+            </a:r>
+            <a:endParaRPr lang="es-MX" sz="1200" dirty="0"/>
+          </a:p>
+        </p:txBody>
+      </p:sp>
+      <p:cxnSp>
+        <p:nvCxnSpPr>
+          <p:cNvPr id="41" name="Conector recto de flecha 40">
+            <a:extLst>
+              <a:ext uri="{FF2B5EF4-FFF2-40B4-BE49-F238E27FC236}">
+                <a16:creationId xmlns:a16="http://schemas.microsoft.com/office/drawing/2014/main" id="{B5AC7BD0-D277-474F-9918-07CC0C2F8D26}"/>
+              </a:ext>
+            </a:extLst>
+          </p:cNvPr>
+          <p:cNvCxnSpPr>
+            <a:cxnSpLocks/>
+            <a:stCxn id="5" idx="2"/>
+            <a:endCxn id="8" idx="0"/>
+          </p:cNvCxnSpPr>
+          <p:nvPr/>
+        </p:nvCxnSpPr>
+        <p:spPr>
+          <a:xfrm flipH="1">
+            <a:off x="4299935" y="2485662"/>
+            <a:ext cx="1970981" cy="2726202"/>
+          </a:xfrm>
+          <a:prstGeom prst="straightConnector1">
+            <a:avLst/>
+          </a:prstGeom>
+          <a:ln>
+            <a:solidFill>
+              <a:schemeClr val="tx1"/>
+            </a:solidFill>
+            <a:tailEnd type="triangle"/>
+          </a:ln>
+        </p:spPr>
+        <p:style>
+          <a:lnRef idx="1">
+            <a:schemeClr val="accent1"/>
+          </a:lnRef>
+          <a:fillRef idx="0">
+            <a:schemeClr val="accent1"/>
+          </a:fillRef>
+          <a:effectRef idx="0">
+            <a:schemeClr val="accent1"/>
+          </a:effectRef>
+          <a:fontRef idx="minor">
+            <a:schemeClr val="tx1"/>
+          </a:fontRef>
+        </p:style>
+      </p:cxnSp>
+      <p:sp>
+        <p:nvSpPr>
+          <p:cNvPr id="46" name="CuadroTexto 45">
+            <a:extLst>
+              <a:ext uri="{FF2B5EF4-FFF2-40B4-BE49-F238E27FC236}">
+                <a16:creationId xmlns:a16="http://schemas.microsoft.com/office/drawing/2014/main" id="{537C16A2-DD23-4213-9EBB-89B42C408984}"/>
+              </a:ext>
+            </a:extLst>
+          </p:cNvPr>
+          <p:cNvSpPr txBox="1"/>
+          <p:nvPr/>
+        </p:nvSpPr>
+        <p:spPr>
+          <a:xfrm>
+            <a:off x="8368264" y="5388465"/>
+            <a:ext cx="3535680" cy="923330"/>
+          </a:xfrm>
+          <a:prstGeom prst="rect">
+            <a:avLst/>
+          </a:prstGeom>
+          <a:noFill/>
+        </p:spPr>
+        <p:txBody>
+          <a:bodyPr wrap="square" rtlCol="0">
+            <a:spAutoFit/>
+          </a:bodyPr>
+          <a:lstStyle/>
+          <a:p>
+            <a:pPr marL="171450" indent="-171450">
+              <a:buFont typeface="Arial" panose="020B0604020202020204" pitchFamily="34" charset="0"/>
+              <a:buChar char="•"/>
+            </a:pPr>
+            <a:r>
+              <a:rPr lang="es-MX" sz="1200" dirty="0"/>
+              <a:t>Además de añadir etiqueta </a:t>
+            </a:r>
+            <a:r>
+              <a:rPr lang="es-MX" sz="1200" dirty="0">
+                <a:solidFill>
+                  <a:srgbClr val="3F7F5F"/>
+                </a:solidFill>
+                <a:highlight>
+                  <a:srgbClr val="E8F2FE"/>
+                </a:highlight>
+                <a:latin typeface="Consolas" panose="020B0609020204030204" pitchFamily="49" charset="0"/>
+              </a:rPr>
+              <a:t>@EnableTransactionManagement </a:t>
+            </a:r>
+            <a:r>
+              <a:rPr lang="es-MX" sz="1200" dirty="0"/>
+              <a:t>en el archivo de configuración y sobre los métodos un </a:t>
+            </a:r>
+            <a:r>
+              <a:rPr lang="es-MX" sz="1200" dirty="0">
+                <a:solidFill>
+                  <a:srgbClr val="3F7F5F"/>
+                </a:solidFill>
+                <a:highlight>
+                  <a:srgbClr val="E8F2FE"/>
+                </a:highlight>
+                <a:latin typeface="Consolas" panose="020B0609020204030204" pitchFamily="49" charset="0"/>
+              </a:rPr>
+              <a:t>@Transactional</a:t>
+            </a:r>
+            <a:r>
+              <a:rPr lang="es-MX" sz="1200" dirty="0"/>
+              <a:t> de </a:t>
+            </a:r>
+            <a:r>
+              <a:rPr lang="es-MX" sz="1200" dirty="0" err="1"/>
+              <a:t>CassDAO</a:t>
+            </a:r>
+            <a:r>
+              <a:rPr lang="es-MX" dirty="0"/>
+              <a:t>.</a:t>
+            </a:r>
+            <a:endParaRPr lang="es-MX" sz="1600" dirty="0"/>
+          </a:p>
+        </p:txBody>
+      </p:sp>
+      <p:sp>
+        <p:nvSpPr>
+          <p:cNvPr id="65" name="CuadroTexto 64">
+            <a:extLst>
+              <a:ext uri="{FF2B5EF4-FFF2-40B4-BE49-F238E27FC236}">
+                <a16:creationId xmlns:a16="http://schemas.microsoft.com/office/drawing/2014/main" id="{63FA3C67-FE2B-4799-BCC8-69C32CCB5CAD}"/>
+              </a:ext>
+            </a:extLst>
+          </p:cNvPr>
+          <p:cNvSpPr txBox="1"/>
+          <p:nvPr/>
+        </p:nvSpPr>
+        <p:spPr>
+          <a:xfrm>
+            <a:off x="9058453" y="2393791"/>
+            <a:ext cx="2155301" cy="369332"/>
+          </a:xfrm>
+          <a:prstGeom prst="rect">
+            <a:avLst/>
+          </a:prstGeom>
+          <a:noFill/>
+        </p:spPr>
+        <p:txBody>
+          <a:bodyPr wrap="square" rtlCol="0">
+            <a:spAutoFit/>
+          </a:bodyPr>
+          <a:lstStyle/>
+          <a:p>
+            <a:r>
+              <a:rPr lang="es-MX" dirty="0"/>
+              <a:t>SessionFactory()</a:t>
+            </a:r>
+          </a:p>
+        </p:txBody>
+      </p:sp>
+      <p:cxnSp>
+        <p:nvCxnSpPr>
+          <p:cNvPr id="67" name="Conector recto de flecha 66">
+            <a:extLst>
+              <a:ext uri="{FF2B5EF4-FFF2-40B4-BE49-F238E27FC236}">
+                <a16:creationId xmlns:a16="http://schemas.microsoft.com/office/drawing/2014/main" id="{180A7153-B34D-422D-B46C-49019F69B8EA}"/>
+              </a:ext>
+            </a:extLst>
+          </p:cNvPr>
+          <p:cNvCxnSpPr>
+            <a:stCxn id="7" idx="2"/>
+            <a:endCxn id="6" idx="0"/>
+          </p:cNvCxnSpPr>
+          <p:nvPr/>
+        </p:nvCxnSpPr>
+        <p:spPr>
+          <a:xfrm flipH="1">
+            <a:off x="9844349" y="2359290"/>
+            <a:ext cx="291754" cy="1294400"/>
+          </a:xfrm>
+          <a:prstGeom prst="straightConnector1">
+            <a:avLst/>
+          </a:prstGeom>
+          <a:ln>
+            <a:tailEnd type="triangle"/>
+          </a:ln>
+        </p:spPr>
+        <p:style>
+          <a:lnRef idx="1">
+            <a:schemeClr val="dk1"/>
+          </a:lnRef>
+          <a:fillRef idx="0">
+            <a:schemeClr val="dk1"/>
+          </a:fillRef>
+          <a:effectRef idx="0">
+            <a:schemeClr val="dk1"/>
+          </a:effectRef>
+          <a:fontRef idx="minor">
+            <a:schemeClr val="tx1"/>
+          </a:fontRef>
+        </p:style>
+      </p:cxnSp>
+      <p:sp>
+        <p:nvSpPr>
+          <p:cNvPr id="70" name="Rectángulo: esquinas redondeadas 69">
+            <a:extLst>
+              <a:ext uri="{FF2B5EF4-FFF2-40B4-BE49-F238E27FC236}">
+                <a16:creationId xmlns:a16="http://schemas.microsoft.com/office/drawing/2014/main" id="{E9A7D66B-B393-4809-A552-0B99817BC7D4}"/>
+              </a:ext>
+            </a:extLst>
+          </p:cNvPr>
+          <p:cNvSpPr/>
+          <p:nvPr/>
+        </p:nvSpPr>
+        <p:spPr>
+          <a:xfrm>
+            <a:off x="8057632" y="1198486"/>
+            <a:ext cx="3934343" cy="5440439"/>
+          </a:xfrm>
+          <a:prstGeom prst="roundRect">
+            <a:avLst/>
+          </a:prstGeom>
+          <a:noFill/>
+        </p:spPr>
+        <p:style>
+          <a:lnRef idx="2">
+            <a:schemeClr val="accent1">
+              <a:shade val="50000"/>
+            </a:schemeClr>
+          </a:lnRef>
+          <a:fillRef idx="1">
+            <a:schemeClr val="accent1"/>
+          </a:fillRef>
+          <a:effectRef idx="0">
+            <a:schemeClr val="accent1"/>
+          </a:effectRef>
+          <a:fontRef idx="minor">
+            <a:schemeClr val="lt1"/>
+          </a:fontRef>
+        </p:style>
+        <p:txBody>
+          <a:bodyPr rtlCol="0" anchor="ctr"/>
+          <a:lstStyle/>
+          <a:p>
+            <a:pPr algn="ctr"/>
+            <a:endParaRPr lang="es-MX"/>
+          </a:p>
+        </p:txBody>
+      </p:sp>
+      <p:sp>
+        <p:nvSpPr>
+          <p:cNvPr id="71" name="CuadroTexto 70">
+            <a:extLst>
+              <a:ext uri="{FF2B5EF4-FFF2-40B4-BE49-F238E27FC236}">
+                <a16:creationId xmlns:a16="http://schemas.microsoft.com/office/drawing/2014/main" id="{1C774244-C8D8-4386-8929-BF9D95B9464E}"/>
+              </a:ext>
+            </a:extLst>
+          </p:cNvPr>
+          <p:cNvSpPr txBox="1"/>
+          <p:nvPr/>
+        </p:nvSpPr>
+        <p:spPr>
+          <a:xfrm>
+            <a:off x="8097581" y="533450"/>
+            <a:ext cx="3934343" cy="646331"/>
+          </a:xfrm>
+          <a:prstGeom prst="rect">
+            <a:avLst/>
+          </a:prstGeom>
+          <a:noFill/>
+        </p:spPr>
+        <p:txBody>
+          <a:bodyPr wrap="square" rtlCol="0">
+            <a:spAutoFit/>
+          </a:bodyPr>
+          <a:lstStyle/>
+          <a:p>
+            <a:r>
+              <a:rPr lang="es-MX" b="1" dirty="0"/>
+              <a:t>Métodos opcionales si quiere trabajar con Spring-orm</a:t>
             </a:r>
           </a:p>
         </p:txBody>
@@ -7529,6 +7875,2474 @@
     <p:extLst>
       <p:ext uri="{BB962C8B-B14F-4D97-AF65-F5344CB8AC3E}">
         <p14:creationId xmlns:p14="http://schemas.microsoft.com/office/powerpoint/2010/main" val="3227729375"/>
+      </p:ext>
+    </p:extLst>
+  </p:cSld>
+  <p:clrMapOvr>
+    <a:masterClrMapping/>
+  </p:clrMapOvr>
+</p:sld>
+</file>
+
+<file path=ppt/slides/slide16.xml><?xml version="1.0" encoding="utf-8"?>
+<p:sld xmlns:a="http://schemas.openxmlformats.org/drawingml/2006/main" xmlns:r="http://schemas.openxmlformats.org/officeDocument/2006/relationships" xmlns:p="http://schemas.openxmlformats.org/presentationml/2006/main">
+  <p:cSld>
+    <p:spTree>
+      <p:nvGrpSpPr>
+        <p:cNvPr id="1" name=""/>
+        <p:cNvGrpSpPr/>
+        <p:nvPr/>
+      </p:nvGrpSpPr>
+      <p:grpSpPr>
+        <a:xfrm>
+          <a:off x="0" y="0"/>
+          <a:ext cx="0" cy="0"/>
+          <a:chOff x="0" y="0"/>
+          <a:chExt cx="0" cy="0"/>
+        </a:xfrm>
+      </p:grpSpPr>
+      <p:sp>
+        <p:nvSpPr>
+          <p:cNvPr id="2" name="Título 1">
+            <a:extLst>
+              <a:ext uri="{FF2B5EF4-FFF2-40B4-BE49-F238E27FC236}">
+                <a16:creationId xmlns:a16="http://schemas.microsoft.com/office/drawing/2014/main" id="{8AC61AA7-4148-46F4-99A6-A0C9CFE4730C}"/>
+              </a:ext>
+            </a:extLst>
+          </p:cNvPr>
+          <p:cNvSpPr>
+            <a:spLocks noGrp="1"/>
+          </p:cNvSpPr>
+          <p:nvPr>
+            <p:ph type="title"/>
+          </p:nvPr>
+        </p:nvSpPr>
+        <p:spPr/>
+        <p:txBody>
+          <a:bodyPr/>
+          <a:lstStyle/>
+          <a:p>
+            <a:r>
+              <a:rPr lang="es-MX" b="1" dirty="0"/>
+              <a:t>CONEXIÓN</a:t>
+            </a:r>
+          </a:p>
+        </p:txBody>
+      </p:sp>
+      <p:pic>
+        <p:nvPicPr>
+          <p:cNvPr id="5" name="Imagen 4">
+            <a:extLst>
+              <a:ext uri="{FF2B5EF4-FFF2-40B4-BE49-F238E27FC236}">
+                <a16:creationId xmlns:a16="http://schemas.microsoft.com/office/drawing/2014/main" id="{B550AF35-E0CD-4CF3-9C23-DEEFDEF02100}"/>
+              </a:ext>
+            </a:extLst>
+          </p:cNvPr>
+          <p:cNvPicPr>
+            <a:picLocks noChangeAspect="1"/>
+          </p:cNvPicPr>
+          <p:nvPr/>
+        </p:nvPicPr>
+        <p:blipFill>
+          <a:blip r:embed="rId2"/>
+          <a:stretch>
+            <a:fillRect/>
+          </a:stretch>
+        </p:blipFill>
+        <p:spPr>
+          <a:xfrm>
+            <a:off x="4550299" y="1567818"/>
+            <a:ext cx="3603916" cy="712064"/>
+          </a:xfrm>
+          <a:prstGeom prst="rect">
+            <a:avLst/>
+          </a:prstGeom>
+        </p:spPr>
+      </p:pic>
+      <p:sp>
+        <p:nvSpPr>
+          <p:cNvPr id="6" name="CuadroTexto 5">
+            <a:extLst>
+              <a:ext uri="{FF2B5EF4-FFF2-40B4-BE49-F238E27FC236}">
+                <a16:creationId xmlns:a16="http://schemas.microsoft.com/office/drawing/2014/main" id="{A554045F-8553-43B4-82FD-B9AB11845884}"/>
+              </a:ext>
+            </a:extLst>
+          </p:cNvPr>
+          <p:cNvSpPr txBox="1"/>
+          <p:nvPr/>
+        </p:nvSpPr>
+        <p:spPr>
+          <a:xfrm>
+            <a:off x="841899" y="1198486"/>
+            <a:ext cx="6695440" cy="369332"/>
+          </a:xfrm>
+          <a:prstGeom prst="rect">
+            <a:avLst/>
+          </a:prstGeom>
+          <a:noFill/>
+        </p:spPr>
+        <p:txBody>
+          <a:bodyPr wrap="square" rtlCol="0">
+            <a:spAutoFit/>
+          </a:bodyPr>
+          <a:lstStyle/>
+          <a:p>
+            <a:pPr marL="285750" indent="-285750">
+              <a:buFont typeface="Arial" panose="020B0604020202020204" pitchFamily="34" charset="0"/>
+              <a:buChar char="•"/>
+            </a:pPr>
+            <a:r>
+              <a:rPr lang="es-MX" dirty="0"/>
+              <a:t>Crear paquete de configuraciones y clase de configuración</a:t>
+            </a:r>
+          </a:p>
+        </p:txBody>
+      </p:sp>
+      <p:sp>
+        <p:nvSpPr>
+          <p:cNvPr id="7" name="CuadroTexto 6">
+            <a:extLst>
+              <a:ext uri="{FF2B5EF4-FFF2-40B4-BE49-F238E27FC236}">
+                <a16:creationId xmlns:a16="http://schemas.microsoft.com/office/drawing/2014/main" id="{524CF592-9AD7-4ED5-8F7B-D3F006D87844}"/>
+              </a:ext>
+            </a:extLst>
+          </p:cNvPr>
+          <p:cNvSpPr txBox="1"/>
+          <p:nvPr/>
+        </p:nvSpPr>
+        <p:spPr>
+          <a:xfrm>
+            <a:off x="841899" y="2571763"/>
+            <a:ext cx="6695440" cy="369332"/>
+          </a:xfrm>
+          <a:prstGeom prst="rect">
+            <a:avLst/>
+          </a:prstGeom>
+          <a:noFill/>
+        </p:spPr>
+        <p:txBody>
+          <a:bodyPr wrap="square" rtlCol="0">
+            <a:spAutoFit/>
+          </a:bodyPr>
+          <a:lstStyle/>
+          <a:p>
+            <a:pPr marL="285750" indent="-285750">
+              <a:buFont typeface="Arial" panose="020B0604020202020204" pitchFamily="34" charset="0"/>
+              <a:buChar char="•"/>
+            </a:pPr>
+            <a:r>
+              <a:rPr lang="es-MX" dirty="0"/>
+              <a:t>Archivo de propiedades de JDBC y Hibernate</a:t>
+            </a:r>
+          </a:p>
+        </p:txBody>
+      </p:sp>
+      <p:pic>
+        <p:nvPicPr>
+          <p:cNvPr id="9" name="Imagen 8">
+            <a:extLst>
+              <a:ext uri="{FF2B5EF4-FFF2-40B4-BE49-F238E27FC236}">
+                <a16:creationId xmlns:a16="http://schemas.microsoft.com/office/drawing/2014/main" id="{25076D20-DF65-436B-8E5B-BF1EC9706134}"/>
+              </a:ext>
+            </a:extLst>
+          </p:cNvPr>
+          <p:cNvPicPr>
+            <a:picLocks noChangeAspect="1"/>
+          </p:cNvPicPr>
+          <p:nvPr/>
+        </p:nvPicPr>
+        <p:blipFill>
+          <a:blip r:embed="rId3"/>
+          <a:stretch>
+            <a:fillRect/>
+          </a:stretch>
+        </p:blipFill>
+        <p:spPr>
+          <a:xfrm>
+            <a:off x="841899" y="3232976"/>
+            <a:ext cx="9564994" cy="2342863"/>
+          </a:xfrm>
+          <a:prstGeom prst="rect">
+            <a:avLst/>
+          </a:prstGeom>
+        </p:spPr>
+      </p:pic>
+      <p:sp>
+        <p:nvSpPr>
+          <p:cNvPr id="10" name="Cerrar llave 9">
+            <a:extLst>
+              <a:ext uri="{FF2B5EF4-FFF2-40B4-BE49-F238E27FC236}">
+                <a16:creationId xmlns:a16="http://schemas.microsoft.com/office/drawing/2014/main" id="{27D1A0AE-19E3-4D6C-9DFA-9B25A9BF762F}"/>
+              </a:ext>
+            </a:extLst>
+          </p:cNvPr>
+          <p:cNvSpPr/>
+          <p:nvPr/>
+        </p:nvSpPr>
+        <p:spPr>
+          <a:xfrm>
+            <a:off x="10406892" y="3641058"/>
+            <a:ext cx="294640" cy="883920"/>
+          </a:xfrm>
+          <a:prstGeom prst="rightBrace">
+            <a:avLst/>
+          </a:prstGeom>
+          <a:noFill/>
+          <a:ln w="19050">
+            <a:solidFill>
+              <a:srgbClr val="FF0000"/>
+            </a:solidFill>
+          </a:ln>
+        </p:spPr>
+        <p:style>
+          <a:lnRef idx="1">
+            <a:schemeClr val="accent1"/>
+          </a:lnRef>
+          <a:fillRef idx="0">
+            <a:schemeClr val="accent1"/>
+          </a:fillRef>
+          <a:effectRef idx="0">
+            <a:schemeClr val="accent1"/>
+          </a:effectRef>
+          <a:fontRef idx="minor">
+            <a:schemeClr val="tx1"/>
+          </a:fontRef>
+        </p:style>
+        <p:txBody>
+          <a:bodyPr rtlCol="0" anchor="ctr"/>
+          <a:lstStyle/>
+          <a:p>
+            <a:pPr algn="ctr"/>
+            <a:endParaRPr lang="es-MX"/>
+          </a:p>
+        </p:txBody>
+      </p:sp>
+      <p:sp>
+        <p:nvSpPr>
+          <p:cNvPr id="11" name="Rectángulo: esquinas redondeadas 10">
+            <a:extLst>
+              <a:ext uri="{FF2B5EF4-FFF2-40B4-BE49-F238E27FC236}">
+                <a16:creationId xmlns:a16="http://schemas.microsoft.com/office/drawing/2014/main" id="{A81E531C-AA7F-449C-9354-19682B55896C}"/>
+              </a:ext>
+            </a:extLst>
+          </p:cNvPr>
+          <p:cNvSpPr/>
+          <p:nvPr/>
+        </p:nvSpPr>
+        <p:spPr>
+          <a:xfrm>
+            <a:off x="956711" y="3580098"/>
+            <a:ext cx="9399380" cy="1042646"/>
+          </a:xfrm>
+          <a:prstGeom prst="roundRect">
+            <a:avLst/>
+          </a:prstGeom>
+          <a:noFill/>
+          <a:ln w="28575">
+            <a:solidFill>
+              <a:srgbClr val="FF0000"/>
+            </a:solidFill>
+          </a:ln>
+        </p:spPr>
+        <p:style>
+          <a:lnRef idx="2">
+            <a:schemeClr val="accent1">
+              <a:shade val="50000"/>
+            </a:schemeClr>
+          </a:lnRef>
+          <a:fillRef idx="1">
+            <a:schemeClr val="accent1"/>
+          </a:fillRef>
+          <a:effectRef idx="0">
+            <a:schemeClr val="accent1"/>
+          </a:effectRef>
+          <a:fontRef idx="minor">
+            <a:schemeClr val="lt1"/>
+          </a:fontRef>
+        </p:style>
+        <p:txBody>
+          <a:bodyPr rtlCol="0" anchor="ctr"/>
+          <a:lstStyle/>
+          <a:p>
+            <a:pPr algn="ctr"/>
+            <a:endParaRPr lang="es-MX"/>
+          </a:p>
+        </p:txBody>
+      </p:sp>
+      <p:sp>
+        <p:nvSpPr>
+          <p:cNvPr id="12" name="CuadroTexto 11">
+            <a:extLst>
+              <a:ext uri="{FF2B5EF4-FFF2-40B4-BE49-F238E27FC236}">
+                <a16:creationId xmlns:a16="http://schemas.microsoft.com/office/drawing/2014/main" id="{578B78C9-D852-4C0D-A530-A78E092AEF8D}"/>
+              </a:ext>
+            </a:extLst>
+          </p:cNvPr>
+          <p:cNvSpPr txBox="1"/>
+          <p:nvPr/>
+        </p:nvSpPr>
+        <p:spPr>
+          <a:xfrm>
+            <a:off x="10701532" y="3759852"/>
+            <a:ext cx="1637788" cy="646331"/>
+          </a:xfrm>
+          <a:prstGeom prst="rect">
+            <a:avLst/>
+          </a:prstGeom>
+          <a:noFill/>
+        </p:spPr>
+        <p:txBody>
+          <a:bodyPr wrap="square" rtlCol="0">
+            <a:spAutoFit/>
+          </a:bodyPr>
+          <a:lstStyle/>
+          <a:p>
+            <a:r>
+              <a:rPr lang="es-MX" dirty="0"/>
+              <a:t>Propiedades</a:t>
+            </a:r>
+          </a:p>
+          <a:p>
+            <a:r>
+              <a:rPr lang="es-MX" dirty="0"/>
+              <a:t>De JDBC</a:t>
+            </a:r>
+          </a:p>
+        </p:txBody>
+      </p:sp>
+      <p:sp>
+        <p:nvSpPr>
+          <p:cNvPr id="13" name="Cerrar llave 12">
+            <a:extLst>
+              <a:ext uri="{FF2B5EF4-FFF2-40B4-BE49-F238E27FC236}">
+                <a16:creationId xmlns:a16="http://schemas.microsoft.com/office/drawing/2014/main" id="{8AAB8C40-3AE7-4602-8F42-7167A2BB7D65}"/>
+              </a:ext>
+            </a:extLst>
+          </p:cNvPr>
+          <p:cNvSpPr/>
+          <p:nvPr/>
+        </p:nvSpPr>
+        <p:spPr>
+          <a:xfrm>
+            <a:off x="10432293" y="4677828"/>
+            <a:ext cx="294640" cy="812983"/>
+          </a:xfrm>
+          <a:prstGeom prst="rightBrace">
+            <a:avLst/>
+          </a:prstGeom>
+          <a:noFill/>
+          <a:ln w="19050">
+            <a:solidFill>
+              <a:schemeClr val="accent6">
+                <a:lumMod val="75000"/>
+              </a:schemeClr>
+            </a:solidFill>
+          </a:ln>
+        </p:spPr>
+        <p:style>
+          <a:lnRef idx="1">
+            <a:schemeClr val="accent1"/>
+          </a:lnRef>
+          <a:fillRef idx="0">
+            <a:schemeClr val="accent1"/>
+          </a:fillRef>
+          <a:effectRef idx="0">
+            <a:schemeClr val="accent1"/>
+          </a:effectRef>
+          <a:fontRef idx="minor">
+            <a:schemeClr val="tx1"/>
+          </a:fontRef>
+        </p:style>
+        <p:txBody>
+          <a:bodyPr rtlCol="0" anchor="ctr"/>
+          <a:lstStyle/>
+          <a:p>
+            <a:pPr algn="ctr"/>
+            <a:endParaRPr lang="es-MX"/>
+          </a:p>
+        </p:txBody>
+      </p:sp>
+      <p:sp>
+        <p:nvSpPr>
+          <p:cNvPr id="14" name="Rectángulo: esquinas redondeadas 13">
+            <a:extLst>
+              <a:ext uri="{FF2B5EF4-FFF2-40B4-BE49-F238E27FC236}">
+                <a16:creationId xmlns:a16="http://schemas.microsoft.com/office/drawing/2014/main" id="{DFAD297F-E596-4D7B-93DB-A01E5D9FFB05}"/>
+              </a:ext>
+            </a:extLst>
+          </p:cNvPr>
+          <p:cNvSpPr/>
+          <p:nvPr/>
+        </p:nvSpPr>
+        <p:spPr>
+          <a:xfrm>
+            <a:off x="982112" y="4616868"/>
+            <a:ext cx="9399380" cy="958971"/>
+          </a:xfrm>
+          <a:prstGeom prst="roundRect">
+            <a:avLst/>
+          </a:prstGeom>
+          <a:noFill/>
+          <a:ln w="28575">
+            <a:solidFill>
+              <a:schemeClr val="accent6">
+                <a:lumMod val="75000"/>
+              </a:schemeClr>
+            </a:solidFill>
+          </a:ln>
+        </p:spPr>
+        <p:style>
+          <a:lnRef idx="2">
+            <a:schemeClr val="accent1">
+              <a:shade val="50000"/>
+            </a:schemeClr>
+          </a:lnRef>
+          <a:fillRef idx="1">
+            <a:schemeClr val="accent1"/>
+          </a:fillRef>
+          <a:effectRef idx="0">
+            <a:schemeClr val="accent1"/>
+          </a:effectRef>
+          <a:fontRef idx="minor">
+            <a:schemeClr val="lt1"/>
+          </a:fontRef>
+        </p:style>
+        <p:txBody>
+          <a:bodyPr rtlCol="0" anchor="ctr"/>
+          <a:lstStyle/>
+          <a:p>
+            <a:pPr algn="ctr"/>
+            <a:endParaRPr lang="es-MX"/>
+          </a:p>
+        </p:txBody>
+      </p:sp>
+      <p:sp>
+        <p:nvSpPr>
+          <p:cNvPr id="15" name="CuadroTexto 14">
+            <a:extLst>
+              <a:ext uri="{FF2B5EF4-FFF2-40B4-BE49-F238E27FC236}">
+                <a16:creationId xmlns:a16="http://schemas.microsoft.com/office/drawing/2014/main" id="{B5DEE03F-2B63-4D29-A4DE-DE69CFB71F18}"/>
+              </a:ext>
+            </a:extLst>
+          </p:cNvPr>
+          <p:cNvSpPr txBox="1"/>
+          <p:nvPr/>
+        </p:nvSpPr>
+        <p:spPr>
+          <a:xfrm>
+            <a:off x="10701532" y="4796623"/>
+            <a:ext cx="1637788" cy="646331"/>
+          </a:xfrm>
+          <a:prstGeom prst="rect">
+            <a:avLst/>
+          </a:prstGeom>
+          <a:noFill/>
+        </p:spPr>
+        <p:txBody>
+          <a:bodyPr wrap="square" rtlCol="0">
+            <a:spAutoFit/>
+          </a:bodyPr>
+          <a:lstStyle/>
+          <a:p>
+            <a:r>
+              <a:rPr lang="es-MX" dirty="0"/>
+              <a:t>Propiedades</a:t>
+            </a:r>
+          </a:p>
+          <a:p>
+            <a:r>
+              <a:rPr lang="es-MX" dirty="0"/>
+              <a:t>De Hibernate</a:t>
+            </a:r>
+          </a:p>
+        </p:txBody>
+      </p:sp>
+      <p:sp>
+        <p:nvSpPr>
+          <p:cNvPr id="16" name="CuadroTexto 15">
+            <a:extLst>
+              <a:ext uri="{FF2B5EF4-FFF2-40B4-BE49-F238E27FC236}">
+                <a16:creationId xmlns:a16="http://schemas.microsoft.com/office/drawing/2014/main" id="{929FA3EB-6C37-4D59-973D-FF2F6E95FF5E}"/>
+              </a:ext>
+            </a:extLst>
+          </p:cNvPr>
+          <p:cNvSpPr txBox="1"/>
+          <p:nvPr/>
+        </p:nvSpPr>
+        <p:spPr>
+          <a:xfrm>
+            <a:off x="841899" y="5738295"/>
+            <a:ext cx="9590394" cy="369332"/>
+          </a:xfrm>
+          <a:prstGeom prst="rect">
+            <a:avLst/>
+          </a:prstGeom>
+          <a:noFill/>
+        </p:spPr>
+        <p:txBody>
+          <a:bodyPr wrap="square" rtlCol="0">
+            <a:spAutoFit/>
+          </a:bodyPr>
+          <a:lstStyle/>
+          <a:p>
+            <a:pPr marL="285750" indent="-285750">
+              <a:buFont typeface="Arial" panose="020B0604020202020204" pitchFamily="34" charset="0"/>
+              <a:buChar char="•"/>
+            </a:pPr>
+            <a:r>
+              <a:rPr lang="es-MX" b="1" dirty="0"/>
+              <a:t>Propiedades con descripción Hibernate: </a:t>
+            </a:r>
+            <a:r>
+              <a:rPr lang="es-MX" dirty="0">
+                <a:hlinkClick r:id="rId4"/>
+              </a:rPr>
+              <a:t>https://red.ht/3kvutFG</a:t>
+            </a:r>
+            <a:endParaRPr lang="es-MX" dirty="0"/>
+          </a:p>
+        </p:txBody>
+      </p:sp>
+    </p:spTree>
+    <p:extLst>
+      <p:ext uri="{BB962C8B-B14F-4D97-AF65-F5344CB8AC3E}">
+        <p14:creationId xmlns:p14="http://schemas.microsoft.com/office/powerpoint/2010/main" val="2829592365"/>
+      </p:ext>
+    </p:extLst>
+  </p:cSld>
+  <p:clrMapOvr>
+    <a:masterClrMapping/>
+  </p:clrMapOvr>
+</p:sld>
+</file>
+
+<file path=ppt/slides/slide17.xml><?xml version="1.0" encoding="utf-8"?>
+<p:sld xmlns:a="http://schemas.openxmlformats.org/drawingml/2006/main" xmlns:r="http://schemas.openxmlformats.org/officeDocument/2006/relationships" xmlns:p="http://schemas.openxmlformats.org/presentationml/2006/main">
+  <p:cSld>
+    <p:spTree>
+      <p:nvGrpSpPr>
+        <p:cNvPr id="1" name=""/>
+        <p:cNvGrpSpPr/>
+        <p:nvPr/>
+      </p:nvGrpSpPr>
+      <p:grpSpPr>
+        <a:xfrm>
+          <a:off x="0" y="0"/>
+          <a:ext cx="0" cy="0"/>
+          <a:chOff x="0" y="0"/>
+          <a:chExt cx="0" cy="0"/>
+        </a:xfrm>
+      </p:grpSpPr>
+      <p:pic>
+        <p:nvPicPr>
+          <p:cNvPr id="25" name="Imagen 24">
+            <a:extLst>
+              <a:ext uri="{FF2B5EF4-FFF2-40B4-BE49-F238E27FC236}">
+                <a16:creationId xmlns:a16="http://schemas.microsoft.com/office/drawing/2014/main" id="{E96E727B-4132-4D8E-A6DE-F6EA22CAC2C3}"/>
+              </a:ext>
+            </a:extLst>
+          </p:cNvPr>
+          <p:cNvPicPr>
+            <a:picLocks noChangeAspect="1"/>
+          </p:cNvPicPr>
+          <p:nvPr/>
+        </p:nvPicPr>
+        <p:blipFill>
+          <a:blip r:embed="rId2"/>
+          <a:stretch>
+            <a:fillRect/>
+          </a:stretch>
+        </p:blipFill>
+        <p:spPr>
+          <a:xfrm>
+            <a:off x="734663" y="940680"/>
+            <a:ext cx="5534025" cy="1695450"/>
+          </a:xfrm>
+          <a:prstGeom prst="rect">
+            <a:avLst/>
+          </a:prstGeom>
+        </p:spPr>
+      </p:pic>
+      <p:sp>
+        <p:nvSpPr>
+          <p:cNvPr id="3" name="Marcador de contenido 2">
+            <a:extLst>
+              <a:ext uri="{FF2B5EF4-FFF2-40B4-BE49-F238E27FC236}">
+                <a16:creationId xmlns:a16="http://schemas.microsoft.com/office/drawing/2014/main" id="{413D056A-E1B1-4B81-9ECE-A71E6E1E4399}"/>
+              </a:ext>
+            </a:extLst>
+          </p:cNvPr>
+          <p:cNvSpPr>
+            <a:spLocks noGrp="1"/>
+          </p:cNvSpPr>
+          <p:nvPr>
+            <p:ph idx="1"/>
+          </p:nvPr>
+        </p:nvSpPr>
+        <p:spPr>
+          <a:xfrm>
+            <a:off x="838200" y="495300"/>
+            <a:ext cx="10515600" cy="447675"/>
+          </a:xfrm>
+        </p:spPr>
+        <p:txBody>
+          <a:bodyPr/>
+          <a:lstStyle/>
+          <a:p>
+            <a:r>
+              <a:rPr lang="es-MX" dirty="0"/>
+              <a:t>Clase de configuración</a:t>
+            </a:r>
+          </a:p>
+        </p:txBody>
+      </p:sp>
+      <p:sp>
+        <p:nvSpPr>
+          <p:cNvPr id="6" name="CuadroTexto 5">
+            <a:extLst>
+              <a:ext uri="{FF2B5EF4-FFF2-40B4-BE49-F238E27FC236}">
+                <a16:creationId xmlns:a16="http://schemas.microsoft.com/office/drawing/2014/main" id="{4C558642-7C78-4C5A-BCF2-03F79A467F34}"/>
+              </a:ext>
+            </a:extLst>
+          </p:cNvPr>
+          <p:cNvSpPr txBox="1"/>
+          <p:nvPr/>
+        </p:nvSpPr>
+        <p:spPr>
+          <a:xfrm>
+            <a:off x="6441378" y="758309"/>
+            <a:ext cx="4748018" cy="338554"/>
+          </a:xfrm>
+          <a:prstGeom prst="rect">
+            <a:avLst/>
+          </a:prstGeom>
+          <a:noFill/>
+        </p:spPr>
+        <p:txBody>
+          <a:bodyPr wrap="square" rtlCol="0">
+            <a:spAutoFit/>
+          </a:bodyPr>
+          <a:lstStyle/>
+          <a:p>
+            <a:r>
+              <a:rPr lang="es-MX" sz="1600" dirty="0"/>
+              <a:t>Indicamos que es una clase de configuración</a:t>
+            </a:r>
+          </a:p>
+        </p:txBody>
+      </p:sp>
+      <p:sp>
+        <p:nvSpPr>
+          <p:cNvPr id="7" name="CuadroTexto 6">
+            <a:extLst>
+              <a:ext uri="{FF2B5EF4-FFF2-40B4-BE49-F238E27FC236}">
+                <a16:creationId xmlns:a16="http://schemas.microsoft.com/office/drawing/2014/main" id="{E009E6C8-25A4-4106-8147-9BC88BB486CF}"/>
+              </a:ext>
+            </a:extLst>
+          </p:cNvPr>
+          <p:cNvSpPr txBox="1"/>
+          <p:nvPr/>
+        </p:nvSpPr>
+        <p:spPr>
+          <a:xfrm>
+            <a:off x="6441378" y="1103351"/>
+            <a:ext cx="4748018" cy="338554"/>
+          </a:xfrm>
+          <a:prstGeom prst="rect">
+            <a:avLst/>
+          </a:prstGeom>
+          <a:noFill/>
+        </p:spPr>
+        <p:txBody>
+          <a:bodyPr wrap="square" rtlCol="0">
+            <a:spAutoFit/>
+          </a:bodyPr>
+          <a:lstStyle/>
+          <a:p>
+            <a:r>
+              <a:rPr lang="es-MX" sz="1600" dirty="0"/>
+              <a:t>Leemos el archivo de propiedades</a:t>
+            </a:r>
+          </a:p>
+        </p:txBody>
+      </p:sp>
+      <p:sp>
+        <p:nvSpPr>
+          <p:cNvPr id="8" name="CuadroTexto 7">
+            <a:extLst>
+              <a:ext uri="{FF2B5EF4-FFF2-40B4-BE49-F238E27FC236}">
+                <a16:creationId xmlns:a16="http://schemas.microsoft.com/office/drawing/2014/main" id="{FB8DFD46-8C8E-411F-A4AE-A7E46006A77E}"/>
+              </a:ext>
+            </a:extLst>
+          </p:cNvPr>
+          <p:cNvSpPr txBox="1"/>
+          <p:nvPr/>
+        </p:nvSpPr>
+        <p:spPr>
+          <a:xfrm>
+            <a:off x="6441377" y="1448393"/>
+            <a:ext cx="5438775" cy="584775"/>
+          </a:xfrm>
+          <a:prstGeom prst="rect">
+            <a:avLst/>
+          </a:prstGeom>
+          <a:noFill/>
+        </p:spPr>
+        <p:txBody>
+          <a:bodyPr wrap="square" rtlCol="0">
+            <a:spAutoFit/>
+          </a:bodyPr>
+          <a:lstStyle/>
+          <a:p>
+            <a:r>
+              <a:rPr lang="es-MX" sz="1600" dirty="0"/>
+              <a:t>Indicamos que escanee si no hay más @Components (@Beans)</a:t>
+            </a:r>
+          </a:p>
+        </p:txBody>
+      </p:sp>
+      <p:cxnSp>
+        <p:nvCxnSpPr>
+          <p:cNvPr id="12" name="Conector recto de flecha 11">
+            <a:extLst>
+              <a:ext uri="{FF2B5EF4-FFF2-40B4-BE49-F238E27FC236}">
+                <a16:creationId xmlns:a16="http://schemas.microsoft.com/office/drawing/2014/main" id="{41E10C58-4DDC-4687-AD12-B45C5A41D3BE}"/>
+              </a:ext>
+            </a:extLst>
+          </p:cNvPr>
+          <p:cNvCxnSpPr>
+            <a:cxnSpLocks/>
+            <a:stCxn id="6" idx="1"/>
+          </p:cNvCxnSpPr>
+          <p:nvPr/>
+        </p:nvCxnSpPr>
+        <p:spPr>
+          <a:xfrm flipH="1">
+            <a:off x="2438400" y="927586"/>
+            <a:ext cx="4002978" cy="101114"/>
+          </a:xfrm>
+          <a:prstGeom prst="straightConnector1">
+            <a:avLst/>
+          </a:prstGeom>
+          <a:ln>
+            <a:solidFill>
+              <a:srgbClr val="FF0000"/>
+            </a:solidFill>
+            <a:tailEnd type="triangle"/>
+          </a:ln>
+        </p:spPr>
+        <p:style>
+          <a:lnRef idx="1">
+            <a:schemeClr val="accent1"/>
+          </a:lnRef>
+          <a:fillRef idx="0">
+            <a:schemeClr val="accent1"/>
+          </a:fillRef>
+          <a:effectRef idx="0">
+            <a:schemeClr val="accent1"/>
+          </a:effectRef>
+          <a:fontRef idx="minor">
+            <a:schemeClr val="tx1"/>
+          </a:fontRef>
+        </p:style>
+      </p:cxnSp>
+      <p:cxnSp>
+        <p:nvCxnSpPr>
+          <p:cNvPr id="14" name="Conector recto de flecha 13">
+            <a:extLst>
+              <a:ext uri="{FF2B5EF4-FFF2-40B4-BE49-F238E27FC236}">
+                <a16:creationId xmlns:a16="http://schemas.microsoft.com/office/drawing/2014/main" id="{13378DF3-6CFC-4F10-9325-054CF71F3E9A}"/>
+              </a:ext>
+            </a:extLst>
+          </p:cNvPr>
+          <p:cNvCxnSpPr>
+            <a:cxnSpLocks/>
+            <a:stCxn id="7" idx="1"/>
+          </p:cNvCxnSpPr>
+          <p:nvPr/>
+        </p:nvCxnSpPr>
+        <p:spPr>
+          <a:xfrm flipH="1" flipV="1">
+            <a:off x="6000750" y="1202292"/>
+            <a:ext cx="440628" cy="70336"/>
+          </a:xfrm>
+          <a:prstGeom prst="straightConnector1">
+            <a:avLst/>
+          </a:prstGeom>
+          <a:ln>
+            <a:solidFill>
+              <a:srgbClr val="FF0000"/>
+            </a:solidFill>
+            <a:tailEnd type="triangle"/>
+          </a:ln>
+        </p:spPr>
+        <p:style>
+          <a:lnRef idx="1">
+            <a:schemeClr val="accent1"/>
+          </a:lnRef>
+          <a:fillRef idx="0">
+            <a:schemeClr val="accent1"/>
+          </a:fillRef>
+          <a:effectRef idx="0">
+            <a:schemeClr val="accent1"/>
+          </a:effectRef>
+          <a:fontRef idx="minor">
+            <a:schemeClr val="tx1"/>
+          </a:fontRef>
+        </p:style>
+      </p:cxnSp>
+      <p:cxnSp>
+        <p:nvCxnSpPr>
+          <p:cNvPr id="17" name="Conector recto de flecha 16">
+            <a:extLst>
+              <a:ext uri="{FF2B5EF4-FFF2-40B4-BE49-F238E27FC236}">
+                <a16:creationId xmlns:a16="http://schemas.microsoft.com/office/drawing/2014/main" id="{FBF94011-B4C6-4D95-AD3E-EE5676016C44}"/>
+              </a:ext>
+            </a:extLst>
+          </p:cNvPr>
+          <p:cNvCxnSpPr>
+            <a:cxnSpLocks/>
+            <a:stCxn id="8" idx="1"/>
+          </p:cNvCxnSpPr>
+          <p:nvPr/>
+        </p:nvCxnSpPr>
+        <p:spPr>
+          <a:xfrm flipH="1" flipV="1">
+            <a:off x="6000749" y="1440417"/>
+            <a:ext cx="440628" cy="300364"/>
+          </a:xfrm>
+          <a:prstGeom prst="straightConnector1">
+            <a:avLst/>
+          </a:prstGeom>
+          <a:ln>
+            <a:solidFill>
+              <a:srgbClr val="FF0000"/>
+            </a:solidFill>
+            <a:tailEnd type="triangle"/>
+          </a:ln>
+        </p:spPr>
+        <p:style>
+          <a:lnRef idx="1">
+            <a:schemeClr val="accent1"/>
+          </a:lnRef>
+          <a:fillRef idx="0">
+            <a:schemeClr val="accent1"/>
+          </a:fillRef>
+          <a:effectRef idx="0">
+            <a:schemeClr val="accent1"/>
+          </a:effectRef>
+          <a:fontRef idx="minor">
+            <a:schemeClr val="tx1"/>
+          </a:fontRef>
+        </p:style>
+      </p:cxnSp>
+      <p:sp>
+        <p:nvSpPr>
+          <p:cNvPr id="20" name="CuadroTexto 19">
+            <a:extLst>
+              <a:ext uri="{FF2B5EF4-FFF2-40B4-BE49-F238E27FC236}">
+                <a16:creationId xmlns:a16="http://schemas.microsoft.com/office/drawing/2014/main" id="{1ED56310-5F4D-40C2-B5C9-B9F2E71D8AE4}"/>
+              </a:ext>
+            </a:extLst>
+          </p:cNvPr>
+          <p:cNvSpPr txBox="1"/>
+          <p:nvPr/>
+        </p:nvSpPr>
+        <p:spPr>
+          <a:xfrm>
+            <a:off x="6441377" y="2039656"/>
+            <a:ext cx="5438775" cy="584775"/>
+          </a:xfrm>
+          <a:prstGeom prst="rect">
+            <a:avLst/>
+          </a:prstGeom>
+          <a:noFill/>
+        </p:spPr>
+        <p:txBody>
+          <a:bodyPr wrap="square" rtlCol="0">
+            <a:spAutoFit/>
+          </a:bodyPr>
+          <a:lstStyle/>
+          <a:p>
+            <a:r>
+              <a:rPr lang="es-MX" sz="1600" dirty="0"/>
+              <a:t>En caso de usar HibernateTemplate de spring-orm añadir etiqueta de transacciones. </a:t>
+            </a:r>
+            <a:r>
+              <a:rPr lang="es-MX" sz="1600" dirty="0">
+                <a:hlinkClick r:id="rId3"/>
+              </a:rPr>
+              <a:t>https://bit.ly/3koOVID</a:t>
+            </a:r>
+            <a:r>
+              <a:rPr lang="es-MX" sz="1600" dirty="0"/>
+              <a:t> </a:t>
+            </a:r>
+          </a:p>
+        </p:txBody>
+      </p:sp>
+      <p:cxnSp>
+        <p:nvCxnSpPr>
+          <p:cNvPr id="21" name="Conector recto de flecha 20">
+            <a:extLst>
+              <a:ext uri="{FF2B5EF4-FFF2-40B4-BE49-F238E27FC236}">
+                <a16:creationId xmlns:a16="http://schemas.microsoft.com/office/drawing/2014/main" id="{86D6916B-77EF-4992-A0E9-1B1B9D2B69C0}"/>
+              </a:ext>
+            </a:extLst>
+          </p:cNvPr>
+          <p:cNvCxnSpPr>
+            <a:cxnSpLocks/>
+            <a:stCxn id="20" idx="1"/>
+          </p:cNvCxnSpPr>
+          <p:nvPr/>
+        </p:nvCxnSpPr>
+        <p:spPr>
+          <a:xfrm flipH="1" flipV="1">
+            <a:off x="3819525" y="1609694"/>
+            <a:ext cx="2621852" cy="722350"/>
+          </a:xfrm>
+          <a:prstGeom prst="straightConnector1">
+            <a:avLst/>
+          </a:prstGeom>
+          <a:ln>
+            <a:solidFill>
+              <a:srgbClr val="FF0000"/>
+            </a:solidFill>
+            <a:tailEnd type="triangle"/>
+          </a:ln>
+        </p:spPr>
+        <p:style>
+          <a:lnRef idx="1">
+            <a:schemeClr val="accent1"/>
+          </a:lnRef>
+          <a:fillRef idx="0">
+            <a:schemeClr val="accent1"/>
+          </a:fillRef>
+          <a:effectRef idx="0">
+            <a:schemeClr val="accent1"/>
+          </a:effectRef>
+          <a:fontRef idx="minor">
+            <a:schemeClr val="tx1"/>
+          </a:fontRef>
+        </p:style>
+      </p:cxnSp>
+      <p:sp>
+        <p:nvSpPr>
+          <p:cNvPr id="26" name="CuadroTexto 25">
+            <a:extLst>
+              <a:ext uri="{FF2B5EF4-FFF2-40B4-BE49-F238E27FC236}">
+                <a16:creationId xmlns:a16="http://schemas.microsoft.com/office/drawing/2014/main" id="{3615551A-8EE3-446B-B70D-24708322C2EA}"/>
+              </a:ext>
+            </a:extLst>
+          </p:cNvPr>
+          <p:cNvSpPr txBox="1"/>
+          <p:nvPr/>
+        </p:nvSpPr>
+        <p:spPr>
+          <a:xfrm>
+            <a:off x="6441377" y="2669110"/>
+            <a:ext cx="5438775" cy="584775"/>
+          </a:xfrm>
+          <a:prstGeom prst="rect">
+            <a:avLst/>
+          </a:prstGeom>
+          <a:noFill/>
+        </p:spPr>
+        <p:txBody>
+          <a:bodyPr wrap="square" rtlCol="0">
+            <a:spAutoFit/>
+          </a:bodyPr>
+          <a:lstStyle/>
+          <a:p>
+            <a:r>
+              <a:rPr lang="es-MX" sz="1600" dirty="0"/>
+              <a:t>InyDep de la clase Environment por parte de Spring-</a:t>
+            </a:r>
+            <a:r>
+              <a:rPr lang="es-MX" sz="1600" dirty="0" err="1"/>
+              <a:t>core</a:t>
+            </a:r>
+            <a:r>
+              <a:rPr lang="es-MX" sz="1600" dirty="0"/>
+              <a:t> para acceder al archivo de propiedades</a:t>
+            </a:r>
+          </a:p>
+        </p:txBody>
+      </p:sp>
+      <p:cxnSp>
+        <p:nvCxnSpPr>
+          <p:cNvPr id="27" name="Conector recto de flecha 26">
+            <a:extLst>
+              <a:ext uri="{FF2B5EF4-FFF2-40B4-BE49-F238E27FC236}">
+                <a16:creationId xmlns:a16="http://schemas.microsoft.com/office/drawing/2014/main" id="{45431441-9ED3-4B62-9B0F-2E8DB02EAFDF}"/>
+              </a:ext>
+            </a:extLst>
+          </p:cNvPr>
+          <p:cNvCxnSpPr>
+            <a:cxnSpLocks/>
+            <a:stCxn id="26" idx="1"/>
+          </p:cNvCxnSpPr>
+          <p:nvPr/>
+        </p:nvCxnSpPr>
+        <p:spPr>
+          <a:xfrm flipH="1" flipV="1">
+            <a:off x="3619500" y="2370234"/>
+            <a:ext cx="2821877" cy="591264"/>
+          </a:xfrm>
+          <a:prstGeom prst="straightConnector1">
+            <a:avLst/>
+          </a:prstGeom>
+          <a:ln>
+            <a:solidFill>
+              <a:srgbClr val="FF0000"/>
+            </a:solidFill>
+            <a:tailEnd type="triangle"/>
+          </a:ln>
+        </p:spPr>
+        <p:style>
+          <a:lnRef idx="1">
+            <a:schemeClr val="accent1"/>
+          </a:lnRef>
+          <a:fillRef idx="0">
+            <a:schemeClr val="accent1"/>
+          </a:fillRef>
+          <a:effectRef idx="0">
+            <a:schemeClr val="accent1"/>
+          </a:effectRef>
+          <a:fontRef idx="minor">
+            <a:schemeClr val="tx1"/>
+          </a:fontRef>
+        </p:style>
+      </p:cxnSp>
+      <p:sp>
+        <p:nvSpPr>
+          <p:cNvPr id="30" name="Rectángulo: esquinas redondeadas 29">
+            <a:extLst>
+              <a:ext uri="{FF2B5EF4-FFF2-40B4-BE49-F238E27FC236}">
+                <a16:creationId xmlns:a16="http://schemas.microsoft.com/office/drawing/2014/main" id="{BCE1721A-F747-4A1D-86C0-0BA4D2EDFB23}"/>
+              </a:ext>
+            </a:extLst>
+          </p:cNvPr>
+          <p:cNvSpPr/>
+          <p:nvPr/>
+        </p:nvSpPr>
+        <p:spPr>
+          <a:xfrm>
+            <a:off x="765810" y="3673578"/>
+            <a:ext cx="10849610" cy="386696"/>
+          </a:xfrm>
+          <a:prstGeom prst="roundRect">
+            <a:avLst/>
+          </a:prstGeom>
+          <a:solidFill>
+            <a:schemeClr val="accent5">
+              <a:lumMod val="40000"/>
+              <a:lumOff val="60000"/>
+            </a:schemeClr>
+          </a:solidFill>
+        </p:spPr>
+        <p:style>
+          <a:lnRef idx="2">
+            <a:schemeClr val="accent1">
+              <a:shade val="50000"/>
+            </a:schemeClr>
+          </a:lnRef>
+          <a:fillRef idx="1">
+            <a:schemeClr val="accent1"/>
+          </a:fillRef>
+          <a:effectRef idx="0">
+            <a:schemeClr val="accent1"/>
+          </a:effectRef>
+          <a:fontRef idx="minor">
+            <a:schemeClr val="lt1"/>
+          </a:fontRef>
+        </p:style>
+        <p:txBody>
+          <a:bodyPr rtlCol="0" anchor="ctr"/>
+          <a:lstStyle/>
+          <a:p>
+            <a:pPr algn="ctr"/>
+            <a:r>
+              <a:rPr lang="es-MX" dirty="0">
+                <a:solidFill>
+                  <a:schemeClr val="tx1"/>
+                </a:solidFill>
+              </a:rPr>
+              <a:t>Configurando @Bean - DataSource</a:t>
+            </a:r>
+          </a:p>
+        </p:txBody>
+      </p:sp>
+      <p:cxnSp>
+        <p:nvCxnSpPr>
+          <p:cNvPr id="32" name="Conector recto 31">
+            <a:extLst>
+              <a:ext uri="{FF2B5EF4-FFF2-40B4-BE49-F238E27FC236}">
+                <a16:creationId xmlns:a16="http://schemas.microsoft.com/office/drawing/2014/main" id="{945E9BB1-5885-428B-92DB-116B04F97884}"/>
+              </a:ext>
+            </a:extLst>
+          </p:cNvPr>
+          <p:cNvCxnSpPr/>
+          <p:nvPr/>
+        </p:nvCxnSpPr>
+        <p:spPr>
+          <a:xfrm>
+            <a:off x="1275715" y="3422327"/>
+            <a:ext cx="9829800" cy="0"/>
+          </a:xfrm>
+          <a:prstGeom prst="line">
+            <a:avLst/>
+          </a:prstGeom>
+          <a:ln w="9525"/>
+        </p:spPr>
+        <p:style>
+          <a:lnRef idx="1">
+            <a:schemeClr val="dk1"/>
+          </a:lnRef>
+          <a:fillRef idx="0">
+            <a:schemeClr val="dk1"/>
+          </a:fillRef>
+          <a:effectRef idx="0">
+            <a:schemeClr val="dk1"/>
+          </a:effectRef>
+          <a:fontRef idx="minor">
+            <a:schemeClr val="tx1"/>
+          </a:fontRef>
+        </p:style>
+      </p:cxnSp>
+      <p:pic>
+        <p:nvPicPr>
+          <p:cNvPr id="34" name="Imagen 33">
+            <a:extLst>
+              <a:ext uri="{FF2B5EF4-FFF2-40B4-BE49-F238E27FC236}">
+                <a16:creationId xmlns:a16="http://schemas.microsoft.com/office/drawing/2014/main" id="{305E8C62-4EB2-479B-B76C-2A7BA933F20D}"/>
+              </a:ext>
+            </a:extLst>
+          </p:cNvPr>
+          <p:cNvPicPr>
+            <a:picLocks noChangeAspect="1"/>
+          </p:cNvPicPr>
+          <p:nvPr/>
+        </p:nvPicPr>
+        <p:blipFill>
+          <a:blip r:embed="rId4"/>
+          <a:stretch>
+            <a:fillRect/>
+          </a:stretch>
+        </p:blipFill>
+        <p:spPr>
+          <a:xfrm>
+            <a:off x="838200" y="4311524"/>
+            <a:ext cx="6800466" cy="1891784"/>
+          </a:xfrm>
+          <a:prstGeom prst="rect">
+            <a:avLst/>
+          </a:prstGeom>
+          <a:ln>
+            <a:solidFill>
+              <a:schemeClr val="tx1"/>
+            </a:solidFill>
+          </a:ln>
+        </p:spPr>
+      </p:pic>
+      <p:sp>
+        <p:nvSpPr>
+          <p:cNvPr id="35" name="CuadroTexto 34">
+            <a:extLst>
+              <a:ext uri="{FF2B5EF4-FFF2-40B4-BE49-F238E27FC236}">
+                <a16:creationId xmlns:a16="http://schemas.microsoft.com/office/drawing/2014/main" id="{12A17533-935D-414F-A0D4-A59101EF9DD9}"/>
+              </a:ext>
+            </a:extLst>
+          </p:cNvPr>
+          <p:cNvSpPr txBox="1"/>
+          <p:nvPr/>
+        </p:nvSpPr>
+        <p:spPr>
+          <a:xfrm>
+            <a:off x="7831643" y="4384717"/>
+            <a:ext cx="4115184" cy="338554"/>
+          </a:xfrm>
+          <a:prstGeom prst="rect">
+            <a:avLst/>
+          </a:prstGeom>
+          <a:noFill/>
+        </p:spPr>
+        <p:txBody>
+          <a:bodyPr wrap="square" rtlCol="0">
+            <a:spAutoFit/>
+          </a:bodyPr>
+          <a:lstStyle/>
+          <a:p>
+            <a:r>
+              <a:rPr lang="es-MX" sz="1600" dirty="0"/>
+              <a:t>DataSource por parte de Spring-</a:t>
+            </a:r>
+            <a:r>
+              <a:rPr lang="es-MX" sz="1600" dirty="0" err="1"/>
+              <a:t>jdbc</a:t>
+            </a:r>
+            <a:r>
+              <a:rPr lang="es-MX" sz="1600" dirty="0"/>
+              <a:t>. </a:t>
+            </a:r>
+          </a:p>
+        </p:txBody>
+      </p:sp>
+      <p:cxnSp>
+        <p:nvCxnSpPr>
+          <p:cNvPr id="36" name="Conector recto de flecha 35">
+            <a:extLst>
+              <a:ext uri="{FF2B5EF4-FFF2-40B4-BE49-F238E27FC236}">
+                <a16:creationId xmlns:a16="http://schemas.microsoft.com/office/drawing/2014/main" id="{F3C43466-6D23-4409-9821-23337F1B8B2E}"/>
+              </a:ext>
+            </a:extLst>
+          </p:cNvPr>
+          <p:cNvCxnSpPr>
+            <a:cxnSpLocks/>
+            <a:stCxn id="35" idx="1"/>
+          </p:cNvCxnSpPr>
+          <p:nvPr/>
+        </p:nvCxnSpPr>
+        <p:spPr>
+          <a:xfrm flipH="1">
+            <a:off x="4439889" y="4553994"/>
+            <a:ext cx="3391754" cy="129599"/>
+          </a:xfrm>
+          <a:prstGeom prst="straightConnector1">
+            <a:avLst/>
+          </a:prstGeom>
+          <a:ln>
+            <a:solidFill>
+              <a:srgbClr val="FF0000"/>
+            </a:solidFill>
+            <a:tailEnd type="triangle"/>
+          </a:ln>
+        </p:spPr>
+        <p:style>
+          <a:lnRef idx="1">
+            <a:schemeClr val="accent1"/>
+          </a:lnRef>
+          <a:fillRef idx="0">
+            <a:schemeClr val="accent1"/>
+          </a:fillRef>
+          <a:effectRef idx="0">
+            <a:schemeClr val="accent1"/>
+          </a:effectRef>
+          <a:fontRef idx="minor">
+            <a:schemeClr val="tx1"/>
+          </a:fontRef>
+        </p:style>
+      </p:cxnSp>
+      <p:sp>
+        <p:nvSpPr>
+          <p:cNvPr id="39" name="CuadroTexto 38">
+            <a:extLst>
+              <a:ext uri="{FF2B5EF4-FFF2-40B4-BE49-F238E27FC236}">
+                <a16:creationId xmlns:a16="http://schemas.microsoft.com/office/drawing/2014/main" id="{817111FC-1003-442A-9218-90FB11584747}"/>
+              </a:ext>
+            </a:extLst>
+          </p:cNvPr>
+          <p:cNvSpPr txBox="1"/>
+          <p:nvPr/>
+        </p:nvSpPr>
+        <p:spPr>
+          <a:xfrm>
+            <a:off x="7831643" y="4979288"/>
+            <a:ext cx="4115184" cy="584775"/>
+          </a:xfrm>
+          <a:prstGeom prst="rect">
+            <a:avLst/>
+          </a:prstGeom>
+          <a:noFill/>
+        </p:spPr>
+        <p:txBody>
+          <a:bodyPr wrap="square" rtlCol="0">
+            <a:spAutoFit/>
+          </a:bodyPr>
+          <a:lstStyle/>
+          <a:p>
+            <a:r>
+              <a:rPr lang="es-MX" sz="1600" dirty="0"/>
+              <a:t>Lectura por parte de Environment a través del archivo de propiedades.</a:t>
+            </a:r>
+          </a:p>
+        </p:txBody>
+      </p:sp>
+      <p:cxnSp>
+        <p:nvCxnSpPr>
+          <p:cNvPr id="40" name="Conector recto de flecha 39">
+            <a:extLst>
+              <a:ext uri="{FF2B5EF4-FFF2-40B4-BE49-F238E27FC236}">
+                <a16:creationId xmlns:a16="http://schemas.microsoft.com/office/drawing/2014/main" id="{B16F6D2B-D072-4E86-8764-9B3FFEAC7E32}"/>
+              </a:ext>
+            </a:extLst>
+          </p:cNvPr>
+          <p:cNvCxnSpPr>
+            <a:cxnSpLocks/>
+            <a:stCxn id="39" idx="1"/>
+          </p:cNvCxnSpPr>
+          <p:nvPr/>
+        </p:nvCxnSpPr>
+        <p:spPr>
+          <a:xfrm flipH="1" flipV="1">
+            <a:off x="7181850" y="5047714"/>
+            <a:ext cx="649793" cy="223962"/>
+          </a:xfrm>
+          <a:prstGeom prst="straightConnector1">
+            <a:avLst/>
+          </a:prstGeom>
+          <a:ln>
+            <a:solidFill>
+              <a:srgbClr val="FF0000"/>
+            </a:solidFill>
+            <a:tailEnd type="triangle"/>
+          </a:ln>
+        </p:spPr>
+        <p:style>
+          <a:lnRef idx="1">
+            <a:schemeClr val="accent1"/>
+          </a:lnRef>
+          <a:fillRef idx="0">
+            <a:schemeClr val="accent1"/>
+          </a:fillRef>
+          <a:effectRef idx="0">
+            <a:schemeClr val="accent1"/>
+          </a:effectRef>
+          <a:fontRef idx="minor">
+            <a:schemeClr val="tx1"/>
+          </a:fontRef>
+        </p:style>
+      </p:cxnSp>
+      <p:cxnSp>
+        <p:nvCxnSpPr>
+          <p:cNvPr id="43" name="Conector recto de flecha 42">
+            <a:extLst>
+              <a:ext uri="{FF2B5EF4-FFF2-40B4-BE49-F238E27FC236}">
+                <a16:creationId xmlns:a16="http://schemas.microsoft.com/office/drawing/2014/main" id="{A03F7A55-E934-4158-8ABC-B5882BF75103}"/>
+              </a:ext>
+            </a:extLst>
+          </p:cNvPr>
+          <p:cNvCxnSpPr>
+            <a:cxnSpLocks/>
+            <a:stCxn id="35" idx="1"/>
+          </p:cNvCxnSpPr>
+          <p:nvPr/>
+        </p:nvCxnSpPr>
+        <p:spPr>
+          <a:xfrm flipH="1">
+            <a:off x="3352800" y="4553994"/>
+            <a:ext cx="4478843" cy="1363326"/>
+          </a:xfrm>
+          <a:prstGeom prst="straightConnector1">
+            <a:avLst/>
+          </a:prstGeom>
+          <a:ln>
+            <a:solidFill>
+              <a:srgbClr val="FF0000"/>
+            </a:solidFill>
+            <a:tailEnd type="triangle"/>
+          </a:ln>
+        </p:spPr>
+        <p:style>
+          <a:lnRef idx="1">
+            <a:schemeClr val="accent1"/>
+          </a:lnRef>
+          <a:fillRef idx="0">
+            <a:schemeClr val="accent1"/>
+          </a:fillRef>
+          <a:effectRef idx="0">
+            <a:schemeClr val="accent1"/>
+          </a:effectRef>
+          <a:fontRef idx="minor">
+            <a:schemeClr val="tx1"/>
+          </a:fontRef>
+        </p:style>
+      </p:cxnSp>
+    </p:spTree>
+    <p:extLst>
+      <p:ext uri="{BB962C8B-B14F-4D97-AF65-F5344CB8AC3E}">
+        <p14:creationId xmlns:p14="http://schemas.microsoft.com/office/powerpoint/2010/main" val="1199354044"/>
+      </p:ext>
+    </p:extLst>
+  </p:cSld>
+  <p:clrMapOvr>
+    <a:masterClrMapping/>
+  </p:clrMapOvr>
+</p:sld>
+</file>
+
+<file path=ppt/slides/slide18.xml><?xml version="1.0" encoding="utf-8"?>
+<p:sld xmlns:a="http://schemas.openxmlformats.org/drawingml/2006/main" xmlns:r="http://schemas.openxmlformats.org/officeDocument/2006/relationships" xmlns:p="http://schemas.openxmlformats.org/presentationml/2006/main">
+  <p:cSld>
+    <p:spTree>
+      <p:nvGrpSpPr>
+        <p:cNvPr id="1" name=""/>
+        <p:cNvGrpSpPr/>
+        <p:nvPr/>
+      </p:nvGrpSpPr>
+      <p:grpSpPr>
+        <a:xfrm>
+          <a:off x="0" y="0"/>
+          <a:ext cx="0" cy="0"/>
+          <a:chOff x="0" y="0"/>
+          <a:chExt cx="0" cy="0"/>
+        </a:xfrm>
+      </p:grpSpPr>
+      <p:sp>
+        <p:nvSpPr>
+          <p:cNvPr id="4" name="Rectángulo: esquinas redondeadas 3">
+            <a:extLst>
+              <a:ext uri="{FF2B5EF4-FFF2-40B4-BE49-F238E27FC236}">
+                <a16:creationId xmlns:a16="http://schemas.microsoft.com/office/drawing/2014/main" id="{8F65113C-F596-4CEA-9CD6-69CA8F435373}"/>
+              </a:ext>
+            </a:extLst>
+          </p:cNvPr>
+          <p:cNvSpPr/>
+          <p:nvPr/>
+        </p:nvSpPr>
+        <p:spPr>
+          <a:xfrm>
+            <a:off x="802640" y="452711"/>
+            <a:ext cx="10586719" cy="423590"/>
+          </a:xfrm>
+          <a:prstGeom prst="roundRect">
+            <a:avLst/>
+          </a:prstGeom>
+          <a:solidFill>
+            <a:schemeClr val="accent5">
+              <a:lumMod val="40000"/>
+              <a:lumOff val="60000"/>
+            </a:schemeClr>
+          </a:solidFill>
+        </p:spPr>
+        <p:style>
+          <a:lnRef idx="2">
+            <a:schemeClr val="accent1">
+              <a:shade val="50000"/>
+            </a:schemeClr>
+          </a:lnRef>
+          <a:fillRef idx="1">
+            <a:schemeClr val="accent1"/>
+          </a:fillRef>
+          <a:effectRef idx="0">
+            <a:schemeClr val="accent1"/>
+          </a:effectRef>
+          <a:fontRef idx="minor">
+            <a:schemeClr val="lt1"/>
+          </a:fontRef>
+        </p:style>
+        <p:txBody>
+          <a:bodyPr rtlCol="0" anchor="ctr"/>
+          <a:lstStyle/>
+          <a:p>
+            <a:pPr algn="ctr"/>
+            <a:r>
+              <a:rPr lang="es-MX" dirty="0">
+                <a:solidFill>
+                  <a:schemeClr val="tx1"/>
+                </a:solidFill>
+              </a:rPr>
+              <a:t>Configurando @Bean  -SessionFactory() LocalSessionFactoryBean</a:t>
+            </a:r>
+          </a:p>
+        </p:txBody>
+      </p:sp>
+      <p:pic>
+        <p:nvPicPr>
+          <p:cNvPr id="8" name="Imagen 7">
+            <a:extLst>
+              <a:ext uri="{FF2B5EF4-FFF2-40B4-BE49-F238E27FC236}">
+                <a16:creationId xmlns:a16="http://schemas.microsoft.com/office/drawing/2014/main" id="{05C44D01-7D82-4B6F-9F7D-6E51BB3DC08B}"/>
+              </a:ext>
+            </a:extLst>
+          </p:cNvPr>
+          <p:cNvPicPr>
+            <a:picLocks noChangeAspect="1"/>
+          </p:cNvPicPr>
+          <p:nvPr/>
+        </p:nvPicPr>
+        <p:blipFill>
+          <a:blip r:embed="rId2"/>
+          <a:stretch>
+            <a:fillRect/>
+          </a:stretch>
+        </p:blipFill>
+        <p:spPr>
+          <a:xfrm>
+            <a:off x="430295" y="1295400"/>
+            <a:ext cx="5665705" cy="2276475"/>
+          </a:xfrm>
+          <a:prstGeom prst="rect">
+            <a:avLst/>
+          </a:prstGeom>
+          <a:ln>
+            <a:solidFill>
+              <a:schemeClr val="tx1"/>
+            </a:solidFill>
+          </a:ln>
+        </p:spPr>
+      </p:pic>
+      <p:sp>
+        <p:nvSpPr>
+          <p:cNvPr id="9" name="CuadroTexto 8">
+            <a:extLst>
+              <a:ext uri="{FF2B5EF4-FFF2-40B4-BE49-F238E27FC236}">
+                <a16:creationId xmlns:a16="http://schemas.microsoft.com/office/drawing/2014/main" id="{46746837-9A6D-4169-9774-F38E36995183}"/>
+              </a:ext>
+            </a:extLst>
+          </p:cNvPr>
+          <p:cNvSpPr txBox="1"/>
+          <p:nvPr/>
+        </p:nvSpPr>
+        <p:spPr>
+          <a:xfrm>
+            <a:off x="7646521" y="1126123"/>
+            <a:ext cx="4231154" cy="1077218"/>
+          </a:xfrm>
+          <a:prstGeom prst="rect">
+            <a:avLst/>
+          </a:prstGeom>
+          <a:noFill/>
+        </p:spPr>
+        <p:txBody>
+          <a:bodyPr wrap="square" rtlCol="0">
+            <a:spAutoFit/>
+          </a:bodyPr>
+          <a:lstStyle/>
+          <a:p>
+            <a:pPr algn="just"/>
+            <a:r>
+              <a:rPr lang="es-MX" sz="1600" dirty="0"/>
+              <a:t>SessionFactory – Es sesión que lee el archivo de configuración de Hibernate y creara los objetos de sesión para realizar operaciones CRUD. </a:t>
+            </a:r>
+            <a:r>
+              <a:rPr lang="es-MX" sz="1600" dirty="0">
+                <a:hlinkClick r:id="rId3"/>
+              </a:rPr>
+              <a:t>https://bit.ly/3kqELah</a:t>
+            </a:r>
+            <a:r>
+              <a:rPr lang="es-MX" sz="1600" dirty="0"/>
+              <a:t> </a:t>
+            </a:r>
+          </a:p>
+        </p:txBody>
+      </p:sp>
+      <p:cxnSp>
+        <p:nvCxnSpPr>
+          <p:cNvPr id="13" name="Conector recto de flecha 12">
+            <a:extLst>
+              <a:ext uri="{FF2B5EF4-FFF2-40B4-BE49-F238E27FC236}">
+                <a16:creationId xmlns:a16="http://schemas.microsoft.com/office/drawing/2014/main" id="{691F0AAE-1F6B-4187-8508-83984D4EFEEF}"/>
+              </a:ext>
+            </a:extLst>
+          </p:cNvPr>
+          <p:cNvCxnSpPr>
+            <a:cxnSpLocks/>
+            <a:stCxn id="9" idx="1"/>
+          </p:cNvCxnSpPr>
+          <p:nvPr/>
+        </p:nvCxnSpPr>
+        <p:spPr>
+          <a:xfrm flipH="1" flipV="1">
+            <a:off x="4143375" y="1541621"/>
+            <a:ext cx="3503146" cy="123111"/>
+          </a:xfrm>
+          <a:prstGeom prst="straightConnector1">
+            <a:avLst/>
+          </a:prstGeom>
+          <a:ln>
+            <a:solidFill>
+              <a:srgbClr val="FF0000"/>
+            </a:solidFill>
+            <a:tailEnd type="triangle"/>
+          </a:ln>
+        </p:spPr>
+        <p:style>
+          <a:lnRef idx="1">
+            <a:schemeClr val="accent2"/>
+          </a:lnRef>
+          <a:fillRef idx="0">
+            <a:schemeClr val="accent2"/>
+          </a:fillRef>
+          <a:effectRef idx="0">
+            <a:schemeClr val="accent2"/>
+          </a:effectRef>
+          <a:fontRef idx="minor">
+            <a:schemeClr val="tx1"/>
+          </a:fontRef>
+        </p:style>
+      </p:cxnSp>
+      <p:sp>
+        <p:nvSpPr>
+          <p:cNvPr id="14" name="CuadroTexto 13">
+            <a:extLst>
+              <a:ext uri="{FF2B5EF4-FFF2-40B4-BE49-F238E27FC236}">
+                <a16:creationId xmlns:a16="http://schemas.microsoft.com/office/drawing/2014/main" id="{4BC039AD-F635-455E-A305-5C6778F5537B}"/>
+              </a:ext>
+            </a:extLst>
+          </p:cNvPr>
+          <p:cNvSpPr txBox="1"/>
+          <p:nvPr/>
+        </p:nvSpPr>
+        <p:spPr>
+          <a:xfrm>
+            <a:off x="7646521" y="2202805"/>
+            <a:ext cx="4115184" cy="1323439"/>
+          </a:xfrm>
+          <a:prstGeom prst="rect">
+            <a:avLst/>
+          </a:prstGeom>
+          <a:noFill/>
+        </p:spPr>
+        <p:txBody>
+          <a:bodyPr wrap="square" rtlCol="0">
+            <a:spAutoFit/>
+          </a:bodyPr>
+          <a:lstStyle/>
+          <a:p>
+            <a:pPr algn="just"/>
+            <a:r>
+              <a:rPr lang="es-MX" sz="1600" dirty="0"/>
+              <a:t>LocalSessionFactoryBean – Es la forma de configurar Hibernate compartida en un contexto de Spring, SessionFactory se puse pasar a los objetos de acceso DAO a través de inyección de dependencia. </a:t>
+            </a:r>
+            <a:r>
+              <a:rPr lang="es-MX" sz="1000" dirty="0">
+                <a:hlinkClick r:id="rId4"/>
+              </a:rPr>
+              <a:t>https://bit.ly/3MJhPzh</a:t>
+            </a:r>
+            <a:r>
+              <a:rPr lang="es-MX" sz="1000" dirty="0"/>
+              <a:t> </a:t>
+            </a:r>
+            <a:endParaRPr lang="es-MX" sz="1600" dirty="0"/>
+          </a:p>
+        </p:txBody>
+      </p:sp>
+      <p:cxnSp>
+        <p:nvCxnSpPr>
+          <p:cNvPr id="17" name="Conector recto de flecha 16">
+            <a:extLst>
+              <a:ext uri="{FF2B5EF4-FFF2-40B4-BE49-F238E27FC236}">
+                <a16:creationId xmlns:a16="http://schemas.microsoft.com/office/drawing/2014/main" id="{04F3ED6B-A1F1-4FEC-87DF-161456452314}"/>
+              </a:ext>
+            </a:extLst>
+          </p:cNvPr>
+          <p:cNvCxnSpPr>
+            <a:cxnSpLocks/>
+            <a:stCxn id="14" idx="1"/>
+          </p:cNvCxnSpPr>
+          <p:nvPr/>
+        </p:nvCxnSpPr>
+        <p:spPr>
+          <a:xfrm flipH="1" flipV="1">
+            <a:off x="5724525" y="2165984"/>
+            <a:ext cx="1921996" cy="698541"/>
+          </a:xfrm>
+          <a:prstGeom prst="straightConnector1">
+            <a:avLst/>
+          </a:prstGeom>
+          <a:ln>
+            <a:solidFill>
+              <a:srgbClr val="FF0000"/>
+            </a:solidFill>
+            <a:tailEnd type="triangle"/>
+          </a:ln>
+        </p:spPr>
+        <p:style>
+          <a:lnRef idx="1">
+            <a:schemeClr val="accent1"/>
+          </a:lnRef>
+          <a:fillRef idx="0">
+            <a:schemeClr val="accent1"/>
+          </a:fillRef>
+          <a:effectRef idx="0">
+            <a:schemeClr val="accent1"/>
+          </a:effectRef>
+          <a:fontRef idx="minor">
+            <a:schemeClr val="tx1"/>
+          </a:fontRef>
+        </p:style>
+      </p:cxnSp>
+      <p:sp>
+        <p:nvSpPr>
+          <p:cNvPr id="18" name="Rectángulo: esquinas redondeadas 17">
+            <a:extLst>
+              <a:ext uri="{FF2B5EF4-FFF2-40B4-BE49-F238E27FC236}">
+                <a16:creationId xmlns:a16="http://schemas.microsoft.com/office/drawing/2014/main" id="{58DCD9FA-985E-4304-9125-1A953725E220}"/>
+              </a:ext>
+            </a:extLst>
+          </p:cNvPr>
+          <p:cNvSpPr/>
+          <p:nvPr/>
+        </p:nvSpPr>
+        <p:spPr>
+          <a:xfrm>
+            <a:off x="1333500" y="1800225"/>
+            <a:ext cx="2609850" cy="209550"/>
+          </a:xfrm>
+          <a:prstGeom prst="roundRect">
+            <a:avLst/>
+          </a:prstGeom>
+          <a:noFill/>
+          <a:ln w="19050">
+            <a:solidFill>
+              <a:srgbClr val="FF0000"/>
+            </a:solidFill>
+          </a:ln>
+        </p:spPr>
+        <p:style>
+          <a:lnRef idx="2">
+            <a:schemeClr val="accent1">
+              <a:shade val="50000"/>
+            </a:schemeClr>
+          </a:lnRef>
+          <a:fillRef idx="1">
+            <a:schemeClr val="accent1"/>
+          </a:fillRef>
+          <a:effectRef idx="0">
+            <a:schemeClr val="accent1"/>
+          </a:effectRef>
+          <a:fontRef idx="minor">
+            <a:schemeClr val="lt1"/>
+          </a:fontRef>
+        </p:style>
+        <p:txBody>
+          <a:bodyPr rtlCol="0" anchor="ctr"/>
+          <a:lstStyle/>
+          <a:p>
+            <a:pPr algn="ctr"/>
+            <a:endParaRPr lang="es-MX"/>
+          </a:p>
+        </p:txBody>
+      </p:sp>
+      <p:sp>
+        <p:nvSpPr>
+          <p:cNvPr id="19" name="Rectángulo: esquinas redondeadas 18">
+            <a:extLst>
+              <a:ext uri="{FF2B5EF4-FFF2-40B4-BE49-F238E27FC236}">
+                <a16:creationId xmlns:a16="http://schemas.microsoft.com/office/drawing/2014/main" id="{25E6827E-032F-45EF-9C0F-597585A563C8}"/>
+              </a:ext>
+            </a:extLst>
+          </p:cNvPr>
+          <p:cNvSpPr/>
+          <p:nvPr/>
+        </p:nvSpPr>
+        <p:spPr>
+          <a:xfrm>
+            <a:off x="1333500" y="2009775"/>
+            <a:ext cx="4267200" cy="159782"/>
+          </a:xfrm>
+          <a:prstGeom prst="roundRect">
+            <a:avLst/>
+          </a:prstGeom>
+          <a:noFill/>
+          <a:ln w="19050">
+            <a:solidFill>
+              <a:srgbClr val="FF0000"/>
+            </a:solidFill>
+          </a:ln>
+        </p:spPr>
+        <p:style>
+          <a:lnRef idx="2">
+            <a:schemeClr val="accent1">
+              <a:shade val="50000"/>
+            </a:schemeClr>
+          </a:lnRef>
+          <a:fillRef idx="1">
+            <a:schemeClr val="accent1"/>
+          </a:fillRef>
+          <a:effectRef idx="0">
+            <a:schemeClr val="accent1"/>
+          </a:effectRef>
+          <a:fontRef idx="minor">
+            <a:schemeClr val="lt1"/>
+          </a:fontRef>
+        </p:style>
+        <p:txBody>
+          <a:bodyPr rtlCol="0" anchor="ctr"/>
+          <a:lstStyle/>
+          <a:p>
+            <a:pPr algn="ctr"/>
+            <a:endParaRPr lang="es-MX"/>
+          </a:p>
+        </p:txBody>
+      </p:sp>
+      <p:sp>
+        <p:nvSpPr>
+          <p:cNvPr id="20" name="Rectángulo: esquinas redondeadas 19">
+            <a:extLst>
+              <a:ext uri="{FF2B5EF4-FFF2-40B4-BE49-F238E27FC236}">
+                <a16:creationId xmlns:a16="http://schemas.microsoft.com/office/drawing/2014/main" id="{7300C013-983A-4319-8F24-51E80833344D}"/>
+              </a:ext>
+            </a:extLst>
+          </p:cNvPr>
+          <p:cNvSpPr/>
+          <p:nvPr/>
+        </p:nvSpPr>
+        <p:spPr>
+          <a:xfrm>
+            <a:off x="1303706" y="2165984"/>
+            <a:ext cx="4267200" cy="159782"/>
+          </a:xfrm>
+          <a:prstGeom prst="roundRect">
+            <a:avLst/>
+          </a:prstGeom>
+          <a:noFill/>
+          <a:ln w="19050">
+            <a:solidFill>
+              <a:srgbClr val="FF0000"/>
+            </a:solidFill>
+          </a:ln>
+        </p:spPr>
+        <p:style>
+          <a:lnRef idx="2">
+            <a:schemeClr val="accent1">
+              <a:shade val="50000"/>
+            </a:schemeClr>
+          </a:lnRef>
+          <a:fillRef idx="1">
+            <a:schemeClr val="accent1"/>
+          </a:fillRef>
+          <a:effectRef idx="0">
+            <a:schemeClr val="accent1"/>
+          </a:effectRef>
+          <a:fontRef idx="minor">
+            <a:schemeClr val="lt1"/>
+          </a:fontRef>
+        </p:style>
+        <p:txBody>
+          <a:bodyPr rtlCol="0" anchor="ctr"/>
+          <a:lstStyle/>
+          <a:p>
+            <a:pPr algn="ctr"/>
+            <a:endParaRPr lang="es-MX"/>
+          </a:p>
+        </p:txBody>
+      </p:sp>
+      <p:sp>
+        <p:nvSpPr>
+          <p:cNvPr id="21" name="CuadroTexto 20">
+            <a:extLst>
+              <a:ext uri="{FF2B5EF4-FFF2-40B4-BE49-F238E27FC236}">
+                <a16:creationId xmlns:a16="http://schemas.microsoft.com/office/drawing/2014/main" id="{0841B88C-347D-4BF4-BF4A-5EB3F0F31F1D}"/>
+              </a:ext>
+            </a:extLst>
+          </p:cNvPr>
+          <p:cNvSpPr txBox="1"/>
+          <p:nvPr/>
+        </p:nvSpPr>
+        <p:spPr>
+          <a:xfrm>
+            <a:off x="7646521" y="3888730"/>
+            <a:ext cx="4115184" cy="830997"/>
+          </a:xfrm>
+          <a:prstGeom prst="rect">
+            <a:avLst/>
+          </a:prstGeom>
+          <a:noFill/>
+        </p:spPr>
+        <p:txBody>
+          <a:bodyPr wrap="square" rtlCol="0">
+            <a:spAutoFit/>
+          </a:bodyPr>
+          <a:lstStyle/>
+          <a:p>
+            <a:pPr algn="just"/>
+            <a:r>
+              <a:rPr lang="es-MX" sz="1600" dirty="0" err="1"/>
+              <a:t>setPackagesToSan</a:t>
+            </a:r>
+            <a:r>
+              <a:rPr lang="es-MX" sz="1600" dirty="0"/>
+              <a:t>() - Especifica paquetes para buscar la detección automática de sus clases de entidad en el </a:t>
+            </a:r>
+            <a:r>
+              <a:rPr lang="es-MX" sz="1600" dirty="0" err="1"/>
+              <a:t>classpath</a:t>
+            </a:r>
+            <a:r>
+              <a:rPr lang="es-MX" sz="1600" dirty="0"/>
+              <a:t>.</a:t>
+            </a:r>
+          </a:p>
+        </p:txBody>
+      </p:sp>
+      <p:cxnSp>
+        <p:nvCxnSpPr>
+          <p:cNvPr id="23" name="Conector recto de flecha 22">
+            <a:extLst>
+              <a:ext uri="{FF2B5EF4-FFF2-40B4-BE49-F238E27FC236}">
+                <a16:creationId xmlns:a16="http://schemas.microsoft.com/office/drawing/2014/main" id="{8DEE083C-0DE2-4DC7-B62B-72CD718F07FD}"/>
+              </a:ext>
+            </a:extLst>
+          </p:cNvPr>
+          <p:cNvCxnSpPr>
+            <a:cxnSpLocks/>
+            <a:stCxn id="21" idx="1"/>
+          </p:cNvCxnSpPr>
+          <p:nvPr/>
+        </p:nvCxnSpPr>
+        <p:spPr>
+          <a:xfrm flipH="1" flipV="1">
+            <a:off x="5600700" y="2325766"/>
+            <a:ext cx="2045821" cy="1978463"/>
+          </a:xfrm>
+          <a:prstGeom prst="straightConnector1">
+            <a:avLst/>
+          </a:prstGeom>
+          <a:ln>
+            <a:solidFill>
+              <a:srgbClr val="FF0000"/>
+            </a:solidFill>
+            <a:tailEnd type="triangle"/>
+          </a:ln>
+        </p:spPr>
+        <p:style>
+          <a:lnRef idx="1">
+            <a:schemeClr val="accent1"/>
+          </a:lnRef>
+          <a:fillRef idx="0">
+            <a:schemeClr val="accent1"/>
+          </a:fillRef>
+          <a:effectRef idx="0">
+            <a:schemeClr val="accent1"/>
+          </a:effectRef>
+          <a:fontRef idx="minor">
+            <a:schemeClr val="tx1"/>
+          </a:fontRef>
+        </p:style>
+      </p:cxnSp>
+      <p:sp>
+        <p:nvSpPr>
+          <p:cNvPr id="28" name="CuadroTexto 27">
+            <a:extLst>
+              <a:ext uri="{FF2B5EF4-FFF2-40B4-BE49-F238E27FC236}">
+                <a16:creationId xmlns:a16="http://schemas.microsoft.com/office/drawing/2014/main" id="{48FA7D12-E56A-40E7-903D-96431ECD235B}"/>
+              </a:ext>
+            </a:extLst>
+          </p:cNvPr>
+          <p:cNvSpPr txBox="1"/>
+          <p:nvPr/>
+        </p:nvSpPr>
+        <p:spPr>
+          <a:xfrm>
+            <a:off x="7646521" y="3619648"/>
+            <a:ext cx="4115184" cy="338554"/>
+          </a:xfrm>
+          <a:prstGeom prst="rect">
+            <a:avLst/>
+          </a:prstGeom>
+          <a:noFill/>
+        </p:spPr>
+        <p:txBody>
+          <a:bodyPr wrap="square">
+            <a:spAutoFit/>
+          </a:bodyPr>
+          <a:lstStyle/>
+          <a:p>
+            <a:r>
+              <a:rPr lang="es-MX" sz="1600" dirty="0" err="1">
+                <a:highlight>
+                  <a:srgbClr val="00FF00"/>
+                </a:highlight>
+              </a:rPr>
+              <a:t>Annotated</a:t>
+            </a:r>
+            <a:r>
+              <a:rPr lang="es-MX" sz="1600" dirty="0">
+                <a:highlight>
+                  <a:srgbClr val="00FF00"/>
+                </a:highlight>
+              </a:rPr>
+              <a:t> Class</a:t>
+            </a:r>
+          </a:p>
+        </p:txBody>
+      </p:sp>
+      <p:sp>
+        <p:nvSpPr>
+          <p:cNvPr id="29" name="CuadroTexto 28">
+            <a:extLst>
+              <a:ext uri="{FF2B5EF4-FFF2-40B4-BE49-F238E27FC236}">
+                <a16:creationId xmlns:a16="http://schemas.microsoft.com/office/drawing/2014/main" id="{288D713C-278A-4A12-B0B6-560A5E522E06}"/>
+              </a:ext>
+            </a:extLst>
+          </p:cNvPr>
+          <p:cNvSpPr txBox="1"/>
+          <p:nvPr/>
+        </p:nvSpPr>
+        <p:spPr>
+          <a:xfrm>
+            <a:off x="7704506" y="4819532"/>
+            <a:ext cx="4115184" cy="830997"/>
+          </a:xfrm>
+          <a:prstGeom prst="rect">
+            <a:avLst/>
+          </a:prstGeom>
+          <a:noFill/>
+        </p:spPr>
+        <p:txBody>
+          <a:bodyPr wrap="square">
+            <a:spAutoFit/>
+          </a:bodyPr>
+          <a:lstStyle/>
+          <a:p>
+            <a:r>
+              <a:rPr lang="es-MX" sz="1600" dirty="0">
+                <a:highlight>
+                  <a:srgbClr val="00FF00"/>
+                </a:highlight>
+              </a:rPr>
+              <a:t>Hibernate properties</a:t>
+            </a:r>
+          </a:p>
+          <a:p>
+            <a:r>
+              <a:rPr lang="es-MX" sz="1600" dirty="0"/>
+              <a:t>Establece las propiedades de Hibernate, leídos del archivo de propiedades.</a:t>
+            </a:r>
+          </a:p>
+        </p:txBody>
+      </p:sp>
+      <p:pic>
+        <p:nvPicPr>
+          <p:cNvPr id="31" name="Imagen 30">
+            <a:extLst>
+              <a:ext uri="{FF2B5EF4-FFF2-40B4-BE49-F238E27FC236}">
+                <a16:creationId xmlns:a16="http://schemas.microsoft.com/office/drawing/2014/main" id="{BE61BE58-BE3F-406A-8C03-FC0264F6056D}"/>
+              </a:ext>
+            </a:extLst>
+          </p:cNvPr>
+          <p:cNvPicPr>
+            <a:picLocks noChangeAspect="1"/>
+          </p:cNvPicPr>
+          <p:nvPr/>
+        </p:nvPicPr>
+        <p:blipFill>
+          <a:blip r:embed="rId5"/>
+          <a:stretch>
+            <a:fillRect/>
+          </a:stretch>
+        </p:blipFill>
+        <p:spPr>
+          <a:xfrm>
+            <a:off x="154781" y="4393198"/>
+            <a:ext cx="6796088" cy="1410813"/>
+          </a:xfrm>
+          <a:prstGeom prst="rect">
+            <a:avLst/>
+          </a:prstGeom>
+          <a:ln>
+            <a:solidFill>
+              <a:schemeClr val="tx1"/>
+            </a:solidFill>
+          </a:ln>
+        </p:spPr>
+      </p:pic>
+    </p:spTree>
+    <p:extLst>
+      <p:ext uri="{BB962C8B-B14F-4D97-AF65-F5344CB8AC3E}">
+        <p14:creationId xmlns:p14="http://schemas.microsoft.com/office/powerpoint/2010/main" val="3274325253"/>
+      </p:ext>
+    </p:extLst>
+  </p:cSld>
+  <p:clrMapOvr>
+    <a:masterClrMapping/>
+  </p:clrMapOvr>
+</p:sld>
+</file>
+
+<file path=ppt/slides/slide19.xml><?xml version="1.0" encoding="utf-8"?>
+<p:sld xmlns:a="http://schemas.openxmlformats.org/drawingml/2006/main" xmlns:r="http://schemas.openxmlformats.org/officeDocument/2006/relationships" xmlns:p="http://schemas.openxmlformats.org/presentationml/2006/main">
+  <p:cSld>
+    <p:spTree>
+      <p:nvGrpSpPr>
+        <p:cNvPr id="1" name=""/>
+        <p:cNvGrpSpPr/>
+        <p:nvPr/>
+      </p:nvGrpSpPr>
+      <p:grpSpPr>
+        <a:xfrm>
+          <a:off x="0" y="0"/>
+          <a:ext cx="0" cy="0"/>
+          <a:chOff x="0" y="0"/>
+          <a:chExt cx="0" cy="0"/>
+        </a:xfrm>
+      </p:grpSpPr>
+      <p:grpSp>
+        <p:nvGrpSpPr>
+          <p:cNvPr id="11" name="Grupo 10">
+            <a:extLst>
+              <a:ext uri="{FF2B5EF4-FFF2-40B4-BE49-F238E27FC236}">
+                <a16:creationId xmlns:a16="http://schemas.microsoft.com/office/drawing/2014/main" id="{28BD5586-8B4D-43FA-8CC4-37D2533023FA}"/>
+              </a:ext>
+            </a:extLst>
+          </p:cNvPr>
+          <p:cNvGrpSpPr/>
+          <p:nvPr/>
+        </p:nvGrpSpPr>
+        <p:grpSpPr>
+          <a:xfrm>
+            <a:off x="1707376" y="558173"/>
+            <a:ext cx="8915400" cy="1818314"/>
+            <a:chOff x="1638300" y="3682373"/>
+            <a:chExt cx="8915400" cy="1818314"/>
+          </a:xfrm>
+        </p:grpSpPr>
+        <p:sp>
+          <p:nvSpPr>
+            <p:cNvPr id="4" name="Rectángulo: esquinas redondeadas 3">
+              <a:extLst>
+                <a:ext uri="{FF2B5EF4-FFF2-40B4-BE49-F238E27FC236}">
+                  <a16:creationId xmlns:a16="http://schemas.microsoft.com/office/drawing/2014/main" id="{EF74656B-93D7-4038-9389-26D1274E7399}"/>
+                </a:ext>
+              </a:extLst>
+            </p:cNvPr>
+            <p:cNvSpPr/>
+            <p:nvPr/>
+          </p:nvSpPr>
+          <p:spPr>
+            <a:xfrm>
+              <a:off x="1774569" y="3682373"/>
+              <a:ext cx="8642862" cy="337177"/>
+            </a:xfrm>
+            <a:prstGeom prst="roundRect">
+              <a:avLst/>
+            </a:prstGeom>
+            <a:solidFill>
+              <a:schemeClr val="accent5">
+                <a:lumMod val="40000"/>
+                <a:lumOff val="60000"/>
+              </a:schemeClr>
+            </a:solidFill>
+          </p:spPr>
+          <p:style>
+            <a:lnRef idx="2">
+              <a:schemeClr val="accent1">
+                <a:shade val="50000"/>
+              </a:schemeClr>
+            </a:lnRef>
+            <a:fillRef idx="1">
+              <a:schemeClr val="accent1"/>
+            </a:fillRef>
+            <a:effectRef idx="0">
+              <a:schemeClr val="accent1"/>
+            </a:effectRef>
+            <a:fontRef idx="minor">
+              <a:schemeClr val="lt1"/>
+            </a:fontRef>
+          </p:style>
+          <p:txBody>
+            <a:bodyPr rtlCol="0" anchor="ctr"/>
+            <a:lstStyle/>
+            <a:p>
+              <a:pPr algn="ctr"/>
+              <a:r>
+                <a:rPr lang="es-MX" dirty="0">
+                  <a:solidFill>
+                    <a:schemeClr val="tx1"/>
+                  </a:solidFill>
+                </a:rPr>
+                <a:t>HibernateTransactionManager - </a:t>
+              </a:r>
+              <a:r>
+                <a:rPr lang="es-MX" dirty="0">
+                  <a:solidFill>
+                    <a:schemeClr val="tx1"/>
+                  </a:solidFill>
+                  <a:hlinkClick r:id="rId2"/>
+                </a:rPr>
+                <a:t>https://bit.ly/3LydnD1</a:t>
+              </a:r>
+              <a:r>
+                <a:rPr lang="es-MX" dirty="0">
+                  <a:solidFill>
+                    <a:schemeClr val="tx1"/>
+                  </a:solidFill>
+                </a:rPr>
+                <a:t> </a:t>
+              </a:r>
+            </a:p>
+          </p:txBody>
+        </p:sp>
+        <p:pic>
+          <p:nvPicPr>
+            <p:cNvPr id="6" name="Imagen 5">
+              <a:extLst>
+                <a:ext uri="{FF2B5EF4-FFF2-40B4-BE49-F238E27FC236}">
+                  <a16:creationId xmlns:a16="http://schemas.microsoft.com/office/drawing/2014/main" id="{3F9C10D3-F176-44D3-A6A4-BCDB46BADA41}"/>
+                </a:ext>
+              </a:extLst>
+            </p:cNvPr>
+            <p:cNvPicPr>
+              <a:picLocks noChangeAspect="1"/>
+            </p:cNvPicPr>
+            <p:nvPr/>
+          </p:nvPicPr>
+          <p:blipFill>
+            <a:blip r:embed="rId3"/>
+            <a:stretch>
+              <a:fillRect/>
+            </a:stretch>
+          </p:blipFill>
+          <p:spPr>
+            <a:xfrm>
+              <a:off x="1638300" y="4233862"/>
+              <a:ext cx="8915400" cy="1266825"/>
+            </a:xfrm>
+            <a:prstGeom prst="rect">
+              <a:avLst/>
+            </a:prstGeom>
+            <a:ln>
+              <a:solidFill>
+                <a:schemeClr val="tx1"/>
+              </a:solidFill>
+            </a:ln>
+          </p:spPr>
+        </p:pic>
+        <p:sp>
+          <p:nvSpPr>
+            <p:cNvPr id="7" name="Rectángulo: esquinas redondeadas 6">
+              <a:extLst>
+                <a:ext uri="{FF2B5EF4-FFF2-40B4-BE49-F238E27FC236}">
+                  <a16:creationId xmlns:a16="http://schemas.microsoft.com/office/drawing/2014/main" id="{1F63EF64-FD10-4689-829A-626FD6670045}"/>
+                </a:ext>
+              </a:extLst>
+            </p:cNvPr>
+            <p:cNvSpPr/>
+            <p:nvPr/>
+          </p:nvSpPr>
+          <p:spPr>
+            <a:xfrm>
+              <a:off x="6334125" y="4752974"/>
+              <a:ext cx="1676400" cy="228600"/>
+            </a:xfrm>
+            <a:prstGeom prst="roundRect">
+              <a:avLst/>
+            </a:prstGeom>
+            <a:noFill/>
+            <a:ln>
+              <a:solidFill>
+                <a:srgbClr val="FF0000"/>
+              </a:solidFill>
+            </a:ln>
+          </p:spPr>
+          <p:style>
+            <a:lnRef idx="2">
+              <a:schemeClr val="accent1">
+                <a:shade val="50000"/>
+              </a:schemeClr>
+            </a:lnRef>
+            <a:fillRef idx="1">
+              <a:schemeClr val="accent1"/>
+            </a:fillRef>
+            <a:effectRef idx="0">
+              <a:schemeClr val="accent1"/>
+            </a:effectRef>
+            <a:fontRef idx="minor">
+              <a:schemeClr val="lt1"/>
+            </a:fontRef>
+          </p:style>
+          <p:txBody>
+            <a:bodyPr rtlCol="0" anchor="ctr"/>
+            <a:lstStyle/>
+            <a:p>
+              <a:pPr algn="ctr"/>
+              <a:endParaRPr lang="es-MX"/>
+            </a:p>
+          </p:txBody>
+        </p:sp>
+      </p:grpSp>
+      <p:grpSp>
+        <p:nvGrpSpPr>
+          <p:cNvPr id="13" name="Grupo 12">
+            <a:extLst>
+              <a:ext uri="{FF2B5EF4-FFF2-40B4-BE49-F238E27FC236}">
+                <a16:creationId xmlns:a16="http://schemas.microsoft.com/office/drawing/2014/main" id="{618D260E-F5E0-4CC5-BE23-6D00AF7030B6}"/>
+              </a:ext>
+            </a:extLst>
+          </p:cNvPr>
+          <p:cNvGrpSpPr/>
+          <p:nvPr/>
+        </p:nvGrpSpPr>
+        <p:grpSpPr>
+          <a:xfrm>
+            <a:off x="1774569" y="3067049"/>
+            <a:ext cx="8642862" cy="1994527"/>
+            <a:chOff x="1774569" y="405773"/>
+            <a:chExt cx="8642862" cy="1994527"/>
+          </a:xfrm>
+        </p:grpSpPr>
+        <p:sp>
+          <p:nvSpPr>
+            <p:cNvPr id="8" name="Rectángulo: esquinas redondeadas 7">
+              <a:extLst>
+                <a:ext uri="{FF2B5EF4-FFF2-40B4-BE49-F238E27FC236}">
+                  <a16:creationId xmlns:a16="http://schemas.microsoft.com/office/drawing/2014/main" id="{EA7E4351-3B18-4F7D-BFD7-1D08F3C1EE31}"/>
+                </a:ext>
+              </a:extLst>
+            </p:cNvPr>
+            <p:cNvSpPr/>
+            <p:nvPr/>
+          </p:nvSpPr>
+          <p:spPr>
+            <a:xfrm>
+              <a:off x="1774569" y="405773"/>
+              <a:ext cx="8642862" cy="337177"/>
+            </a:xfrm>
+            <a:prstGeom prst="roundRect">
+              <a:avLst/>
+            </a:prstGeom>
+            <a:solidFill>
+              <a:schemeClr val="accent5">
+                <a:lumMod val="40000"/>
+                <a:lumOff val="60000"/>
+              </a:schemeClr>
+            </a:solidFill>
+          </p:spPr>
+          <p:style>
+            <a:lnRef idx="2">
+              <a:schemeClr val="accent1">
+                <a:shade val="50000"/>
+              </a:schemeClr>
+            </a:lnRef>
+            <a:fillRef idx="1">
+              <a:schemeClr val="accent1"/>
+            </a:fillRef>
+            <a:effectRef idx="0">
+              <a:schemeClr val="accent1"/>
+            </a:effectRef>
+            <a:fontRef idx="minor">
+              <a:schemeClr val="lt1"/>
+            </a:fontRef>
+          </p:style>
+          <p:txBody>
+            <a:bodyPr rtlCol="0" anchor="ctr"/>
+            <a:lstStyle/>
+            <a:p>
+              <a:pPr algn="ctr"/>
+              <a:r>
+                <a:rPr lang="es-MX" dirty="0">
+                  <a:solidFill>
+                    <a:schemeClr val="tx1"/>
+                  </a:solidFill>
+                </a:rPr>
+                <a:t>HibernateTemplate - </a:t>
+              </a:r>
+              <a:r>
+                <a:rPr lang="es-MX" dirty="0">
+                  <a:solidFill>
+                    <a:schemeClr val="tx1"/>
+                  </a:solidFill>
+                  <a:hlinkClick r:id="rId4"/>
+                </a:rPr>
+                <a:t>https://bit.ly/3vMb4pe</a:t>
+              </a:r>
+              <a:r>
+                <a:rPr lang="es-MX" dirty="0">
+                  <a:solidFill>
+                    <a:schemeClr val="tx1"/>
+                  </a:solidFill>
+                </a:rPr>
+                <a:t> </a:t>
+              </a:r>
+            </a:p>
+          </p:txBody>
+        </p:sp>
+        <p:pic>
+          <p:nvPicPr>
+            <p:cNvPr id="10" name="Imagen 9">
+              <a:extLst>
+                <a:ext uri="{FF2B5EF4-FFF2-40B4-BE49-F238E27FC236}">
+                  <a16:creationId xmlns:a16="http://schemas.microsoft.com/office/drawing/2014/main" id="{82166DD8-1D56-4803-B5B7-7EEF6E0DFEA2}"/>
+                </a:ext>
+              </a:extLst>
+            </p:cNvPr>
+            <p:cNvPicPr>
+              <a:picLocks noChangeAspect="1"/>
+            </p:cNvPicPr>
+            <p:nvPr/>
+          </p:nvPicPr>
+          <p:blipFill>
+            <a:blip r:embed="rId5"/>
+            <a:stretch>
+              <a:fillRect/>
+            </a:stretch>
+          </p:blipFill>
+          <p:spPr>
+            <a:xfrm>
+              <a:off x="2938462" y="957262"/>
+              <a:ext cx="7303314" cy="1443038"/>
+            </a:xfrm>
+            <a:prstGeom prst="rect">
+              <a:avLst/>
+            </a:prstGeom>
+            <a:ln>
+              <a:solidFill>
+                <a:schemeClr val="tx1"/>
+              </a:solidFill>
+            </a:ln>
+          </p:spPr>
+        </p:pic>
+        <p:sp>
+          <p:nvSpPr>
+            <p:cNvPr id="12" name="Rectángulo: esquinas redondeadas 11">
+              <a:extLst>
+                <a:ext uri="{FF2B5EF4-FFF2-40B4-BE49-F238E27FC236}">
+                  <a16:creationId xmlns:a16="http://schemas.microsoft.com/office/drawing/2014/main" id="{01BABD99-BF8A-4213-99B9-8077841330B5}"/>
+                </a:ext>
+              </a:extLst>
+            </p:cNvPr>
+            <p:cNvSpPr/>
+            <p:nvPr/>
+          </p:nvSpPr>
+          <p:spPr>
+            <a:xfrm>
+              <a:off x="7372350" y="1596397"/>
+              <a:ext cx="1676400" cy="228600"/>
+            </a:xfrm>
+            <a:prstGeom prst="roundRect">
+              <a:avLst/>
+            </a:prstGeom>
+            <a:noFill/>
+            <a:ln>
+              <a:solidFill>
+                <a:srgbClr val="FF0000"/>
+              </a:solidFill>
+            </a:ln>
+          </p:spPr>
+          <p:style>
+            <a:lnRef idx="2">
+              <a:schemeClr val="accent1">
+                <a:shade val="50000"/>
+              </a:schemeClr>
+            </a:lnRef>
+            <a:fillRef idx="1">
+              <a:schemeClr val="accent1"/>
+            </a:fillRef>
+            <a:effectRef idx="0">
+              <a:schemeClr val="accent1"/>
+            </a:effectRef>
+            <a:fontRef idx="minor">
+              <a:schemeClr val="lt1"/>
+            </a:fontRef>
+          </p:style>
+          <p:txBody>
+            <a:bodyPr rtlCol="0" anchor="ctr"/>
+            <a:lstStyle/>
+            <a:p>
+              <a:pPr algn="ctr"/>
+              <a:endParaRPr lang="es-MX"/>
+            </a:p>
+          </p:txBody>
+        </p:sp>
+      </p:grpSp>
+    </p:spTree>
+    <p:extLst>
+      <p:ext uri="{BB962C8B-B14F-4D97-AF65-F5344CB8AC3E}">
+        <p14:creationId xmlns:p14="http://schemas.microsoft.com/office/powerpoint/2010/main" val="4026806155"/>
       </p:ext>
     </p:extLst>
   </p:cSld>

</xml_diff>